<commit_message>
Added picture to show the problem decomposition
</commit_message>
<xml_diff>
--- a/images_src/misc_powerpoint.pptx
+++ b/images_src/misc_powerpoint.pptx
@@ -5,12 +5,13 @@
     <p:sldMasterId id="2147483648" r:id="rId1"/>
   </p:sldMasterIdLst>
   <p:notesMasterIdLst>
-    <p:notesMasterId r:id="rId5"/>
+    <p:notesMasterId r:id="rId6"/>
   </p:notesMasterIdLst>
   <p:sldIdLst>
     <p:sldId id="258" r:id="rId2"/>
     <p:sldId id="259" r:id="rId3"/>
     <p:sldId id="260" r:id="rId4"/>
+    <p:sldId id="261" r:id="rId5"/>
   </p:sldIdLst>
   <p:sldSz cx="12192000" cy="6858000"/>
   <p:notesSz cx="6858000" cy="9144000"/>
@@ -109,6 +110,11 @@
       </a:defRPr>
     </a:lvl9pPr>
   </p:defaultTextStyle>
+  <p:extLst>
+    <p:ext uri="{EFAFB233-063F-42B5-8137-9DF3F51BA10A}">
+      <p15:sldGuideLst xmlns:p15="http://schemas.microsoft.com/office/powerpoint/2012/main"/>
+    </p:ext>
+  </p:extLst>
 </p:presentation>
 </file>
 
@@ -194,7 +200,7 @@
           <a:p>
             <a:fld id="{8A2C6B5F-9BC6-4B49-8DDC-1983D75D835F}" type="datetimeFigureOut">
               <a:rPr lang="en-US" smtClean="0"/>
-              <a:t>12/5/15</a:t>
+              <a:t>1/3/16</a:t>
             </a:fld>
             <a:endParaRPr lang="en-US"/>
           </a:p>
@@ -819,7 +825,7 @@
           <a:p>
             <a:fld id="{70491AAC-A65D-7044-B83C-B384503BD135}" type="datetimeFigureOut">
               <a:rPr lang="en-US" smtClean="0"/>
-              <a:t>12/5/15</a:t>
+              <a:t>1/3/16</a:t>
             </a:fld>
             <a:endParaRPr lang="en-US"/>
           </a:p>
@@ -989,7 +995,7 @@
           <a:p>
             <a:fld id="{70491AAC-A65D-7044-B83C-B384503BD135}" type="datetimeFigureOut">
               <a:rPr lang="en-US" smtClean="0"/>
-              <a:t>12/5/15</a:t>
+              <a:t>1/3/16</a:t>
             </a:fld>
             <a:endParaRPr lang="en-US"/>
           </a:p>
@@ -1169,7 +1175,7 @@
           <a:p>
             <a:fld id="{70491AAC-A65D-7044-B83C-B384503BD135}" type="datetimeFigureOut">
               <a:rPr lang="en-US" smtClean="0"/>
-              <a:t>12/5/15</a:t>
+              <a:t>1/3/16</a:t>
             </a:fld>
             <a:endParaRPr lang="en-US"/>
           </a:p>
@@ -1339,7 +1345,7 @@
           <a:p>
             <a:fld id="{70491AAC-A65D-7044-B83C-B384503BD135}" type="datetimeFigureOut">
               <a:rPr lang="en-US" smtClean="0"/>
-              <a:t>12/5/15</a:t>
+              <a:t>1/3/16</a:t>
             </a:fld>
             <a:endParaRPr lang="en-US"/>
           </a:p>
@@ -1585,7 +1591,7 @@
           <a:p>
             <a:fld id="{70491AAC-A65D-7044-B83C-B384503BD135}" type="datetimeFigureOut">
               <a:rPr lang="en-US" smtClean="0"/>
-              <a:t>12/5/15</a:t>
+              <a:t>1/3/16</a:t>
             </a:fld>
             <a:endParaRPr lang="en-US"/>
           </a:p>
@@ -1817,7 +1823,7 @@
           <a:p>
             <a:fld id="{70491AAC-A65D-7044-B83C-B384503BD135}" type="datetimeFigureOut">
               <a:rPr lang="en-US" smtClean="0"/>
-              <a:t>12/5/15</a:t>
+              <a:t>1/3/16</a:t>
             </a:fld>
             <a:endParaRPr lang="en-US"/>
           </a:p>
@@ -2184,7 +2190,7 @@
           <a:p>
             <a:fld id="{70491AAC-A65D-7044-B83C-B384503BD135}" type="datetimeFigureOut">
               <a:rPr lang="en-US" smtClean="0"/>
-              <a:t>12/5/15</a:t>
+              <a:t>1/3/16</a:t>
             </a:fld>
             <a:endParaRPr lang="en-US"/>
           </a:p>
@@ -2302,7 +2308,7 @@
           <a:p>
             <a:fld id="{70491AAC-A65D-7044-B83C-B384503BD135}" type="datetimeFigureOut">
               <a:rPr lang="en-US" smtClean="0"/>
-              <a:t>12/5/15</a:t>
+              <a:t>1/3/16</a:t>
             </a:fld>
             <a:endParaRPr lang="en-US"/>
           </a:p>
@@ -2397,7 +2403,7 @@
           <a:p>
             <a:fld id="{70491AAC-A65D-7044-B83C-B384503BD135}" type="datetimeFigureOut">
               <a:rPr lang="en-US" smtClean="0"/>
-              <a:t>12/5/15</a:t>
+              <a:t>1/3/16</a:t>
             </a:fld>
             <a:endParaRPr lang="en-US"/>
           </a:p>
@@ -2674,7 +2680,7 @@
           <a:p>
             <a:fld id="{70491AAC-A65D-7044-B83C-B384503BD135}" type="datetimeFigureOut">
               <a:rPr lang="en-US" smtClean="0"/>
-              <a:t>12/5/15</a:t>
+              <a:t>1/3/16</a:t>
             </a:fld>
             <a:endParaRPr lang="en-US"/>
           </a:p>
@@ -2927,7 +2933,7 @@
           <a:p>
             <a:fld id="{70491AAC-A65D-7044-B83C-B384503BD135}" type="datetimeFigureOut">
               <a:rPr lang="en-US" smtClean="0"/>
-              <a:t>12/5/15</a:t>
+              <a:t>1/3/16</a:t>
             </a:fld>
             <a:endParaRPr lang="en-US"/>
           </a:p>
@@ -3140,7 +3146,7 @@
           <a:p>
             <a:fld id="{70491AAC-A65D-7044-B83C-B384503BD135}" type="datetimeFigureOut">
               <a:rPr lang="en-US" smtClean="0"/>
-              <a:t>12/5/15</a:t>
+              <a:t>1/3/16</a:t>
             </a:fld>
             <a:endParaRPr lang="en-US"/>
           </a:p>
@@ -4444,11 +4450,6 @@
               </a:rPr>
               <a:t> are referenced in Land Registry’s “Price Paid Data” (LRPP)</a:t>
             </a:r>
-            <a:endParaRPr lang="en-US" sz="1600" dirty="0">
-              <a:latin typeface="Lucida Sans" pitchFamily="-106" charset="0"/>
-              <a:ea typeface="ＭＳ Ｐゴシック" pitchFamily="-106" charset="-128"/>
-              <a:cs typeface="ＭＳ Ｐゴシック" pitchFamily="-106" charset="-128"/>
-            </a:endParaRPr>
           </a:p>
         </p:txBody>
       </p:sp>
@@ -4576,11 +4577,6 @@
               </a:rPr>
               <a:t>house number</a:t>
             </a:r>
-            <a:endParaRPr lang="en-US" sz="1600" dirty="0">
-              <a:latin typeface="Lucida Sans" pitchFamily="-106" charset="0"/>
-              <a:ea typeface="ＭＳ Ｐゴシック" pitchFamily="-106" charset="-128"/>
-              <a:cs typeface="ＭＳ Ｐゴシック" pitchFamily="-106" charset="-128"/>
-            </a:endParaRPr>
           </a:p>
         </p:txBody>
       </p:sp>
@@ -4747,11 +4743,6 @@
               </a:rPr>
               <a:t>74% of the streets qualify for house number inference</a:t>
             </a:r>
-            <a:endParaRPr lang="en-US" sz="1600" dirty="0">
-              <a:latin typeface="Lucida Sans" pitchFamily="-106" charset="0"/>
-              <a:ea typeface="ＭＳ Ｐゴシック" pitchFamily="-106" charset="-128"/>
-              <a:cs typeface="ＭＳ Ｐゴシック" pitchFamily="-106" charset="-128"/>
-            </a:endParaRPr>
           </a:p>
         </p:txBody>
       </p:sp>
@@ -4808,11 +4799,6 @@
               </a:rPr>
               <a:t>111k house numbers are in LRPP</a:t>
             </a:r>
-            <a:endParaRPr lang="en-US" sz="1400" dirty="0">
-              <a:latin typeface="Lucida Sans" pitchFamily="-106" charset="0"/>
-              <a:ea typeface="ＭＳ Ｐゴシック" pitchFamily="-106" charset="-128"/>
-              <a:cs typeface="ＭＳ Ｐゴシック" pitchFamily="-106" charset="-128"/>
-            </a:endParaRPr>
           </a:p>
         </p:txBody>
       </p:sp>
@@ -4869,11 +4855,6 @@
               </a:rPr>
               <a:t>113k house numbers can be inferred</a:t>
             </a:r>
-            <a:endParaRPr lang="en-US" sz="1400" dirty="0">
-              <a:latin typeface="Lucida Sans" pitchFamily="-106" charset="0"/>
-              <a:ea typeface="ＭＳ Ｐゴシック" pitchFamily="-106" charset="-128"/>
-              <a:cs typeface="ＭＳ Ｐゴシック" pitchFamily="-106" charset="-128"/>
-            </a:endParaRPr>
           </a:p>
         </p:txBody>
       </p:sp>
@@ -4948,11 +4929,6 @@
               </a:rPr>
               <a:t>Not known and not suitable for inference</a:t>
             </a:r>
-            <a:endParaRPr lang="en-US" sz="1400" dirty="0">
-              <a:latin typeface="Lucida Sans" pitchFamily="-106" charset="0"/>
-              <a:ea typeface="ＭＳ Ｐゴシック" pitchFamily="-106" charset="-128"/>
-              <a:cs typeface="ＭＳ Ｐゴシック" pitchFamily="-106" charset="-128"/>
-            </a:endParaRPr>
           </a:p>
         </p:txBody>
       </p:sp>
@@ -5011,6 +4987,1073 @@
       </p:par>
     </p:tnLst>
   </p:timing>
+</p:sld>
+</file>
+
+<file path=ppt/slides/slide4.xml><?xml version="1.0" encoding="utf-8"?>
+<p:sld xmlns:a="http://schemas.openxmlformats.org/drawingml/2006/main" xmlns:r="http://schemas.openxmlformats.org/officeDocument/2006/relationships" xmlns:p="http://schemas.openxmlformats.org/presentationml/2006/main">
+  <p:cSld>
+    <p:spTree>
+      <p:nvGrpSpPr>
+        <p:cNvPr id="1" name=""/>
+        <p:cNvGrpSpPr/>
+        <p:nvPr/>
+      </p:nvGrpSpPr>
+      <p:grpSpPr>
+        <a:xfrm>
+          <a:off x="0" y="0"/>
+          <a:ext cx="0" cy="0"/>
+          <a:chOff x="0" y="0"/>
+          <a:chExt cx="0" cy="0"/>
+        </a:xfrm>
+      </p:grpSpPr>
+      <p:sp>
+        <p:nvSpPr>
+          <p:cNvPr id="5" name="Oval 4"/>
+          <p:cNvSpPr/>
+          <p:nvPr/>
+        </p:nvSpPr>
+        <p:spPr>
+          <a:xfrm>
+            <a:off x="534785" y="2640636"/>
+            <a:ext cx="806824" cy="806824"/>
+          </a:xfrm>
+          <a:prstGeom prst="ellipse">
+            <a:avLst/>
+          </a:prstGeom>
+          <a:solidFill>
+            <a:schemeClr val="bg1"/>
+          </a:solidFill>
+        </p:spPr>
+        <p:style>
+          <a:lnRef idx="2">
+            <a:schemeClr val="accent1">
+              <a:shade val="50000"/>
+            </a:schemeClr>
+          </a:lnRef>
+          <a:fillRef idx="1">
+            <a:schemeClr val="accent1"/>
+          </a:fillRef>
+          <a:effectRef idx="0">
+            <a:schemeClr val="accent1"/>
+          </a:effectRef>
+          <a:fontRef idx="minor">
+            <a:schemeClr val="lt1"/>
+          </a:fontRef>
+        </p:style>
+        <p:txBody>
+          <a:bodyPr rtlCol="0" anchor="ctr"/>
+          <a:lstStyle/>
+          <a:p>
+            <a:pPr algn="ctr"/>
+            <a:r>
+              <a:rPr lang="en-US" sz="1400" dirty="0" smtClean="0">
+                <a:solidFill>
+                  <a:schemeClr val="tx1"/>
+                </a:solidFill>
+              </a:rPr>
+              <a:t>OLAF</a:t>
+            </a:r>
+            <a:endParaRPr lang="en-US" sz="1400" dirty="0">
+              <a:solidFill>
+                <a:schemeClr val="tx1"/>
+              </a:solidFill>
+            </a:endParaRPr>
+          </a:p>
+        </p:txBody>
+      </p:sp>
+      <p:sp>
+        <p:nvSpPr>
+          <p:cNvPr id="6" name="Rounded Rectangle 5"/>
+          <p:cNvSpPr/>
+          <p:nvPr/>
+        </p:nvSpPr>
+        <p:spPr>
+          <a:xfrm>
+            <a:off x="2091059" y="1927533"/>
+            <a:ext cx="3352800" cy="597213"/>
+          </a:xfrm>
+          <a:prstGeom prst="roundRect">
+            <a:avLst/>
+          </a:prstGeom>
+          <a:solidFill>
+            <a:schemeClr val="bg1"/>
+          </a:solidFill>
+        </p:spPr>
+        <p:style>
+          <a:lnRef idx="2">
+            <a:schemeClr val="accent1">
+              <a:shade val="50000"/>
+            </a:schemeClr>
+          </a:lnRef>
+          <a:fillRef idx="1">
+            <a:schemeClr val="accent1"/>
+          </a:fillRef>
+          <a:effectRef idx="0">
+            <a:schemeClr val="accent1"/>
+          </a:effectRef>
+          <a:fontRef idx="minor">
+            <a:schemeClr val="lt1"/>
+          </a:fontRef>
+        </p:style>
+        <p:txBody>
+          <a:bodyPr rtlCol="0" anchor="ctr"/>
+          <a:lstStyle/>
+          <a:p>
+            <a:r>
+              <a:rPr lang="en-US" sz="1400" i="1" dirty="0" smtClean="0">
+                <a:solidFill>
+                  <a:schemeClr val="tx1"/>
+                </a:solidFill>
+              </a:rPr>
+              <a:t>p1</a:t>
+            </a:r>
+            <a:r>
+              <a:rPr lang="en-US" sz="1400" dirty="0" smtClean="0">
+                <a:solidFill>
+                  <a:schemeClr val="tx1"/>
+                </a:solidFill>
+              </a:rPr>
+              <a:t>: Create </a:t>
+            </a:r>
+            <a:r>
+              <a:rPr lang="en-US" sz="1400" dirty="0">
+                <a:solidFill>
+                  <a:schemeClr val="tx1"/>
+                </a:solidFill>
+              </a:rPr>
+              <a:t>a list of all existing </a:t>
+            </a:r>
+            <a:r>
+              <a:rPr lang="en-US" sz="1400" i="1" dirty="0" smtClean="0">
+                <a:solidFill>
+                  <a:schemeClr val="tx1"/>
+                </a:solidFill>
+              </a:rPr>
+              <a:t>house numbers </a:t>
+            </a:r>
+            <a:r>
+              <a:rPr lang="en-US" sz="1400" dirty="0">
+                <a:solidFill>
+                  <a:schemeClr val="tx1"/>
+                </a:solidFill>
+              </a:rPr>
+              <a:t>for each road listed in OSON</a:t>
+            </a:r>
+          </a:p>
+        </p:txBody>
+      </p:sp>
+      <p:sp>
+        <p:nvSpPr>
+          <p:cNvPr id="7" name="Rounded Rectangle 6"/>
+          <p:cNvSpPr/>
+          <p:nvPr/>
+        </p:nvSpPr>
+        <p:spPr>
+          <a:xfrm>
+            <a:off x="2091059" y="2734357"/>
+            <a:ext cx="3352800" cy="597213"/>
+          </a:xfrm>
+          <a:prstGeom prst="roundRect">
+            <a:avLst/>
+          </a:prstGeom>
+          <a:solidFill>
+            <a:schemeClr val="bg1">
+              <a:lumMod val="75000"/>
+            </a:schemeClr>
+          </a:solidFill>
+        </p:spPr>
+        <p:style>
+          <a:lnRef idx="2">
+            <a:schemeClr val="accent1">
+              <a:shade val="50000"/>
+            </a:schemeClr>
+          </a:lnRef>
+          <a:fillRef idx="1">
+            <a:schemeClr val="accent1"/>
+          </a:fillRef>
+          <a:effectRef idx="0">
+            <a:schemeClr val="accent1"/>
+          </a:effectRef>
+          <a:fontRef idx="minor">
+            <a:schemeClr val="lt1"/>
+          </a:fontRef>
+        </p:style>
+        <p:txBody>
+          <a:bodyPr rtlCol="0" anchor="ctr"/>
+          <a:lstStyle/>
+          <a:p>
+            <a:r>
+              <a:rPr lang="en-US" sz="1400" i="1" dirty="0" smtClean="0">
+                <a:solidFill>
+                  <a:schemeClr val="tx1"/>
+                </a:solidFill>
+              </a:rPr>
+              <a:t>p2</a:t>
+            </a:r>
+            <a:r>
+              <a:rPr lang="en-US" sz="1400" dirty="0" smtClean="0">
+                <a:solidFill>
+                  <a:schemeClr val="tx1"/>
+                </a:solidFill>
+              </a:rPr>
+              <a:t>: Create </a:t>
+            </a:r>
+            <a:r>
+              <a:rPr lang="en-US" sz="1400" dirty="0">
+                <a:solidFill>
+                  <a:schemeClr val="tx1"/>
+                </a:solidFill>
+              </a:rPr>
+              <a:t>a list of all existing </a:t>
+            </a:r>
+            <a:r>
+              <a:rPr lang="en-US" sz="1400" i="1" dirty="0" smtClean="0">
+                <a:solidFill>
+                  <a:schemeClr val="tx1"/>
+                </a:solidFill>
+              </a:rPr>
+              <a:t>house names</a:t>
+            </a:r>
+            <a:r>
+              <a:rPr lang="en-US" sz="1400" dirty="0" smtClean="0">
+                <a:solidFill>
+                  <a:schemeClr val="tx1"/>
+                </a:solidFill>
+              </a:rPr>
+              <a:t> </a:t>
+            </a:r>
+            <a:r>
+              <a:rPr lang="en-US" sz="1400" dirty="0">
+                <a:solidFill>
+                  <a:schemeClr val="tx1"/>
+                </a:solidFill>
+              </a:rPr>
+              <a:t>for each road listed in </a:t>
+            </a:r>
+            <a:r>
+              <a:rPr lang="en-US" sz="1400" dirty="0" smtClean="0">
+                <a:solidFill>
+                  <a:schemeClr val="tx1"/>
+                </a:solidFill>
+              </a:rPr>
+              <a:t>OSON</a:t>
+            </a:r>
+            <a:endParaRPr lang="en-US" sz="1400" dirty="0">
+              <a:solidFill>
+                <a:schemeClr val="tx1"/>
+              </a:solidFill>
+            </a:endParaRPr>
+          </a:p>
+        </p:txBody>
+      </p:sp>
+      <p:sp>
+        <p:nvSpPr>
+          <p:cNvPr id="8" name="Rounded Rectangle 7"/>
+          <p:cNvSpPr/>
+          <p:nvPr/>
+        </p:nvSpPr>
+        <p:spPr>
+          <a:xfrm>
+            <a:off x="2091059" y="3541181"/>
+            <a:ext cx="3352800" cy="907879"/>
+          </a:xfrm>
+          <a:prstGeom prst="roundRect">
+            <a:avLst/>
+          </a:prstGeom>
+          <a:solidFill>
+            <a:schemeClr val="bg1">
+              <a:lumMod val="75000"/>
+            </a:schemeClr>
+          </a:solidFill>
+        </p:spPr>
+        <p:style>
+          <a:lnRef idx="2">
+            <a:schemeClr val="accent1">
+              <a:shade val="50000"/>
+            </a:schemeClr>
+          </a:lnRef>
+          <a:fillRef idx="1">
+            <a:schemeClr val="accent1"/>
+          </a:fillRef>
+          <a:effectRef idx="0">
+            <a:schemeClr val="accent1"/>
+          </a:effectRef>
+          <a:fontRef idx="minor">
+            <a:schemeClr val="lt1"/>
+          </a:fontRef>
+        </p:style>
+        <p:txBody>
+          <a:bodyPr rtlCol="0" anchor="ctr"/>
+          <a:lstStyle/>
+          <a:p>
+            <a:r>
+              <a:rPr lang="en-US" sz="1400" dirty="0" smtClean="0">
+                <a:solidFill>
+                  <a:schemeClr val="tx1"/>
+                </a:solidFill>
+              </a:rPr>
+              <a:t>p3: Create </a:t>
+            </a:r>
+            <a:r>
+              <a:rPr lang="en-US" sz="1400" dirty="0">
+                <a:solidFill>
+                  <a:schemeClr val="tx1"/>
+                </a:solidFill>
+              </a:rPr>
+              <a:t>a list of the associations between each of the house </a:t>
+            </a:r>
+            <a:r>
+              <a:rPr lang="en-US" sz="1400" dirty="0" smtClean="0">
+                <a:solidFill>
+                  <a:schemeClr val="tx1"/>
+                </a:solidFill>
+              </a:rPr>
+              <a:t>numbers </a:t>
+            </a:r>
+            <a:r>
+              <a:rPr lang="en-US" sz="1400" dirty="0">
+                <a:solidFill>
+                  <a:schemeClr val="tx1"/>
+                </a:solidFill>
+              </a:rPr>
+              <a:t>and names above and the list of </a:t>
+            </a:r>
+            <a:r>
+              <a:rPr lang="en-US" sz="1400" dirty="0" smtClean="0">
+                <a:solidFill>
+                  <a:schemeClr val="tx1"/>
+                </a:solidFill>
+              </a:rPr>
+              <a:t>postcodes in OSON </a:t>
+            </a:r>
+            <a:endParaRPr lang="en-US" sz="1400" dirty="0">
+              <a:solidFill>
+                <a:schemeClr val="tx1"/>
+              </a:solidFill>
+            </a:endParaRPr>
+          </a:p>
+        </p:txBody>
+      </p:sp>
+      <p:cxnSp>
+        <p:nvCxnSpPr>
+          <p:cNvPr id="10" name="Straight Arrow Connector 9"/>
+          <p:cNvCxnSpPr>
+            <a:stCxn id="5" idx="6"/>
+            <a:endCxn id="6" idx="1"/>
+          </p:cNvCxnSpPr>
+          <p:nvPr/>
+        </p:nvCxnSpPr>
+        <p:spPr>
+          <a:xfrm flipV="1">
+            <a:off x="1341609" y="2226140"/>
+            <a:ext cx="749450" cy="817908"/>
+          </a:xfrm>
+          <a:prstGeom prst="straightConnector1">
+            <a:avLst/>
+          </a:prstGeom>
+          <a:ln>
+            <a:solidFill>
+              <a:schemeClr val="tx1"/>
+            </a:solidFill>
+            <a:tailEnd type="triangle" w="lg" len="lg"/>
+          </a:ln>
+        </p:spPr>
+        <p:style>
+          <a:lnRef idx="1">
+            <a:schemeClr val="accent1"/>
+          </a:lnRef>
+          <a:fillRef idx="0">
+            <a:schemeClr val="accent1"/>
+          </a:fillRef>
+          <a:effectRef idx="0">
+            <a:schemeClr val="accent1"/>
+          </a:effectRef>
+          <a:fontRef idx="minor">
+            <a:schemeClr val="tx1"/>
+          </a:fontRef>
+        </p:style>
+      </p:cxnSp>
+      <p:cxnSp>
+        <p:nvCxnSpPr>
+          <p:cNvPr id="11" name="Straight Arrow Connector 10"/>
+          <p:cNvCxnSpPr>
+            <a:stCxn id="5" idx="6"/>
+            <a:endCxn id="7" idx="1"/>
+          </p:cNvCxnSpPr>
+          <p:nvPr/>
+        </p:nvCxnSpPr>
+        <p:spPr>
+          <a:xfrm flipV="1">
+            <a:off x="1341609" y="3032964"/>
+            <a:ext cx="749450" cy="11084"/>
+          </a:xfrm>
+          <a:prstGeom prst="straightConnector1">
+            <a:avLst/>
+          </a:prstGeom>
+          <a:ln>
+            <a:solidFill>
+              <a:schemeClr val="tx1"/>
+            </a:solidFill>
+            <a:tailEnd type="triangle" w="lg" len="lg"/>
+          </a:ln>
+        </p:spPr>
+        <p:style>
+          <a:lnRef idx="1">
+            <a:schemeClr val="accent1"/>
+          </a:lnRef>
+          <a:fillRef idx="0">
+            <a:schemeClr val="accent1"/>
+          </a:fillRef>
+          <a:effectRef idx="0">
+            <a:schemeClr val="accent1"/>
+          </a:effectRef>
+          <a:fontRef idx="minor">
+            <a:schemeClr val="tx1"/>
+          </a:fontRef>
+        </p:style>
+      </p:cxnSp>
+      <p:cxnSp>
+        <p:nvCxnSpPr>
+          <p:cNvPr id="14" name="Straight Arrow Connector 13"/>
+          <p:cNvCxnSpPr>
+            <a:stCxn id="5" idx="6"/>
+            <a:endCxn id="8" idx="1"/>
+          </p:cNvCxnSpPr>
+          <p:nvPr/>
+        </p:nvCxnSpPr>
+        <p:spPr>
+          <a:xfrm>
+            <a:off x="1341609" y="3044048"/>
+            <a:ext cx="749450" cy="951073"/>
+          </a:xfrm>
+          <a:prstGeom prst="straightConnector1">
+            <a:avLst/>
+          </a:prstGeom>
+          <a:ln>
+            <a:solidFill>
+              <a:schemeClr val="tx1"/>
+            </a:solidFill>
+            <a:tailEnd type="triangle" w="lg" len="lg"/>
+          </a:ln>
+        </p:spPr>
+        <p:style>
+          <a:lnRef idx="1">
+            <a:schemeClr val="accent1"/>
+          </a:lnRef>
+          <a:fillRef idx="0">
+            <a:schemeClr val="accent1"/>
+          </a:fillRef>
+          <a:effectRef idx="0">
+            <a:schemeClr val="accent1"/>
+          </a:effectRef>
+          <a:fontRef idx="minor">
+            <a:schemeClr val="tx1"/>
+          </a:fontRef>
+        </p:style>
+      </p:cxnSp>
+      <p:sp>
+        <p:nvSpPr>
+          <p:cNvPr id="17" name="Rounded Rectangle 16"/>
+          <p:cNvSpPr/>
+          <p:nvPr/>
+        </p:nvSpPr>
+        <p:spPr>
+          <a:xfrm>
+            <a:off x="6221996" y="1434750"/>
+            <a:ext cx="3352800" cy="713104"/>
+          </a:xfrm>
+          <a:prstGeom prst="roundRect">
+            <a:avLst/>
+          </a:prstGeom>
+          <a:solidFill>
+            <a:schemeClr val="bg1"/>
+          </a:solidFill>
+        </p:spPr>
+        <p:style>
+          <a:lnRef idx="2">
+            <a:schemeClr val="accent1">
+              <a:shade val="50000"/>
+            </a:schemeClr>
+          </a:lnRef>
+          <a:fillRef idx="1">
+            <a:schemeClr val="accent1"/>
+          </a:fillRef>
+          <a:effectRef idx="0">
+            <a:schemeClr val="accent1"/>
+          </a:effectRef>
+          <a:fontRef idx="minor">
+            <a:schemeClr val="lt1"/>
+          </a:fontRef>
+        </p:style>
+        <p:txBody>
+          <a:bodyPr rtlCol="0" anchor="ctr"/>
+          <a:lstStyle/>
+          <a:p>
+            <a:r>
+              <a:rPr lang="en-US" sz="1400" i="1" dirty="0" smtClean="0">
+                <a:solidFill>
+                  <a:schemeClr val="tx1"/>
+                </a:solidFill>
+              </a:rPr>
+              <a:t>p1.1</a:t>
+            </a:r>
+            <a:r>
+              <a:rPr lang="en-US" sz="1400" dirty="0">
+                <a:solidFill>
+                  <a:schemeClr val="tx1"/>
+                </a:solidFill>
+              </a:rPr>
+              <a:t>: Identify the list of house numbers in each OSON road through references in other open data</a:t>
+            </a:r>
+          </a:p>
+        </p:txBody>
+      </p:sp>
+      <p:sp>
+        <p:nvSpPr>
+          <p:cNvPr id="18" name="Rounded Rectangle 17"/>
+          <p:cNvSpPr/>
+          <p:nvPr/>
+        </p:nvSpPr>
+        <p:spPr>
+          <a:xfrm>
+            <a:off x="6221996" y="2509144"/>
+            <a:ext cx="3352800" cy="713104"/>
+          </a:xfrm>
+          <a:prstGeom prst="roundRect">
+            <a:avLst/>
+          </a:prstGeom>
+          <a:solidFill>
+            <a:schemeClr val="bg1"/>
+          </a:solidFill>
+        </p:spPr>
+        <p:style>
+          <a:lnRef idx="2">
+            <a:schemeClr val="accent1">
+              <a:shade val="50000"/>
+            </a:schemeClr>
+          </a:lnRef>
+          <a:fillRef idx="1">
+            <a:schemeClr val="accent1"/>
+          </a:fillRef>
+          <a:effectRef idx="0">
+            <a:schemeClr val="accent1"/>
+          </a:effectRef>
+          <a:fontRef idx="minor">
+            <a:schemeClr val="lt1"/>
+          </a:fontRef>
+        </p:style>
+        <p:txBody>
+          <a:bodyPr rtlCol="0" anchor="ctr"/>
+          <a:lstStyle/>
+          <a:p>
+            <a:r>
+              <a:rPr lang="en-US" sz="1400" i="1" smtClean="0">
+                <a:solidFill>
+                  <a:schemeClr val="tx1"/>
+                </a:solidFill>
+              </a:rPr>
+              <a:t>p1.2</a:t>
+            </a:r>
+            <a:r>
+              <a:rPr lang="en-US" sz="1400" smtClean="0">
+                <a:solidFill>
+                  <a:schemeClr val="tx1"/>
+                </a:solidFill>
+              </a:rPr>
+              <a:t>: </a:t>
+            </a:r>
+            <a:r>
+              <a:rPr lang="en-US" sz="1400" dirty="0">
+                <a:solidFill>
+                  <a:schemeClr val="tx1"/>
+                </a:solidFill>
+              </a:rPr>
+              <a:t>Statistically infer the existence of house numbers from the house numbers collected at </a:t>
+            </a:r>
+            <a:r>
+              <a:rPr lang="en-US" sz="1400" i="1" dirty="0" smtClean="0">
+                <a:solidFill>
+                  <a:schemeClr val="tx1"/>
+                </a:solidFill>
+              </a:rPr>
+              <a:t>p1.1</a:t>
+            </a:r>
+            <a:endParaRPr lang="en-US" sz="1400" i="1" dirty="0">
+              <a:solidFill>
+                <a:schemeClr val="tx1"/>
+              </a:solidFill>
+            </a:endParaRPr>
+          </a:p>
+        </p:txBody>
+      </p:sp>
+      <p:sp>
+        <p:nvSpPr>
+          <p:cNvPr id="19" name="Rounded Rectangle 18"/>
+          <p:cNvSpPr/>
+          <p:nvPr/>
+        </p:nvSpPr>
+        <p:spPr>
+          <a:xfrm>
+            <a:off x="6221996" y="4092508"/>
+            <a:ext cx="3352800" cy="713104"/>
+          </a:xfrm>
+          <a:prstGeom prst="roundRect">
+            <a:avLst/>
+          </a:prstGeom>
+          <a:solidFill>
+            <a:schemeClr val="bg1"/>
+          </a:solidFill>
+        </p:spPr>
+        <p:style>
+          <a:lnRef idx="2">
+            <a:schemeClr val="accent1">
+              <a:shade val="50000"/>
+            </a:schemeClr>
+          </a:lnRef>
+          <a:fillRef idx="1">
+            <a:schemeClr val="accent1"/>
+          </a:fillRef>
+          <a:effectRef idx="0">
+            <a:schemeClr val="accent1"/>
+          </a:effectRef>
+          <a:fontRef idx="minor">
+            <a:schemeClr val="lt1"/>
+          </a:fontRef>
+        </p:style>
+        <p:txBody>
+          <a:bodyPr rtlCol="0" anchor="ctr"/>
+          <a:lstStyle/>
+          <a:p>
+            <a:r>
+              <a:rPr lang="en-US" sz="1400" i="1" dirty="0" smtClean="0">
+                <a:solidFill>
+                  <a:schemeClr val="tx1"/>
+                </a:solidFill>
+              </a:rPr>
+              <a:t>p1.4</a:t>
+            </a:r>
+            <a:r>
+              <a:rPr lang="en-US" sz="1400" dirty="0" smtClean="0">
+                <a:solidFill>
+                  <a:schemeClr val="tx1"/>
+                </a:solidFill>
+              </a:rPr>
+              <a:t>: </a:t>
+            </a:r>
+            <a:r>
+              <a:rPr lang="en-US" sz="1400" dirty="0">
+                <a:solidFill>
+                  <a:schemeClr val="tx1"/>
+                </a:solidFill>
+              </a:rPr>
+              <a:t>Enable the further application of </a:t>
+            </a:r>
+            <a:r>
+              <a:rPr lang="en-US" sz="1400" i="1" dirty="0" smtClean="0">
+                <a:solidFill>
+                  <a:schemeClr val="tx1"/>
+                </a:solidFill>
+              </a:rPr>
+              <a:t>p1.2</a:t>
+            </a:r>
+            <a:r>
+              <a:rPr lang="en-US" sz="1400" dirty="0" smtClean="0">
+                <a:solidFill>
+                  <a:schemeClr val="tx1"/>
+                </a:solidFill>
+              </a:rPr>
+              <a:t> </a:t>
+            </a:r>
+            <a:r>
+              <a:rPr lang="en-US" sz="1400" dirty="0">
+                <a:solidFill>
+                  <a:schemeClr val="tx1"/>
+                </a:solidFill>
+              </a:rPr>
+              <a:t>by creating the necessary data through </a:t>
+            </a:r>
+            <a:r>
+              <a:rPr lang="en-US" sz="1400" dirty="0" smtClean="0">
+                <a:solidFill>
+                  <a:schemeClr val="tx1"/>
+                </a:solidFill>
+              </a:rPr>
+              <a:t>crowdsourcing</a:t>
+            </a:r>
+            <a:endParaRPr lang="en-US" sz="1400" i="1" dirty="0">
+              <a:solidFill>
+                <a:schemeClr val="tx1"/>
+              </a:solidFill>
+            </a:endParaRPr>
+          </a:p>
+        </p:txBody>
+      </p:sp>
+      <p:sp>
+        <p:nvSpPr>
+          <p:cNvPr id="20" name="Rounded Rectangle 19"/>
+          <p:cNvSpPr/>
+          <p:nvPr/>
+        </p:nvSpPr>
+        <p:spPr>
+          <a:xfrm>
+            <a:off x="6221996" y="3517609"/>
+            <a:ext cx="3352800" cy="304812"/>
+          </a:xfrm>
+          <a:prstGeom prst="roundRect">
+            <a:avLst/>
+          </a:prstGeom>
+          <a:solidFill>
+            <a:schemeClr val="bg1">
+              <a:lumMod val="75000"/>
+            </a:schemeClr>
+          </a:solidFill>
+        </p:spPr>
+        <p:style>
+          <a:lnRef idx="2">
+            <a:schemeClr val="accent1">
+              <a:shade val="50000"/>
+            </a:schemeClr>
+          </a:lnRef>
+          <a:fillRef idx="1">
+            <a:schemeClr val="accent1"/>
+          </a:fillRef>
+          <a:effectRef idx="0">
+            <a:schemeClr val="accent1"/>
+          </a:effectRef>
+          <a:fontRef idx="minor">
+            <a:schemeClr val="lt1"/>
+          </a:fontRef>
+        </p:style>
+        <p:txBody>
+          <a:bodyPr rtlCol="0" anchor="ctr"/>
+          <a:lstStyle/>
+          <a:p>
+            <a:r>
+              <a:rPr lang="en-US" sz="1400" i="1" dirty="0" smtClean="0">
+                <a:solidFill>
+                  <a:schemeClr val="tx1"/>
+                </a:solidFill>
+              </a:rPr>
+              <a:t>p1.3</a:t>
+            </a:r>
+            <a:r>
+              <a:rPr lang="en-US" sz="1400" dirty="0" smtClean="0">
+                <a:solidFill>
+                  <a:schemeClr val="tx1"/>
+                </a:solidFill>
+              </a:rPr>
+              <a:t>: </a:t>
+            </a:r>
+            <a:r>
+              <a:rPr lang="en-US" sz="1400" dirty="0">
+                <a:solidFill>
+                  <a:schemeClr val="tx1"/>
+                </a:solidFill>
+              </a:rPr>
+              <a:t>Correct the output of </a:t>
+            </a:r>
+            <a:r>
+              <a:rPr lang="en-US" sz="1400" i="1" dirty="0" smtClean="0">
+                <a:solidFill>
+                  <a:schemeClr val="tx1"/>
+                </a:solidFill>
+              </a:rPr>
+              <a:t>p1.2</a:t>
+            </a:r>
+            <a:endParaRPr lang="en-US" sz="1400" i="1" dirty="0">
+              <a:solidFill>
+                <a:schemeClr val="tx1"/>
+              </a:solidFill>
+            </a:endParaRPr>
+          </a:p>
+        </p:txBody>
+      </p:sp>
+      <p:cxnSp>
+        <p:nvCxnSpPr>
+          <p:cNvPr id="21" name="Straight Arrow Connector 20"/>
+          <p:cNvCxnSpPr>
+            <a:stCxn id="6" idx="3"/>
+            <a:endCxn id="17" idx="1"/>
+          </p:cNvCxnSpPr>
+          <p:nvPr/>
+        </p:nvCxnSpPr>
+        <p:spPr>
+          <a:xfrm flipV="1">
+            <a:off x="5443859" y="1791302"/>
+            <a:ext cx="778137" cy="434838"/>
+          </a:xfrm>
+          <a:prstGeom prst="straightConnector1">
+            <a:avLst/>
+          </a:prstGeom>
+          <a:ln>
+            <a:solidFill>
+              <a:schemeClr val="tx1"/>
+            </a:solidFill>
+            <a:tailEnd type="triangle" w="lg" len="lg"/>
+          </a:ln>
+        </p:spPr>
+        <p:style>
+          <a:lnRef idx="1">
+            <a:schemeClr val="accent1"/>
+          </a:lnRef>
+          <a:fillRef idx="0">
+            <a:schemeClr val="accent1"/>
+          </a:fillRef>
+          <a:effectRef idx="0">
+            <a:schemeClr val="accent1"/>
+          </a:effectRef>
+          <a:fontRef idx="minor">
+            <a:schemeClr val="tx1"/>
+          </a:fontRef>
+        </p:style>
+      </p:cxnSp>
+      <p:cxnSp>
+        <p:nvCxnSpPr>
+          <p:cNvPr id="24" name="Straight Arrow Connector 23"/>
+          <p:cNvCxnSpPr>
+            <a:stCxn id="6" idx="3"/>
+            <a:endCxn id="18" idx="1"/>
+          </p:cNvCxnSpPr>
+          <p:nvPr/>
+        </p:nvCxnSpPr>
+        <p:spPr>
+          <a:xfrm>
+            <a:off x="5443859" y="2226140"/>
+            <a:ext cx="778137" cy="639556"/>
+          </a:xfrm>
+          <a:prstGeom prst="straightConnector1">
+            <a:avLst/>
+          </a:prstGeom>
+          <a:ln>
+            <a:solidFill>
+              <a:schemeClr val="tx1"/>
+            </a:solidFill>
+            <a:tailEnd type="triangle" w="lg" len="lg"/>
+          </a:ln>
+        </p:spPr>
+        <p:style>
+          <a:lnRef idx="1">
+            <a:schemeClr val="accent1"/>
+          </a:lnRef>
+          <a:fillRef idx="0">
+            <a:schemeClr val="accent1"/>
+          </a:fillRef>
+          <a:effectRef idx="0">
+            <a:schemeClr val="accent1"/>
+          </a:effectRef>
+          <a:fontRef idx="minor">
+            <a:schemeClr val="tx1"/>
+          </a:fontRef>
+        </p:style>
+      </p:cxnSp>
+      <p:cxnSp>
+        <p:nvCxnSpPr>
+          <p:cNvPr id="27" name="Straight Arrow Connector 26"/>
+          <p:cNvCxnSpPr>
+            <a:stCxn id="6" idx="3"/>
+            <a:endCxn id="19" idx="1"/>
+          </p:cNvCxnSpPr>
+          <p:nvPr/>
+        </p:nvCxnSpPr>
+        <p:spPr>
+          <a:xfrm>
+            <a:off x="5443859" y="2226140"/>
+            <a:ext cx="778137" cy="2222920"/>
+          </a:xfrm>
+          <a:prstGeom prst="straightConnector1">
+            <a:avLst/>
+          </a:prstGeom>
+          <a:ln>
+            <a:solidFill>
+              <a:schemeClr val="tx1"/>
+            </a:solidFill>
+            <a:tailEnd type="triangle" w="lg" len="lg"/>
+          </a:ln>
+        </p:spPr>
+        <p:style>
+          <a:lnRef idx="1">
+            <a:schemeClr val="accent1"/>
+          </a:lnRef>
+          <a:fillRef idx="0">
+            <a:schemeClr val="accent1"/>
+          </a:fillRef>
+          <a:effectRef idx="0">
+            <a:schemeClr val="accent1"/>
+          </a:effectRef>
+          <a:fontRef idx="minor">
+            <a:schemeClr val="tx1"/>
+          </a:fontRef>
+        </p:style>
+      </p:cxnSp>
+      <p:cxnSp>
+        <p:nvCxnSpPr>
+          <p:cNvPr id="30" name="Straight Arrow Connector 29"/>
+          <p:cNvCxnSpPr>
+            <a:stCxn id="6" idx="3"/>
+            <a:endCxn id="20" idx="1"/>
+          </p:cNvCxnSpPr>
+          <p:nvPr/>
+        </p:nvCxnSpPr>
+        <p:spPr>
+          <a:xfrm>
+            <a:off x="5443859" y="2226140"/>
+            <a:ext cx="778137" cy="1443875"/>
+          </a:xfrm>
+          <a:prstGeom prst="straightConnector1">
+            <a:avLst/>
+          </a:prstGeom>
+          <a:ln>
+            <a:solidFill>
+              <a:schemeClr val="tx1"/>
+            </a:solidFill>
+            <a:tailEnd type="triangle" w="lg" len="lg"/>
+          </a:ln>
+        </p:spPr>
+        <p:style>
+          <a:lnRef idx="1">
+            <a:schemeClr val="accent1"/>
+          </a:lnRef>
+          <a:fillRef idx="0">
+            <a:schemeClr val="accent1"/>
+          </a:fillRef>
+          <a:effectRef idx="0">
+            <a:schemeClr val="accent1"/>
+          </a:effectRef>
+          <a:fontRef idx="minor">
+            <a:schemeClr val="tx1"/>
+          </a:fontRef>
+        </p:style>
+      </p:cxnSp>
+      <p:cxnSp>
+        <p:nvCxnSpPr>
+          <p:cNvPr id="38" name="Straight Arrow Connector 37"/>
+          <p:cNvCxnSpPr>
+            <a:stCxn id="17" idx="2"/>
+            <a:endCxn id="18" idx="0"/>
+          </p:cNvCxnSpPr>
+          <p:nvPr/>
+        </p:nvCxnSpPr>
+        <p:spPr>
+          <a:xfrm>
+            <a:off x="7898396" y="2147854"/>
+            <a:ext cx="0" cy="361290"/>
+          </a:xfrm>
+          <a:prstGeom prst="straightConnector1">
+            <a:avLst/>
+          </a:prstGeom>
+          <a:ln>
+            <a:solidFill>
+              <a:schemeClr val="tx1"/>
+            </a:solidFill>
+            <a:tailEnd type="triangle" w="lg" len="lg"/>
+          </a:ln>
+        </p:spPr>
+        <p:style>
+          <a:lnRef idx="1">
+            <a:schemeClr val="accent1"/>
+          </a:lnRef>
+          <a:fillRef idx="0">
+            <a:schemeClr val="accent1"/>
+          </a:fillRef>
+          <a:effectRef idx="0">
+            <a:schemeClr val="accent1"/>
+          </a:effectRef>
+          <a:fontRef idx="minor">
+            <a:schemeClr val="tx1"/>
+          </a:fontRef>
+        </p:style>
+      </p:cxnSp>
+      <p:cxnSp>
+        <p:nvCxnSpPr>
+          <p:cNvPr id="46" name="Elbow Connector 45"/>
+          <p:cNvCxnSpPr>
+            <a:stCxn id="19" idx="3"/>
+            <a:endCxn id="18" idx="3"/>
+          </p:cNvCxnSpPr>
+          <p:nvPr/>
+        </p:nvCxnSpPr>
+        <p:spPr>
+          <a:xfrm flipV="1">
+            <a:off x="9574796" y="2865696"/>
+            <a:ext cx="12700" cy="1583364"/>
+          </a:xfrm>
+          <a:prstGeom prst="bentConnector3">
+            <a:avLst>
+              <a:gd name="adj1" fmla="val 2890906"/>
+            </a:avLst>
+          </a:prstGeom>
+          <a:ln>
+            <a:solidFill>
+              <a:schemeClr val="tx1"/>
+            </a:solidFill>
+            <a:tailEnd type="triangle" w="lg" len="lg"/>
+          </a:ln>
+        </p:spPr>
+        <p:style>
+          <a:lnRef idx="1">
+            <a:schemeClr val="accent1"/>
+          </a:lnRef>
+          <a:fillRef idx="0">
+            <a:schemeClr val="accent1"/>
+          </a:fillRef>
+          <a:effectRef idx="0">
+            <a:schemeClr val="accent1"/>
+          </a:effectRef>
+          <a:fontRef idx="minor">
+            <a:schemeClr val="tx1"/>
+          </a:fontRef>
+        </p:style>
+      </p:cxnSp>
+      <p:cxnSp>
+        <p:nvCxnSpPr>
+          <p:cNvPr id="49" name="Straight Arrow Connector 48"/>
+          <p:cNvCxnSpPr>
+            <a:stCxn id="18" idx="2"/>
+            <a:endCxn id="20" idx="0"/>
+          </p:cNvCxnSpPr>
+          <p:nvPr/>
+        </p:nvCxnSpPr>
+        <p:spPr>
+          <a:xfrm>
+            <a:off x="7898396" y="3222248"/>
+            <a:ext cx="0" cy="295361"/>
+          </a:xfrm>
+          <a:prstGeom prst="straightConnector1">
+            <a:avLst/>
+          </a:prstGeom>
+          <a:ln>
+            <a:solidFill>
+              <a:schemeClr val="tx1"/>
+            </a:solidFill>
+            <a:tailEnd type="triangle" w="lg" len="lg"/>
+          </a:ln>
+        </p:spPr>
+        <p:style>
+          <a:lnRef idx="1">
+            <a:schemeClr val="accent1"/>
+          </a:lnRef>
+          <a:fillRef idx="0">
+            <a:schemeClr val="accent1"/>
+          </a:fillRef>
+          <a:effectRef idx="0">
+            <a:schemeClr val="accent1"/>
+          </a:effectRef>
+          <a:fontRef idx="minor">
+            <a:schemeClr val="tx1"/>
+          </a:fontRef>
+        </p:style>
+      </p:cxnSp>
+    </p:spTree>
+    <p:extLst>
+      <p:ext uri="{BB962C8B-B14F-4D97-AF65-F5344CB8AC3E}">
+        <p14:creationId xmlns:p14="http://schemas.microsoft.com/office/powerpoint/2010/main" val="936007067"/>
+      </p:ext>
+    </p:extLst>
+  </p:cSld>
+  <p:clrMapOvr>
+    <a:masterClrMapping/>
+  </p:clrMapOvr>
 </p:sld>
 </file>
 

</xml_diff>

<commit_message>
Fixed the font for consistency with LaTeX
</commit_message>
<xml_diff>
--- a/images_src/misc_powerpoint.pptx
+++ b/images_src/misc_powerpoint.pptx
@@ -201,7 +201,7 @@
           <a:p>
             <a:fld id="{8A2C6B5F-9BC6-4B49-8DDC-1983D75D835F}" type="datetimeFigureOut">
               <a:rPr lang="en-US" smtClean="0"/>
-              <a:t>1/3/16</a:t>
+              <a:t>1/4/16</a:t>
             </a:fld>
             <a:endParaRPr lang="en-US"/>
           </a:p>
@@ -826,7 +826,7 @@
           <a:p>
             <a:fld id="{70491AAC-A65D-7044-B83C-B384503BD135}" type="datetimeFigureOut">
               <a:rPr lang="en-US" smtClean="0"/>
-              <a:t>1/3/16</a:t>
+              <a:t>1/4/16</a:t>
             </a:fld>
             <a:endParaRPr lang="en-US"/>
           </a:p>
@@ -996,7 +996,7 @@
           <a:p>
             <a:fld id="{70491AAC-A65D-7044-B83C-B384503BD135}" type="datetimeFigureOut">
               <a:rPr lang="en-US" smtClean="0"/>
-              <a:t>1/3/16</a:t>
+              <a:t>1/4/16</a:t>
             </a:fld>
             <a:endParaRPr lang="en-US"/>
           </a:p>
@@ -1176,7 +1176,7 @@
           <a:p>
             <a:fld id="{70491AAC-A65D-7044-B83C-B384503BD135}" type="datetimeFigureOut">
               <a:rPr lang="en-US" smtClean="0"/>
-              <a:t>1/3/16</a:t>
+              <a:t>1/4/16</a:t>
             </a:fld>
             <a:endParaRPr lang="en-US"/>
           </a:p>
@@ -1346,7 +1346,7 @@
           <a:p>
             <a:fld id="{70491AAC-A65D-7044-B83C-B384503BD135}" type="datetimeFigureOut">
               <a:rPr lang="en-US" smtClean="0"/>
-              <a:t>1/3/16</a:t>
+              <a:t>1/4/16</a:t>
             </a:fld>
             <a:endParaRPr lang="en-US"/>
           </a:p>
@@ -1592,7 +1592,7 @@
           <a:p>
             <a:fld id="{70491AAC-A65D-7044-B83C-B384503BD135}" type="datetimeFigureOut">
               <a:rPr lang="en-US" smtClean="0"/>
-              <a:t>1/3/16</a:t>
+              <a:t>1/4/16</a:t>
             </a:fld>
             <a:endParaRPr lang="en-US"/>
           </a:p>
@@ -1824,7 +1824,7 @@
           <a:p>
             <a:fld id="{70491AAC-A65D-7044-B83C-B384503BD135}" type="datetimeFigureOut">
               <a:rPr lang="en-US" smtClean="0"/>
-              <a:t>1/3/16</a:t>
+              <a:t>1/4/16</a:t>
             </a:fld>
             <a:endParaRPr lang="en-US"/>
           </a:p>
@@ -2191,7 +2191,7 @@
           <a:p>
             <a:fld id="{70491AAC-A65D-7044-B83C-B384503BD135}" type="datetimeFigureOut">
               <a:rPr lang="en-US" smtClean="0"/>
-              <a:t>1/3/16</a:t>
+              <a:t>1/4/16</a:t>
             </a:fld>
             <a:endParaRPr lang="en-US"/>
           </a:p>
@@ -2309,7 +2309,7 @@
           <a:p>
             <a:fld id="{70491AAC-A65D-7044-B83C-B384503BD135}" type="datetimeFigureOut">
               <a:rPr lang="en-US" smtClean="0"/>
-              <a:t>1/3/16</a:t>
+              <a:t>1/4/16</a:t>
             </a:fld>
             <a:endParaRPr lang="en-US"/>
           </a:p>
@@ -2404,7 +2404,7 @@
           <a:p>
             <a:fld id="{70491AAC-A65D-7044-B83C-B384503BD135}" type="datetimeFigureOut">
               <a:rPr lang="en-US" smtClean="0"/>
-              <a:t>1/3/16</a:t>
+              <a:t>1/4/16</a:t>
             </a:fld>
             <a:endParaRPr lang="en-US"/>
           </a:p>
@@ -2681,7 +2681,7 @@
           <a:p>
             <a:fld id="{70491AAC-A65D-7044-B83C-B384503BD135}" type="datetimeFigureOut">
               <a:rPr lang="en-US" smtClean="0"/>
-              <a:t>1/3/16</a:t>
+              <a:t>1/4/16</a:t>
             </a:fld>
             <a:endParaRPr lang="en-US"/>
           </a:p>
@@ -2934,7 +2934,7 @@
           <a:p>
             <a:fld id="{70491AAC-A65D-7044-B83C-B384503BD135}" type="datetimeFigureOut">
               <a:rPr lang="en-US" smtClean="0"/>
-              <a:t>1/3/16</a:t>
+              <a:t>1/4/16</a:t>
             </a:fld>
             <a:endParaRPr lang="en-US"/>
           </a:p>
@@ -3147,7 +3147,7 @@
           <a:p>
             <a:fld id="{70491AAC-A65D-7044-B83C-B384503BD135}" type="datetimeFigureOut">
               <a:rPr lang="en-US" smtClean="0"/>
-              <a:t>1/3/16</a:t>
+              <a:t>1/4/16</a:t>
             </a:fld>
             <a:endParaRPr lang="en-US"/>
           </a:p>
@@ -5010,13 +5010,13 @@
       </p:grpSpPr>
       <p:sp>
         <p:nvSpPr>
-          <p:cNvPr id="5" name="Oval 4"/>
+          <p:cNvPr id="16" name="Oval 15"/>
           <p:cNvSpPr/>
           <p:nvPr/>
         </p:nvSpPr>
         <p:spPr>
           <a:xfrm>
-            <a:off x="534785" y="2640636"/>
+            <a:off x="3739425" y="2879648"/>
             <a:ext cx="806824" cy="806824"/>
           </a:xfrm>
           <a:prstGeom prst="ellipse">
@@ -5048,35 +5048,41 @@
           </a:fontRef>
         </p:style>
         <p:txBody>
-          <a:bodyPr rtlCol="0" anchor="ctr"/>
+          <a:bodyPr lIns="0" tIns="0" rIns="0" bIns="0" rtlCol="0" anchor="ctr"/>
           <a:lstStyle/>
           <a:p>
             <a:pPr algn="ctr"/>
             <a:r>
-              <a:rPr lang="en-US" sz="1400" dirty="0" smtClean="0">
+              <a:rPr lang="en-US" sz="1200" dirty="0" smtClean="0">
                 <a:solidFill>
                   <a:schemeClr val="tx1"/>
                 </a:solidFill>
+                <a:latin typeface="CMU Typewriter Text Variable Width Medium" charset="0"/>
+                <a:ea typeface="CMU Typewriter Text Variable Width Medium" charset="0"/>
+                <a:cs typeface="CMU Typewriter Text Variable Width Medium" charset="0"/>
               </a:rPr>
               <a:t>OLAF</a:t>
             </a:r>
-            <a:endParaRPr lang="en-US" sz="1400" dirty="0">
+            <a:endParaRPr lang="en-US" sz="1200" dirty="0">
               <a:solidFill>
                 <a:schemeClr val="tx1"/>
               </a:solidFill>
+              <a:latin typeface="CMU Typewriter Text Variable Width Medium" charset="0"/>
+              <a:ea typeface="CMU Typewriter Text Variable Width Medium" charset="0"/>
+              <a:cs typeface="CMU Typewriter Text Variable Width Medium" charset="0"/>
             </a:endParaRPr>
           </a:p>
         </p:txBody>
       </p:sp>
       <p:sp>
         <p:nvSpPr>
-          <p:cNvPr id="6" name="Rounded Rectangle 5"/>
+          <p:cNvPr id="17" name="Rounded Rectangle 16"/>
           <p:cNvSpPr/>
           <p:nvPr/>
         </p:nvSpPr>
         <p:spPr>
           <a:xfrm>
-            <a:off x="2091059" y="1927533"/>
+            <a:off x="5295699" y="2166545"/>
             <a:ext cx="3352800" cy="597213"/>
           </a:xfrm>
           <a:prstGeom prst="roundRect">
@@ -5112,42 +5118,57 @@
           <a:lstStyle/>
           <a:p>
             <a:r>
-              <a:rPr lang="en-US" sz="1400" i="1" dirty="0" smtClean="0">
+              <a:rPr lang="en-US" sz="1200" i="1" dirty="0" smtClean="0">
                 <a:solidFill>
                   <a:schemeClr val="tx1"/>
                 </a:solidFill>
+                <a:latin typeface="CMU Typewriter Text Variable Width Medium" charset="0"/>
+                <a:ea typeface="CMU Typewriter Text Variable Width Medium" charset="0"/>
+                <a:cs typeface="CMU Typewriter Text Variable Width Medium" charset="0"/>
               </a:rPr>
               <a:t>p1</a:t>
             </a:r>
             <a:r>
-              <a:rPr lang="en-US" sz="1400" dirty="0" smtClean="0">
+              <a:rPr lang="en-US" sz="1200" dirty="0" smtClean="0">
                 <a:solidFill>
                   <a:schemeClr val="tx1"/>
                 </a:solidFill>
+                <a:latin typeface="CMU Typewriter Text Variable Width Medium" charset="0"/>
+                <a:ea typeface="CMU Typewriter Text Variable Width Medium" charset="0"/>
+                <a:cs typeface="CMU Typewriter Text Variable Width Medium" charset="0"/>
               </a:rPr>
               <a:t>: Create </a:t>
             </a:r>
             <a:r>
-              <a:rPr lang="en-US" sz="1400" dirty="0">
+              <a:rPr lang="en-US" sz="1200" dirty="0">
                 <a:solidFill>
                   <a:schemeClr val="tx1"/>
                 </a:solidFill>
+                <a:latin typeface="CMU Typewriter Text Variable Width Medium" charset="0"/>
+                <a:ea typeface="CMU Typewriter Text Variable Width Medium" charset="0"/>
+                <a:cs typeface="CMU Typewriter Text Variable Width Medium" charset="0"/>
               </a:rPr>
               <a:t>a list of all existing </a:t>
             </a:r>
             <a:r>
-              <a:rPr lang="en-US" sz="1400" i="1" dirty="0" smtClean="0">
+              <a:rPr lang="en-US" sz="1200" i="1" dirty="0" smtClean="0">
                 <a:solidFill>
                   <a:schemeClr val="tx1"/>
                 </a:solidFill>
+                <a:latin typeface="CMU Typewriter Text Variable Width Medium" charset="0"/>
+                <a:ea typeface="CMU Typewriter Text Variable Width Medium" charset="0"/>
+                <a:cs typeface="CMU Typewriter Text Variable Width Medium" charset="0"/>
               </a:rPr>
               <a:t>house numbers </a:t>
             </a:r>
             <a:r>
-              <a:rPr lang="en-US" sz="1400" dirty="0">
+              <a:rPr lang="en-US" sz="1200" dirty="0">
                 <a:solidFill>
                   <a:schemeClr val="tx1"/>
                 </a:solidFill>
+                <a:latin typeface="CMU Typewriter Text Variable Width Medium" charset="0"/>
+                <a:ea typeface="CMU Typewriter Text Variable Width Medium" charset="0"/>
+                <a:cs typeface="CMU Typewriter Text Variable Width Medium" charset="0"/>
               </a:rPr>
               <a:t>for each road listed in OSON</a:t>
             </a:r>
@@ -5156,13 +5177,13 @@
       </p:sp>
       <p:sp>
         <p:nvSpPr>
-          <p:cNvPr id="7" name="Rounded Rectangle 6"/>
+          <p:cNvPr id="18" name="Rounded Rectangle 17"/>
           <p:cNvSpPr/>
           <p:nvPr/>
         </p:nvSpPr>
         <p:spPr>
           <a:xfrm>
-            <a:off x="2091059" y="2734357"/>
+            <a:off x="5295699" y="2973369"/>
             <a:ext cx="3352800" cy="597213"/>
           </a:xfrm>
           <a:prstGeom prst="roundRect">
@@ -5198,78 +5219,102 @@
           <a:lstStyle/>
           <a:p>
             <a:r>
-              <a:rPr lang="en-US" sz="1400" i="1" dirty="0" smtClean="0">
+              <a:rPr lang="en-US" sz="1200" i="1" dirty="0" smtClean="0">
                 <a:solidFill>
                   <a:schemeClr val="tx1"/>
                 </a:solidFill>
+                <a:latin typeface="CMU Typewriter Text Variable Width Medium" charset="0"/>
+                <a:ea typeface="CMU Typewriter Text Variable Width Medium" charset="0"/>
+                <a:cs typeface="CMU Typewriter Text Variable Width Medium" charset="0"/>
               </a:rPr>
               <a:t>p2</a:t>
             </a:r>
             <a:r>
-              <a:rPr lang="en-US" sz="1400" dirty="0" smtClean="0">
+              <a:rPr lang="en-US" sz="1200" dirty="0" smtClean="0">
                 <a:solidFill>
                   <a:schemeClr val="tx1"/>
                 </a:solidFill>
+                <a:latin typeface="CMU Typewriter Text Variable Width Medium" charset="0"/>
+                <a:ea typeface="CMU Typewriter Text Variable Width Medium" charset="0"/>
+                <a:cs typeface="CMU Typewriter Text Variable Width Medium" charset="0"/>
               </a:rPr>
               <a:t>: Create </a:t>
             </a:r>
             <a:r>
-              <a:rPr lang="en-US" sz="1400" dirty="0">
+              <a:rPr lang="en-US" sz="1200" dirty="0">
                 <a:solidFill>
                   <a:schemeClr val="tx1"/>
                 </a:solidFill>
+                <a:latin typeface="CMU Typewriter Text Variable Width Medium" charset="0"/>
+                <a:ea typeface="CMU Typewriter Text Variable Width Medium" charset="0"/>
+                <a:cs typeface="CMU Typewriter Text Variable Width Medium" charset="0"/>
               </a:rPr>
               <a:t>a list of all existing </a:t>
             </a:r>
             <a:r>
-              <a:rPr lang="en-US" sz="1400" i="1" dirty="0" smtClean="0">
+              <a:rPr lang="en-US" sz="1200" i="1" dirty="0" smtClean="0">
                 <a:solidFill>
                   <a:schemeClr val="tx1"/>
                 </a:solidFill>
+                <a:latin typeface="CMU Typewriter Text Variable Width Medium" charset="0"/>
+                <a:ea typeface="CMU Typewriter Text Variable Width Medium" charset="0"/>
+                <a:cs typeface="CMU Typewriter Text Variable Width Medium" charset="0"/>
               </a:rPr>
               <a:t>house names</a:t>
             </a:r>
             <a:r>
-              <a:rPr lang="en-US" sz="1400" dirty="0" smtClean="0">
+              <a:rPr lang="en-US" sz="1200" dirty="0" smtClean="0">
                 <a:solidFill>
                   <a:schemeClr val="tx1"/>
                 </a:solidFill>
+                <a:latin typeface="CMU Typewriter Text Variable Width Medium" charset="0"/>
+                <a:ea typeface="CMU Typewriter Text Variable Width Medium" charset="0"/>
+                <a:cs typeface="CMU Typewriter Text Variable Width Medium" charset="0"/>
               </a:rPr>
               <a:t> </a:t>
             </a:r>
             <a:r>
-              <a:rPr lang="en-US" sz="1400" dirty="0">
+              <a:rPr lang="en-US" sz="1200" dirty="0">
                 <a:solidFill>
                   <a:schemeClr val="tx1"/>
                 </a:solidFill>
+                <a:latin typeface="CMU Typewriter Text Variable Width Medium" charset="0"/>
+                <a:ea typeface="CMU Typewriter Text Variable Width Medium" charset="0"/>
+                <a:cs typeface="CMU Typewriter Text Variable Width Medium" charset="0"/>
               </a:rPr>
               <a:t>for each road listed in </a:t>
             </a:r>
             <a:r>
-              <a:rPr lang="en-US" sz="1400" dirty="0" smtClean="0">
+              <a:rPr lang="en-US" sz="1200" dirty="0" smtClean="0">
                 <a:solidFill>
                   <a:schemeClr val="tx1"/>
                 </a:solidFill>
+                <a:latin typeface="CMU Typewriter Text Variable Width Medium" charset="0"/>
+                <a:ea typeface="CMU Typewriter Text Variable Width Medium" charset="0"/>
+                <a:cs typeface="CMU Typewriter Text Variable Width Medium" charset="0"/>
               </a:rPr>
               <a:t>OSON</a:t>
             </a:r>
-            <a:endParaRPr lang="en-US" sz="1400" dirty="0">
+            <a:endParaRPr lang="en-US" sz="1200" dirty="0">
               <a:solidFill>
                 <a:schemeClr val="tx1"/>
               </a:solidFill>
+              <a:latin typeface="CMU Typewriter Text Variable Width Medium" charset="0"/>
+              <a:ea typeface="CMU Typewriter Text Variable Width Medium" charset="0"/>
+              <a:cs typeface="CMU Typewriter Text Variable Width Medium" charset="0"/>
             </a:endParaRPr>
           </a:p>
         </p:txBody>
       </p:sp>
       <p:sp>
         <p:nvSpPr>
-          <p:cNvPr id="8" name="Rounded Rectangle 7"/>
+          <p:cNvPr id="19" name="Rounded Rectangle 18"/>
           <p:cNvSpPr/>
           <p:nvPr/>
         </p:nvSpPr>
         <p:spPr>
           <a:xfrm>
-            <a:off x="2091059" y="3541181"/>
+            <a:off x="5295699" y="3780193"/>
             <a:ext cx="3352800" cy="907879"/>
           </a:xfrm>
           <a:prstGeom prst="roundRect">
@@ -5305,65 +5350,83 @@
           <a:lstStyle/>
           <a:p>
             <a:r>
-              <a:rPr lang="en-US" sz="1400" dirty="0" smtClean="0">
+              <a:rPr lang="en-US" sz="1200" dirty="0" smtClean="0">
                 <a:solidFill>
                   <a:schemeClr val="tx1"/>
                 </a:solidFill>
+                <a:latin typeface="CMU Typewriter Text Variable Width Medium" charset="0"/>
+                <a:ea typeface="CMU Typewriter Text Variable Width Medium" charset="0"/>
+                <a:cs typeface="CMU Typewriter Text Variable Width Medium" charset="0"/>
               </a:rPr>
               <a:t>p3: Create </a:t>
             </a:r>
             <a:r>
-              <a:rPr lang="en-US" sz="1400" dirty="0">
+              <a:rPr lang="en-US" sz="1200" dirty="0">
                 <a:solidFill>
                   <a:schemeClr val="tx1"/>
                 </a:solidFill>
+                <a:latin typeface="CMU Typewriter Text Variable Width Medium" charset="0"/>
+                <a:ea typeface="CMU Typewriter Text Variable Width Medium" charset="0"/>
+                <a:cs typeface="CMU Typewriter Text Variable Width Medium" charset="0"/>
               </a:rPr>
               <a:t>a list of the associations between each of the house </a:t>
             </a:r>
             <a:r>
-              <a:rPr lang="en-US" sz="1400" dirty="0" smtClean="0">
+              <a:rPr lang="en-US" sz="1200" dirty="0" smtClean="0">
                 <a:solidFill>
                   <a:schemeClr val="tx1"/>
                 </a:solidFill>
+                <a:latin typeface="CMU Typewriter Text Variable Width Medium" charset="0"/>
+                <a:ea typeface="CMU Typewriter Text Variable Width Medium" charset="0"/>
+                <a:cs typeface="CMU Typewriter Text Variable Width Medium" charset="0"/>
               </a:rPr>
               <a:t>numbers </a:t>
             </a:r>
             <a:r>
-              <a:rPr lang="en-US" sz="1400" dirty="0">
+              <a:rPr lang="en-US" sz="1200" dirty="0">
                 <a:solidFill>
                   <a:schemeClr val="tx1"/>
                 </a:solidFill>
+                <a:latin typeface="CMU Typewriter Text Variable Width Medium" charset="0"/>
+                <a:ea typeface="CMU Typewriter Text Variable Width Medium" charset="0"/>
+                <a:cs typeface="CMU Typewriter Text Variable Width Medium" charset="0"/>
               </a:rPr>
               <a:t>and names above and the list of </a:t>
             </a:r>
             <a:r>
-              <a:rPr lang="en-US" sz="1400" dirty="0" smtClean="0">
+              <a:rPr lang="en-US" sz="1200" dirty="0" smtClean="0">
                 <a:solidFill>
                   <a:schemeClr val="tx1"/>
                 </a:solidFill>
+                <a:latin typeface="CMU Typewriter Text Variable Width Medium" charset="0"/>
+                <a:ea typeface="CMU Typewriter Text Variable Width Medium" charset="0"/>
+                <a:cs typeface="CMU Typewriter Text Variable Width Medium" charset="0"/>
               </a:rPr>
               <a:t>postcodes in OSON </a:t>
             </a:r>
-            <a:endParaRPr lang="en-US" sz="1400" dirty="0">
+            <a:endParaRPr lang="en-US" sz="1200" dirty="0">
               <a:solidFill>
                 <a:schemeClr val="tx1"/>
               </a:solidFill>
+              <a:latin typeface="CMU Typewriter Text Variable Width Medium" charset="0"/>
+              <a:ea typeface="CMU Typewriter Text Variable Width Medium" charset="0"/>
+              <a:cs typeface="CMU Typewriter Text Variable Width Medium" charset="0"/>
             </a:endParaRPr>
           </a:p>
         </p:txBody>
       </p:sp>
       <p:cxnSp>
         <p:nvCxnSpPr>
-          <p:cNvPr id="10" name="Straight Arrow Connector 9"/>
+          <p:cNvPr id="20" name="Straight Arrow Connector 19"/>
           <p:cNvCxnSpPr>
-            <a:stCxn id="5" idx="6"/>
-            <a:endCxn id="6" idx="1"/>
+            <a:stCxn id="19" idx="6"/>
+            <a:endCxn id="20" idx="1"/>
           </p:cNvCxnSpPr>
           <p:nvPr/>
         </p:nvCxnSpPr>
         <p:spPr>
           <a:xfrm flipV="1">
-            <a:off x="1341609" y="2226140"/>
+            <a:off x="4546249" y="2465152"/>
             <a:ext cx="749450" cy="817908"/>
           </a:xfrm>
           <a:prstGeom prst="straightConnector1">
@@ -5393,16 +5456,16 @@
       </p:cxnSp>
       <p:cxnSp>
         <p:nvCxnSpPr>
-          <p:cNvPr id="11" name="Straight Arrow Connector 10"/>
+          <p:cNvPr id="21" name="Straight Arrow Connector 20"/>
           <p:cNvCxnSpPr>
-            <a:stCxn id="5" idx="6"/>
-            <a:endCxn id="7" idx="1"/>
+            <a:stCxn id="19" idx="6"/>
+            <a:endCxn id="21" idx="1"/>
           </p:cNvCxnSpPr>
           <p:nvPr/>
         </p:nvCxnSpPr>
         <p:spPr>
           <a:xfrm flipV="1">
-            <a:off x="1341609" y="3032964"/>
+            <a:off x="4546249" y="3271976"/>
             <a:ext cx="749450" cy="11084"/>
           </a:xfrm>
           <a:prstGeom prst="straightConnector1">
@@ -5432,16 +5495,16 @@
       </p:cxnSp>
       <p:cxnSp>
         <p:nvCxnSpPr>
-          <p:cNvPr id="14" name="Straight Arrow Connector 13"/>
+          <p:cNvPr id="22" name="Straight Arrow Connector 21"/>
           <p:cNvCxnSpPr>
-            <a:stCxn id="5" idx="6"/>
-            <a:endCxn id="8" idx="1"/>
+            <a:stCxn id="19" idx="6"/>
+            <a:endCxn id="22" idx="1"/>
           </p:cNvCxnSpPr>
           <p:nvPr/>
         </p:nvCxnSpPr>
         <p:spPr>
           <a:xfrm>
-            <a:off x="1341609" y="3044048"/>
+            <a:off x="4546249" y="3283060"/>
             <a:ext cx="749450" cy="951073"/>
           </a:xfrm>
           <a:prstGeom prst="straightConnector1">
@@ -5539,22 +5602,28 @@
           </a:fontRef>
         </p:style>
         <p:txBody>
-          <a:bodyPr rtlCol="0" anchor="ctr"/>
+          <a:bodyPr lIns="0" tIns="0" rIns="0" bIns="0" rtlCol="0" anchor="ctr"/>
           <a:lstStyle/>
           <a:p>
             <a:pPr algn="ctr"/>
             <a:r>
-              <a:rPr lang="en-US" sz="1400" dirty="0" smtClean="0">
+              <a:rPr lang="en-US" sz="1200" dirty="0" smtClean="0">
                 <a:solidFill>
                   <a:schemeClr val="tx1"/>
                 </a:solidFill>
+                <a:latin typeface="CMU Typewriter Text Variable Width Medium" charset="0"/>
+                <a:ea typeface="CMU Typewriter Text Variable Width Medium" charset="0"/>
+                <a:cs typeface="CMU Typewriter Text Variable Width Medium" charset="0"/>
               </a:rPr>
               <a:t>OLAF</a:t>
             </a:r>
-            <a:endParaRPr lang="en-US" sz="1400" dirty="0">
+            <a:endParaRPr lang="en-US" sz="1200" dirty="0">
               <a:solidFill>
                 <a:schemeClr val="tx1"/>
               </a:solidFill>
+              <a:latin typeface="CMU Typewriter Text Variable Width Medium" charset="0"/>
+              <a:ea typeface="CMU Typewriter Text Variable Width Medium" charset="0"/>
+              <a:cs typeface="CMU Typewriter Text Variable Width Medium" charset="0"/>
             </a:endParaRPr>
           </a:p>
         </p:txBody>
@@ -5603,42 +5672,57 @@
           <a:lstStyle/>
           <a:p>
             <a:r>
-              <a:rPr lang="en-US" sz="1400" i="1" dirty="0" smtClean="0">
+              <a:rPr lang="en-US" sz="1200" i="1" dirty="0" smtClean="0">
                 <a:solidFill>
                   <a:schemeClr val="tx1"/>
                 </a:solidFill>
+                <a:latin typeface="CMU Typewriter Text Variable Width Medium" charset="0"/>
+                <a:ea typeface="CMU Typewriter Text Variable Width Medium" charset="0"/>
+                <a:cs typeface="CMU Typewriter Text Variable Width Medium" charset="0"/>
               </a:rPr>
               <a:t>p1</a:t>
             </a:r>
             <a:r>
-              <a:rPr lang="en-US" sz="1400" dirty="0" smtClean="0">
+              <a:rPr lang="en-US" sz="1200" dirty="0" smtClean="0">
                 <a:solidFill>
                   <a:schemeClr val="tx1"/>
                 </a:solidFill>
+                <a:latin typeface="CMU Typewriter Text Variable Width Medium" charset="0"/>
+                <a:ea typeface="CMU Typewriter Text Variable Width Medium" charset="0"/>
+                <a:cs typeface="CMU Typewriter Text Variable Width Medium" charset="0"/>
               </a:rPr>
               <a:t>: Create </a:t>
             </a:r>
             <a:r>
-              <a:rPr lang="en-US" sz="1400" dirty="0">
+              <a:rPr lang="en-US" sz="1200" dirty="0">
                 <a:solidFill>
                   <a:schemeClr val="tx1"/>
                 </a:solidFill>
+                <a:latin typeface="CMU Typewriter Text Variable Width Medium" charset="0"/>
+                <a:ea typeface="CMU Typewriter Text Variable Width Medium" charset="0"/>
+                <a:cs typeface="CMU Typewriter Text Variable Width Medium" charset="0"/>
               </a:rPr>
               <a:t>a list of all existing </a:t>
             </a:r>
             <a:r>
-              <a:rPr lang="en-US" sz="1400" i="1" dirty="0" smtClean="0">
+              <a:rPr lang="en-US" sz="1200" i="1" dirty="0" smtClean="0">
                 <a:solidFill>
                   <a:schemeClr val="tx1"/>
                 </a:solidFill>
+                <a:latin typeface="CMU Typewriter Text Variable Width Medium" charset="0"/>
+                <a:ea typeface="CMU Typewriter Text Variable Width Medium" charset="0"/>
+                <a:cs typeface="CMU Typewriter Text Variable Width Medium" charset="0"/>
               </a:rPr>
               <a:t>house numbers </a:t>
             </a:r>
             <a:r>
-              <a:rPr lang="en-US" sz="1400" dirty="0">
+              <a:rPr lang="en-US" sz="1200" dirty="0">
                 <a:solidFill>
                   <a:schemeClr val="tx1"/>
                 </a:solidFill>
+                <a:latin typeface="CMU Typewriter Text Variable Width Medium" charset="0"/>
+                <a:ea typeface="CMU Typewriter Text Variable Width Medium" charset="0"/>
+                <a:cs typeface="CMU Typewriter Text Variable Width Medium" charset="0"/>
               </a:rPr>
               <a:t>for each road listed in OSON</a:t>
             </a:r>
@@ -5691,65 +5775,89 @@
           <a:lstStyle/>
           <a:p>
             <a:r>
-              <a:rPr lang="en-US" sz="1400" i="1" dirty="0" smtClean="0">
+              <a:rPr lang="en-US" sz="1200" i="1" dirty="0" smtClean="0">
                 <a:solidFill>
                   <a:schemeClr val="tx1"/>
                 </a:solidFill>
+                <a:latin typeface="CMU Typewriter Text Variable Width Medium" charset="0"/>
+                <a:ea typeface="CMU Typewriter Text Variable Width Medium" charset="0"/>
+                <a:cs typeface="CMU Typewriter Text Variable Width Medium" charset="0"/>
               </a:rPr>
               <a:t>p2</a:t>
             </a:r>
             <a:r>
-              <a:rPr lang="en-US" sz="1400" dirty="0" smtClean="0">
+              <a:rPr lang="en-US" sz="1200" dirty="0" smtClean="0">
                 <a:solidFill>
                   <a:schemeClr val="tx1"/>
                 </a:solidFill>
+                <a:latin typeface="CMU Typewriter Text Variable Width Medium" charset="0"/>
+                <a:ea typeface="CMU Typewriter Text Variable Width Medium" charset="0"/>
+                <a:cs typeface="CMU Typewriter Text Variable Width Medium" charset="0"/>
               </a:rPr>
               <a:t>: Create </a:t>
             </a:r>
             <a:r>
-              <a:rPr lang="en-US" sz="1400" dirty="0">
+              <a:rPr lang="en-US" sz="1200" dirty="0">
                 <a:solidFill>
                   <a:schemeClr val="tx1"/>
                 </a:solidFill>
+                <a:latin typeface="CMU Typewriter Text Variable Width Medium" charset="0"/>
+                <a:ea typeface="CMU Typewriter Text Variable Width Medium" charset="0"/>
+                <a:cs typeface="CMU Typewriter Text Variable Width Medium" charset="0"/>
               </a:rPr>
               <a:t>a list of all existing </a:t>
             </a:r>
             <a:r>
-              <a:rPr lang="en-US" sz="1400" i="1" dirty="0" smtClean="0">
+              <a:rPr lang="en-US" sz="1200" i="1" dirty="0" smtClean="0">
                 <a:solidFill>
                   <a:schemeClr val="tx1"/>
                 </a:solidFill>
+                <a:latin typeface="CMU Typewriter Text Variable Width Medium" charset="0"/>
+                <a:ea typeface="CMU Typewriter Text Variable Width Medium" charset="0"/>
+                <a:cs typeface="CMU Typewriter Text Variable Width Medium" charset="0"/>
               </a:rPr>
               <a:t>house names</a:t>
             </a:r>
             <a:r>
-              <a:rPr lang="en-US" sz="1400" dirty="0" smtClean="0">
+              <a:rPr lang="en-US" sz="1200" dirty="0" smtClean="0">
                 <a:solidFill>
                   <a:schemeClr val="tx1"/>
                 </a:solidFill>
+                <a:latin typeface="CMU Typewriter Text Variable Width Medium" charset="0"/>
+                <a:ea typeface="CMU Typewriter Text Variable Width Medium" charset="0"/>
+                <a:cs typeface="CMU Typewriter Text Variable Width Medium" charset="0"/>
               </a:rPr>
               <a:t> </a:t>
             </a:r>
             <a:r>
-              <a:rPr lang="en-US" sz="1400" dirty="0">
+              <a:rPr lang="en-US" sz="1200" dirty="0">
                 <a:solidFill>
                   <a:schemeClr val="tx1"/>
                 </a:solidFill>
+                <a:latin typeface="CMU Typewriter Text Variable Width Medium" charset="0"/>
+                <a:ea typeface="CMU Typewriter Text Variable Width Medium" charset="0"/>
+                <a:cs typeface="CMU Typewriter Text Variable Width Medium" charset="0"/>
               </a:rPr>
               <a:t>for each road listed in </a:t>
             </a:r>
             <a:r>
-              <a:rPr lang="en-US" sz="1400" dirty="0" smtClean="0">
+              <a:rPr lang="en-US" sz="1200" dirty="0" smtClean="0">
                 <a:solidFill>
                   <a:schemeClr val="tx1"/>
                 </a:solidFill>
+                <a:latin typeface="CMU Typewriter Text Variable Width Medium" charset="0"/>
+                <a:ea typeface="CMU Typewriter Text Variable Width Medium" charset="0"/>
+                <a:cs typeface="CMU Typewriter Text Variable Width Medium" charset="0"/>
               </a:rPr>
               <a:t>OSON</a:t>
             </a:r>
-            <a:endParaRPr lang="en-US" sz="1400" dirty="0">
+            <a:endParaRPr lang="en-US" sz="1200" dirty="0">
               <a:solidFill>
                 <a:schemeClr val="tx1"/>
               </a:solidFill>
+              <a:latin typeface="CMU Typewriter Text Variable Width Medium" charset="0"/>
+              <a:ea typeface="CMU Typewriter Text Variable Width Medium" charset="0"/>
+              <a:cs typeface="CMU Typewriter Text Variable Width Medium" charset="0"/>
             </a:endParaRPr>
           </a:p>
         </p:txBody>
@@ -5800,49 +5908,67 @@
           <a:lstStyle/>
           <a:p>
             <a:r>
-              <a:rPr lang="en-US" sz="1400" dirty="0" smtClean="0">
+              <a:rPr lang="en-US" sz="1200" dirty="0" smtClean="0">
                 <a:solidFill>
                   <a:schemeClr val="tx1"/>
                 </a:solidFill>
+                <a:latin typeface="CMU Typewriter Text Variable Width Medium" charset="0"/>
+                <a:ea typeface="CMU Typewriter Text Variable Width Medium" charset="0"/>
+                <a:cs typeface="CMU Typewriter Text Variable Width Medium" charset="0"/>
               </a:rPr>
               <a:t>p3: Create </a:t>
             </a:r>
             <a:r>
-              <a:rPr lang="en-US" sz="1400" dirty="0">
+              <a:rPr lang="en-US" sz="1200" dirty="0">
                 <a:solidFill>
                   <a:schemeClr val="tx1"/>
                 </a:solidFill>
+                <a:latin typeface="CMU Typewriter Text Variable Width Medium" charset="0"/>
+                <a:ea typeface="CMU Typewriter Text Variable Width Medium" charset="0"/>
+                <a:cs typeface="CMU Typewriter Text Variable Width Medium" charset="0"/>
               </a:rPr>
               <a:t>a list of the associations between each of the house </a:t>
             </a:r>
             <a:r>
-              <a:rPr lang="en-US" sz="1400" dirty="0" smtClean="0">
+              <a:rPr lang="en-US" sz="1200" dirty="0" smtClean="0">
                 <a:solidFill>
                   <a:schemeClr val="tx1"/>
                 </a:solidFill>
+                <a:latin typeface="CMU Typewriter Text Variable Width Medium" charset="0"/>
+                <a:ea typeface="CMU Typewriter Text Variable Width Medium" charset="0"/>
+                <a:cs typeface="CMU Typewriter Text Variable Width Medium" charset="0"/>
               </a:rPr>
               <a:t>numbers </a:t>
             </a:r>
             <a:r>
-              <a:rPr lang="en-US" sz="1400" dirty="0">
+              <a:rPr lang="en-US" sz="1200" dirty="0">
                 <a:solidFill>
                   <a:schemeClr val="tx1"/>
                 </a:solidFill>
+                <a:latin typeface="CMU Typewriter Text Variable Width Medium" charset="0"/>
+                <a:ea typeface="CMU Typewriter Text Variable Width Medium" charset="0"/>
+                <a:cs typeface="CMU Typewriter Text Variable Width Medium" charset="0"/>
               </a:rPr>
               <a:t>and names above and the list of </a:t>
             </a:r>
             <a:r>
-              <a:rPr lang="en-US" sz="1400" dirty="0" smtClean="0">
+              <a:rPr lang="en-US" sz="1200" dirty="0" smtClean="0">
                 <a:solidFill>
                   <a:schemeClr val="tx1"/>
                 </a:solidFill>
+                <a:latin typeface="CMU Typewriter Text Variable Width Medium" charset="0"/>
+                <a:ea typeface="CMU Typewriter Text Variable Width Medium" charset="0"/>
+                <a:cs typeface="CMU Typewriter Text Variable Width Medium" charset="0"/>
               </a:rPr>
               <a:t>postcodes in OSON </a:t>
             </a:r>
-            <a:endParaRPr lang="en-US" sz="1400" dirty="0">
+            <a:endParaRPr lang="en-US" sz="1200" dirty="0">
               <a:solidFill>
                 <a:schemeClr val="tx1"/>
               </a:solidFill>
+              <a:latin typeface="CMU Typewriter Text Variable Width Medium" charset="0"/>
+              <a:ea typeface="CMU Typewriter Text Variable Width Medium" charset="0"/>
+              <a:cs typeface="CMU Typewriter Text Variable Width Medium" charset="0"/>
             </a:endParaRPr>
           </a:p>
         </p:txBody>
@@ -6008,18 +6134,24 @@
           <a:lstStyle/>
           <a:p>
             <a:r>
-              <a:rPr lang="en-US" sz="1400" i="1" dirty="0" smtClean="0">
+              <a:rPr lang="en-US" sz="1200" i="1" dirty="0" smtClean="0">
                 <a:solidFill>
                   <a:schemeClr val="tx1"/>
                 </a:solidFill>
+                <a:latin typeface="CMU Typewriter Text Variable Width Medium" charset="0"/>
+                <a:ea typeface="CMU Typewriter Text Variable Width Medium" charset="0"/>
+                <a:cs typeface="CMU Typewriter Text Variable Width Medium" charset="0"/>
               </a:rPr>
               <a:t>p1.1</a:t>
             </a:r>
             <a:r>
-              <a:rPr lang="en-US" sz="1400" dirty="0">
+              <a:rPr lang="en-US" sz="1200" dirty="0">
                 <a:solidFill>
                   <a:schemeClr val="tx1"/>
                 </a:solidFill>
+                <a:latin typeface="CMU Typewriter Text Variable Width Medium" charset="0"/>
+                <a:ea typeface="CMU Typewriter Text Variable Width Medium" charset="0"/>
+                <a:cs typeface="CMU Typewriter Text Variable Width Medium" charset="0"/>
               </a:rPr>
               <a:t>: Identify the list of house numbers in each OSON road through references in other open data</a:t>
             </a:r>
@@ -6070,41 +6202,56 @@
           <a:lstStyle/>
           <a:p>
             <a:r>
-              <a:rPr lang="en-US" sz="1400" i="1" dirty="0" smtClean="0">
+              <a:rPr lang="en-US" sz="1200" i="1" dirty="0" smtClean="0">
                 <a:solidFill>
                   <a:schemeClr val="tx1"/>
                 </a:solidFill>
+                <a:latin typeface="CMU Typewriter Text Variable Width Medium" charset="0"/>
+                <a:ea typeface="CMU Typewriter Text Variable Width Medium" charset="0"/>
+                <a:cs typeface="CMU Typewriter Text Variable Width Medium" charset="0"/>
               </a:rPr>
               <a:t>p1.2</a:t>
             </a:r>
             <a:r>
-              <a:rPr lang="en-US" sz="1400" dirty="0" smtClean="0">
+              <a:rPr lang="en-US" sz="1200" dirty="0" smtClean="0">
                 <a:solidFill>
                   <a:schemeClr val="tx1"/>
                 </a:solidFill>
+                <a:latin typeface="CMU Typewriter Text Variable Width Medium" charset="0"/>
+                <a:ea typeface="CMU Typewriter Text Variable Width Medium" charset="0"/>
+                <a:cs typeface="CMU Typewriter Text Variable Width Medium" charset="0"/>
               </a:rPr>
               <a:t>: </a:t>
             </a:r>
             <a:r>
-              <a:rPr lang="en-US" sz="1400" dirty="0">
+              <a:rPr lang="en-US" sz="1200" dirty="0">
                 <a:solidFill>
                   <a:schemeClr val="tx1"/>
                 </a:solidFill>
+                <a:latin typeface="CMU Typewriter Text Variable Width Medium" charset="0"/>
+                <a:ea typeface="CMU Typewriter Text Variable Width Medium" charset="0"/>
+                <a:cs typeface="CMU Typewriter Text Variable Width Medium" charset="0"/>
               </a:rPr>
               <a:t>Statistically infer the existence of house numbers from the house numbers collected at </a:t>
             </a:r>
             <a:r>
-              <a:rPr lang="en-US" sz="1400" i="1" dirty="0" smtClean="0">
+              <a:rPr lang="en-US" sz="1200" i="1" dirty="0" smtClean="0">
                 <a:solidFill>
                   <a:schemeClr val="tx1"/>
                 </a:solidFill>
+                <a:latin typeface="CMU Typewriter Text Variable Width Medium" charset="0"/>
+                <a:ea typeface="CMU Typewriter Text Variable Width Medium" charset="0"/>
+                <a:cs typeface="CMU Typewriter Text Variable Width Medium" charset="0"/>
               </a:rPr>
               <a:t>p1.1</a:t>
             </a:r>
-            <a:endParaRPr lang="en-US" sz="1400" i="1" dirty="0">
+            <a:endParaRPr lang="en-US" sz="1200" i="1" dirty="0">
               <a:solidFill>
                 <a:schemeClr val="tx1"/>
               </a:solidFill>
+              <a:latin typeface="CMU Typewriter Text Variable Width Medium" charset="0"/>
+              <a:ea typeface="CMU Typewriter Text Variable Width Medium" charset="0"/>
+              <a:cs typeface="CMU Typewriter Text Variable Width Medium" charset="0"/>
             </a:endParaRPr>
           </a:p>
         </p:txBody>
@@ -6153,65 +6300,89 @@
           <a:lstStyle/>
           <a:p>
             <a:r>
-              <a:rPr lang="en-US" sz="1400" i="1" dirty="0" smtClean="0">
+              <a:rPr lang="en-US" sz="1200" i="1" dirty="0" smtClean="0">
                 <a:solidFill>
                   <a:schemeClr val="tx1"/>
                 </a:solidFill>
+                <a:latin typeface="CMU Typewriter Text Variable Width Medium" charset="0"/>
+                <a:ea typeface="CMU Typewriter Text Variable Width Medium" charset="0"/>
+                <a:cs typeface="CMU Typewriter Text Variable Width Medium" charset="0"/>
               </a:rPr>
               <a:t>p1.4</a:t>
             </a:r>
             <a:r>
-              <a:rPr lang="en-US" sz="1400" dirty="0" smtClean="0">
+              <a:rPr lang="en-US" sz="1200" dirty="0" smtClean="0">
                 <a:solidFill>
                   <a:schemeClr val="tx1"/>
                 </a:solidFill>
+                <a:latin typeface="CMU Typewriter Text Variable Width Medium" charset="0"/>
+                <a:ea typeface="CMU Typewriter Text Variable Width Medium" charset="0"/>
+                <a:cs typeface="CMU Typewriter Text Variable Width Medium" charset="0"/>
               </a:rPr>
               <a:t>: </a:t>
             </a:r>
             <a:r>
-              <a:rPr lang="en-US" sz="1400" dirty="0">
+              <a:rPr lang="en-US" sz="1200" dirty="0">
                 <a:solidFill>
                   <a:schemeClr val="tx1"/>
                 </a:solidFill>
+                <a:latin typeface="CMU Typewriter Text Variable Width Medium" charset="0"/>
+                <a:ea typeface="CMU Typewriter Text Variable Width Medium" charset="0"/>
+                <a:cs typeface="CMU Typewriter Text Variable Width Medium" charset="0"/>
               </a:rPr>
               <a:t>Enable the further application of </a:t>
             </a:r>
             <a:r>
-              <a:rPr lang="en-US" sz="1400" i="1" dirty="0" smtClean="0">
+              <a:rPr lang="en-US" sz="1200" i="1" dirty="0" smtClean="0">
                 <a:solidFill>
                   <a:schemeClr val="tx1"/>
                 </a:solidFill>
+                <a:latin typeface="CMU Typewriter Text Variable Width Medium" charset="0"/>
+                <a:ea typeface="CMU Typewriter Text Variable Width Medium" charset="0"/>
+                <a:cs typeface="CMU Typewriter Text Variable Width Medium" charset="0"/>
               </a:rPr>
               <a:t>p1.2</a:t>
             </a:r>
             <a:r>
-              <a:rPr lang="en-US" sz="1400" dirty="0" smtClean="0">
+              <a:rPr lang="en-US" sz="1200" dirty="0" smtClean="0">
                 <a:solidFill>
                   <a:schemeClr val="tx1"/>
                 </a:solidFill>
+                <a:latin typeface="CMU Typewriter Text Variable Width Medium" charset="0"/>
+                <a:ea typeface="CMU Typewriter Text Variable Width Medium" charset="0"/>
+                <a:cs typeface="CMU Typewriter Text Variable Width Medium" charset="0"/>
               </a:rPr>
               <a:t> </a:t>
             </a:r>
             <a:r>
-              <a:rPr lang="en-US" sz="1400" dirty="0">
+              <a:rPr lang="en-US" sz="1200" dirty="0">
                 <a:solidFill>
                   <a:schemeClr val="tx1"/>
                 </a:solidFill>
+                <a:latin typeface="CMU Typewriter Text Variable Width Medium" charset="0"/>
+                <a:ea typeface="CMU Typewriter Text Variable Width Medium" charset="0"/>
+                <a:cs typeface="CMU Typewriter Text Variable Width Medium" charset="0"/>
               </a:rPr>
               <a:t>by creating the necessary data through </a:t>
             </a:r>
             <a:r>
-              <a:rPr lang="en-US" sz="1400" dirty="0" smtClean="0">
+              <a:rPr lang="en-US" sz="1200" dirty="0" smtClean="0">
                 <a:solidFill>
                   <a:schemeClr val="tx1"/>
                 </a:solidFill>
+                <a:latin typeface="CMU Typewriter Text Variable Width Medium" charset="0"/>
+                <a:ea typeface="CMU Typewriter Text Variable Width Medium" charset="0"/>
+                <a:cs typeface="CMU Typewriter Text Variable Width Medium" charset="0"/>
               </a:rPr>
               <a:t>crowdsourcing</a:t>
             </a:r>
-            <a:endParaRPr lang="en-US" sz="1400" i="1" dirty="0">
+            <a:endParaRPr lang="en-US" sz="1200" i="1" dirty="0">
               <a:solidFill>
                 <a:schemeClr val="tx1"/>
               </a:solidFill>
+              <a:latin typeface="CMU Typewriter Text Variable Width Medium" charset="0"/>
+              <a:ea typeface="CMU Typewriter Text Variable Width Medium" charset="0"/>
+              <a:cs typeface="CMU Typewriter Text Variable Width Medium" charset="0"/>
             </a:endParaRPr>
           </a:p>
         </p:txBody>
@@ -6260,41 +6431,56 @@
           <a:lstStyle/>
           <a:p>
             <a:r>
-              <a:rPr lang="en-US" sz="1400" i="1" dirty="0" smtClean="0">
+              <a:rPr lang="en-US" sz="1200" i="1" dirty="0" smtClean="0">
                 <a:solidFill>
                   <a:schemeClr val="tx1"/>
                 </a:solidFill>
+                <a:latin typeface="CMU Typewriter Text Variable Width Medium" charset="0"/>
+                <a:ea typeface="CMU Typewriter Text Variable Width Medium" charset="0"/>
+                <a:cs typeface="CMU Typewriter Text Variable Width Medium" charset="0"/>
               </a:rPr>
               <a:t>p1.3</a:t>
             </a:r>
             <a:r>
-              <a:rPr lang="en-US" sz="1400" dirty="0" smtClean="0">
+              <a:rPr lang="en-US" sz="1200" dirty="0" smtClean="0">
                 <a:solidFill>
                   <a:schemeClr val="tx1"/>
                 </a:solidFill>
+                <a:latin typeface="CMU Typewriter Text Variable Width Medium" charset="0"/>
+                <a:ea typeface="CMU Typewriter Text Variable Width Medium" charset="0"/>
+                <a:cs typeface="CMU Typewriter Text Variable Width Medium" charset="0"/>
               </a:rPr>
               <a:t>: </a:t>
             </a:r>
             <a:r>
-              <a:rPr lang="en-US" sz="1400" dirty="0">
+              <a:rPr lang="en-US" sz="1200" dirty="0">
                 <a:solidFill>
                   <a:schemeClr val="tx1"/>
                 </a:solidFill>
+                <a:latin typeface="CMU Typewriter Text Variable Width Medium" charset="0"/>
+                <a:ea typeface="CMU Typewriter Text Variable Width Medium" charset="0"/>
+                <a:cs typeface="CMU Typewriter Text Variable Width Medium" charset="0"/>
               </a:rPr>
               <a:t>Correct the output of </a:t>
             </a:r>
             <a:r>
-              <a:rPr lang="en-US" sz="1400" i="1" dirty="0" smtClean="0">
+              <a:rPr lang="en-US" sz="1200" i="1" dirty="0" smtClean="0">
                 <a:solidFill>
                   <a:schemeClr val="tx1"/>
                 </a:solidFill>
+                <a:latin typeface="CMU Typewriter Text Variable Width Medium" charset="0"/>
+                <a:ea typeface="CMU Typewriter Text Variable Width Medium" charset="0"/>
+                <a:cs typeface="CMU Typewriter Text Variable Width Medium" charset="0"/>
               </a:rPr>
               <a:t>p1.2</a:t>
             </a:r>
-            <a:endParaRPr lang="en-US" sz="1400" i="1" dirty="0">
+            <a:endParaRPr lang="en-US" sz="1200" i="1" dirty="0">
               <a:solidFill>
                 <a:schemeClr val="tx1"/>
               </a:solidFill>
+              <a:latin typeface="CMU Typewriter Text Variable Width Medium" charset="0"/>
+              <a:ea typeface="CMU Typewriter Text Variable Width Medium" charset="0"/>
+              <a:cs typeface="CMU Typewriter Text Variable Width Medium" charset="0"/>
             </a:endParaRPr>
           </a:p>
         </p:txBody>

</xml_diff>

<commit_message>
The new "workflow" picture
</commit_message>
<xml_diff>
--- a/images_src/misc_powerpoint.pptx
+++ b/images_src/misc_powerpoint.pptx
@@ -5,7 +5,7 @@
     <p:sldMasterId id="2147483648" r:id="rId1"/>
   </p:sldMasterIdLst>
   <p:notesMasterIdLst>
-    <p:notesMasterId r:id="rId7"/>
+    <p:notesMasterId r:id="rId8"/>
   </p:notesMasterIdLst>
   <p:sldIdLst>
     <p:sldId id="258" r:id="rId2"/>
@@ -13,6 +13,7 @@
     <p:sldId id="260" r:id="rId4"/>
     <p:sldId id="261" r:id="rId5"/>
     <p:sldId id="262" r:id="rId6"/>
+    <p:sldId id="263" r:id="rId7"/>
   </p:sldIdLst>
   <p:sldSz cx="12192000" cy="6858000"/>
   <p:notesSz cx="6858000" cy="9144000"/>
@@ -5570,7 +5571,7 @@
         </p:nvSpPr>
         <p:spPr>
           <a:xfrm>
-            <a:off x="534785" y="2640636"/>
+            <a:off x="1393767" y="3083981"/>
             <a:ext cx="806824" cy="806824"/>
           </a:xfrm>
           <a:prstGeom prst="ellipse">
@@ -5636,7 +5637,7 @@
         </p:nvSpPr>
         <p:spPr>
           <a:xfrm>
-            <a:off x="2091059" y="1927533"/>
+            <a:off x="2950041" y="2370878"/>
             <a:ext cx="3352800" cy="597213"/>
           </a:xfrm>
           <a:prstGeom prst="roundRect">
@@ -5737,7 +5738,7 @@
         </p:nvSpPr>
         <p:spPr>
           <a:xfrm>
-            <a:off x="2091059" y="2734357"/>
+            <a:off x="2950041" y="3177702"/>
             <a:ext cx="3352800" cy="597213"/>
           </a:xfrm>
           <a:prstGeom prst="roundRect">
@@ -5870,7 +5871,7 @@
         </p:nvSpPr>
         <p:spPr>
           <a:xfrm>
-            <a:off x="2091059" y="3541181"/>
+            <a:off x="2950041" y="3984526"/>
             <a:ext cx="3352800" cy="907879"/>
           </a:xfrm>
           <a:prstGeom prst="roundRect">
@@ -5984,7 +5985,7 @@
         </p:nvCxnSpPr>
         <p:spPr>
           <a:xfrm flipV="1">
-            <a:off x="1341609" y="2226140"/>
+            <a:off x="2200591" y="2669485"/>
             <a:ext cx="749450" cy="817908"/>
           </a:xfrm>
           <a:prstGeom prst="straightConnector1">
@@ -6023,7 +6024,7 @@
         </p:nvCxnSpPr>
         <p:spPr>
           <a:xfrm flipV="1">
-            <a:off x="1341609" y="3032964"/>
+            <a:off x="2200591" y="3476309"/>
             <a:ext cx="749450" cy="11084"/>
           </a:xfrm>
           <a:prstGeom prst="straightConnector1">
@@ -6062,7 +6063,7 @@
         </p:nvCxnSpPr>
         <p:spPr>
           <a:xfrm>
-            <a:off x="1341609" y="3044048"/>
+            <a:off x="2200591" y="3487393"/>
             <a:ext cx="749450" cy="951073"/>
           </a:xfrm>
           <a:prstGeom prst="straightConnector1">
@@ -6098,7 +6099,7 @@
         </p:nvSpPr>
         <p:spPr>
           <a:xfrm>
-            <a:off x="6221996" y="1434750"/>
+            <a:off x="7080978" y="1878095"/>
             <a:ext cx="3352800" cy="713104"/>
           </a:xfrm>
           <a:prstGeom prst="roundRect">
@@ -6166,7 +6167,7 @@
         </p:nvSpPr>
         <p:spPr>
           <a:xfrm>
-            <a:off x="6221996" y="2509144"/>
+            <a:off x="7080978" y="2952489"/>
             <a:ext cx="3352800" cy="713104"/>
           </a:xfrm>
           <a:prstGeom prst="roundRect">
@@ -6264,7 +6265,7 @@
         </p:nvSpPr>
         <p:spPr>
           <a:xfrm>
-            <a:off x="6221996" y="4092508"/>
+            <a:off x="7080978" y="4535853"/>
             <a:ext cx="3352800" cy="713104"/>
           </a:xfrm>
           <a:prstGeom prst="roundRect">
@@ -6395,7 +6396,7 @@
         </p:nvSpPr>
         <p:spPr>
           <a:xfrm>
-            <a:off x="6221996" y="3517609"/>
+            <a:off x="7080978" y="3960954"/>
             <a:ext cx="3352800" cy="304812"/>
           </a:xfrm>
           <a:prstGeom prst="roundRect">
@@ -6496,7 +6497,7 @@
         </p:nvCxnSpPr>
         <p:spPr>
           <a:xfrm flipV="1">
-            <a:off x="5443859" y="1791302"/>
+            <a:off x="6302841" y="2234647"/>
             <a:ext cx="778137" cy="434838"/>
           </a:xfrm>
           <a:prstGeom prst="straightConnector1">
@@ -6535,7 +6536,7 @@
         </p:nvCxnSpPr>
         <p:spPr>
           <a:xfrm>
-            <a:off x="5443859" y="2226140"/>
+            <a:off x="6302841" y="2669485"/>
             <a:ext cx="778137" cy="639556"/>
           </a:xfrm>
           <a:prstGeom prst="straightConnector1">
@@ -6574,7 +6575,7 @@
         </p:nvCxnSpPr>
         <p:spPr>
           <a:xfrm>
-            <a:off x="5443859" y="2226140"/>
+            <a:off x="6302841" y="2669485"/>
             <a:ext cx="778137" cy="2222920"/>
           </a:xfrm>
           <a:prstGeom prst="straightConnector1">
@@ -6613,7 +6614,7 @@
         </p:nvCxnSpPr>
         <p:spPr>
           <a:xfrm>
-            <a:off x="5443859" y="2226140"/>
+            <a:off x="6302841" y="2669485"/>
             <a:ext cx="778137" cy="1443875"/>
           </a:xfrm>
           <a:prstGeom prst="straightConnector1">
@@ -6652,7 +6653,7 @@
         </p:nvCxnSpPr>
         <p:spPr>
           <a:xfrm>
-            <a:off x="7898396" y="2147854"/>
+            <a:off x="8757378" y="2591199"/>
             <a:ext cx="0" cy="361290"/>
           </a:xfrm>
           <a:prstGeom prst="straightConnector1">
@@ -6691,7 +6692,7 @@
         </p:nvCxnSpPr>
         <p:spPr>
           <a:xfrm flipV="1">
-            <a:off x="9574796" y="2865696"/>
+            <a:off x="10433778" y="3309041"/>
             <a:ext cx="12700" cy="1583364"/>
           </a:xfrm>
           <a:prstGeom prst="bentConnector3">
@@ -6732,7 +6733,7 @@
         </p:nvCxnSpPr>
         <p:spPr>
           <a:xfrm>
-            <a:off x="7898396" y="3222248"/>
+            <a:off x="8757378" y="3665593"/>
             <a:ext cx="0" cy="295361"/>
           </a:xfrm>
           <a:prstGeom prst="straightConnector1">
@@ -6764,6 +6765,1518 @@
     <p:extLst>
       <p:ext uri="{BB962C8B-B14F-4D97-AF65-F5344CB8AC3E}">
         <p14:creationId xmlns:p14="http://schemas.microsoft.com/office/powerpoint/2010/main" val="1450900125"/>
+      </p:ext>
+    </p:extLst>
+  </p:cSld>
+  <p:clrMapOvr>
+    <a:masterClrMapping/>
+  </p:clrMapOvr>
+</p:sld>
+</file>
+
+<file path=ppt/slides/slide6.xml><?xml version="1.0" encoding="utf-8"?>
+<p:sld xmlns:a="http://schemas.openxmlformats.org/drawingml/2006/main" xmlns:r="http://schemas.openxmlformats.org/officeDocument/2006/relationships" xmlns:p="http://schemas.openxmlformats.org/presentationml/2006/main">
+  <p:cSld>
+    <p:spTree>
+      <p:nvGrpSpPr>
+        <p:cNvPr id="1" name=""/>
+        <p:cNvGrpSpPr/>
+        <p:nvPr/>
+      </p:nvGrpSpPr>
+      <p:grpSpPr>
+        <a:xfrm>
+          <a:off x="0" y="0"/>
+          <a:ext cx="0" cy="0"/>
+          <a:chOff x="0" y="0"/>
+          <a:chExt cx="0" cy="0"/>
+        </a:xfrm>
+      </p:grpSpPr>
+      <p:sp>
+        <p:nvSpPr>
+          <p:cNvPr id="2" name="Magnetic Disk 1"/>
+          <p:cNvSpPr/>
+          <p:nvPr/>
+        </p:nvSpPr>
+        <p:spPr>
+          <a:xfrm>
+            <a:off x="697282" y="1302324"/>
+            <a:ext cx="909851" cy="609600"/>
+          </a:xfrm>
+          <a:prstGeom prst="flowChartMagneticDisk">
+            <a:avLst/>
+          </a:prstGeom>
+          <a:solidFill>
+            <a:schemeClr val="bg1"/>
+          </a:solidFill>
+          <a:ln>
+            <a:solidFill>
+              <a:schemeClr val="tx1"/>
+            </a:solidFill>
+          </a:ln>
+        </p:spPr>
+        <p:style>
+          <a:lnRef idx="2">
+            <a:schemeClr val="accent1">
+              <a:shade val="50000"/>
+            </a:schemeClr>
+          </a:lnRef>
+          <a:fillRef idx="1">
+            <a:schemeClr val="accent1"/>
+          </a:fillRef>
+          <a:effectRef idx="0">
+            <a:schemeClr val="accent1"/>
+          </a:effectRef>
+          <a:fontRef idx="minor">
+            <a:schemeClr val="lt1"/>
+          </a:fontRef>
+        </p:style>
+        <p:txBody>
+          <a:bodyPr rtlCol="0" anchor="ctr"/>
+          <a:lstStyle/>
+          <a:p>
+            <a:pPr algn="ctr"/>
+            <a:r>
+              <a:rPr lang="en-US" sz="1200" dirty="0" smtClean="0">
+                <a:solidFill>
+                  <a:schemeClr val="tx1"/>
+                </a:solidFill>
+                <a:latin typeface="CMU Typewriter Text Variable Width Medium" charset="0"/>
+                <a:ea typeface="CMU Typewriter Text Variable Width Medium" charset="0"/>
+                <a:cs typeface="CMU Typewriter Text Variable Width Medium" charset="0"/>
+              </a:rPr>
+              <a:t>OSON</a:t>
+            </a:r>
+            <a:endParaRPr lang="en-US" sz="1200" dirty="0">
+              <a:solidFill>
+                <a:schemeClr val="tx1"/>
+              </a:solidFill>
+              <a:latin typeface="CMU Typewriter Text Variable Width Medium" charset="0"/>
+              <a:ea typeface="CMU Typewriter Text Variable Width Medium" charset="0"/>
+              <a:cs typeface="CMU Typewriter Text Variable Width Medium" charset="0"/>
+            </a:endParaRPr>
+          </a:p>
+        </p:txBody>
+      </p:sp>
+      <p:sp>
+        <p:nvSpPr>
+          <p:cNvPr id="36" name="Magnetic Disk 35"/>
+          <p:cNvSpPr/>
+          <p:nvPr/>
+        </p:nvSpPr>
+        <p:spPr>
+          <a:xfrm>
+            <a:off x="697282" y="2618510"/>
+            <a:ext cx="909851" cy="609600"/>
+          </a:xfrm>
+          <a:prstGeom prst="flowChartMagneticDisk">
+            <a:avLst/>
+          </a:prstGeom>
+          <a:solidFill>
+            <a:schemeClr val="bg1"/>
+          </a:solidFill>
+          <a:ln>
+            <a:solidFill>
+              <a:schemeClr val="tx1"/>
+            </a:solidFill>
+          </a:ln>
+        </p:spPr>
+        <p:style>
+          <a:lnRef idx="2">
+            <a:schemeClr val="accent1">
+              <a:shade val="50000"/>
+            </a:schemeClr>
+          </a:lnRef>
+          <a:fillRef idx="1">
+            <a:schemeClr val="accent1"/>
+          </a:fillRef>
+          <a:effectRef idx="0">
+            <a:schemeClr val="accent1"/>
+          </a:effectRef>
+          <a:fontRef idx="minor">
+            <a:schemeClr val="lt1"/>
+          </a:fontRef>
+        </p:style>
+        <p:txBody>
+          <a:bodyPr rtlCol="0" anchor="ctr"/>
+          <a:lstStyle/>
+          <a:p>
+            <a:pPr algn="ctr"/>
+            <a:r>
+              <a:rPr lang="en-US" sz="1200" dirty="0" smtClean="0">
+                <a:solidFill>
+                  <a:schemeClr val="tx1"/>
+                </a:solidFill>
+                <a:latin typeface="CMU Typewriter Text Variable Width Medium" charset="0"/>
+                <a:ea typeface="CMU Typewriter Text Variable Width Medium" charset="0"/>
+                <a:cs typeface="CMU Typewriter Text Variable Width Medium" charset="0"/>
+              </a:rPr>
+              <a:t>LRPP</a:t>
+            </a:r>
+            <a:endParaRPr lang="en-US" sz="1200" dirty="0">
+              <a:solidFill>
+                <a:schemeClr val="tx1"/>
+              </a:solidFill>
+              <a:latin typeface="CMU Typewriter Text Variable Width Medium" charset="0"/>
+              <a:ea typeface="CMU Typewriter Text Variable Width Medium" charset="0"/>
+              <a:cs typeface="CMU Typewriter Text Variable Width Medium" charset="0"/>
+            </a:endParaRPr>
+          </a:p>
+        </p:txBody>
+      </p:sp>
+      <p:sp>
+        <p:nvSpPr>
+          <p:cNvPr id="43" name="Magnetic Disk 42"/>
+          <p:cNvSpPr/>
+          <p:nvPr/>
+        </p:nvSpPr>
+        <p:spPr>
+          <a:xfrm>
+            <a:off x="2152009" y="1025233"/>
+            <a:ext cx="909851" cy="1163783"/>
+          </a:xfrm>
+          <a:prstGeom prst="flowChartMagneticDisk">
+            <a:avLst/>
+          </a:prstGeom>
+          <a:solidFill>
+            <a:schemeClr val="bg1"/>
+          </a:solidFill>
+          <a:ln>
+            <a:solidFill>
+              <a:schemeClr val="tx1"/>
+            </a:solidFill>
+          </a:ln>
+        </p:spPr>
+        <p:style>
+          <a:lnRef idx="2">
+            <a:schemeClr val="accent1">
+              <a:shade val="50000"/>
+            </a:schemeClr>
+          </a:lnRef>
+          <a:fillRef idx="1">
+            <a:schemeClr val="accent1"/>
+          </a:fillRef>
+          <a:effectRef idx="0">
+            <a:schemeClr val="accent1"/>
+          </a:effectRef>
+          <a:fontRef idx="minor">
+            <a:schemeClr val="lt1"/>
+          </a:fontRef>
+        </p:style>
+        <p:txBody>
+          <a:bodyPr rtlCol="0" anchor="ctr"/>
+          <a:lstStyle/>
+          <a:p>
+            <a:pPr algn="ctr"/>
+            <a:r>
+              <a:rPr lang="en-US" sz="1200" dirty="0" smtClean="0">
+                <a:solidFill>
+                  <a:schemeClr val="tx1"/>
+                </a:solidFill>
+                <a:latin typeface="CMU Typewriter Text Variable Width Medium" charset="0"/>
+                <a:ea typeface="CMU Typewriter Text Variable Width Medium" charset="0"/>
+                <a:cs typeface="CMU Typewriter Text Variable Width Medium" charset="0"/>
+              </a:rPr>
+              <a:t>Reference data</a:t>
+            </a:r>
+            <a:endParaRPr lang="en-US" sz="1200" dirty="0">
+              <a:solidFill>
+                <a:schemeClr val="tx1"/>
+              </a:solidFill>
+              <a:latin typeface="CMU Typewriter Text Variable Width Medium" charset="0"/>
+              <a:ea typeface="CMU Typewriter Text Variable Width Medium" charset="0"/>
+              <a:cs typeface="CMU Typewriter Text Variable Width Medium" charset="0"/>
+            </a:endParaRPr>
+          </a:p>
+        </p:txBody>
+      </p:sp>
+      <p:cxnSp>
+        <p:nvCxnSpPr>
+          <p:cNvPr id="48" name="Elbow Connector 47"/>
+          <p:cNvCxnSpPr>
+            <a:stCxn id="2" idx="4"/>
+            <a:endCxn id="43" idx="2"/>
+          </p:cNvCxnSpPr>
+          <p:nvPr/>
+        </p:nvCxnSpPr>
+        <p:spPr>
+          <a:xfrm>
+            <a:off x="1607133" y="1607124"/>
+            <a:ext cx="544876" cy="1"/>
+          </a:xfrm>
+          <a:prstGeom prst="bentConnector3">
+            <a:avLst>
+              <a:gd name="adj1" fmla="val 50000"/>
+            </a:avLst>
+          </a:prstGeom>
+          <a:ln>
+            <a:solidFill>
+              <a:schemeClr val="tx1"/>
+            </a:solidFill>
+            <a:tailEnd type="triangle" w="lg" len="lg"/>
+          </a:ln>
+        </p:spPr>
+        <p:style>
+          <a:lnRef idx="1">
+            <a:schemeClr val="accent1"/>
+          </a:lnRef>
+          <a:fillRef idx="0">
+            <a:schemeClr val="accent1"/>
+          </a:fillRef>
+          <a:effectRef idx="0">
+            <a:schemeClr val="accent1"/>
+          </a:effectRef>
+          <a:fontRef idx="minor">
+            <a:schemeClr val="tx1"/>
+          </a:fontRef>
+        </p:style>
+      </p:cxnSp>
+      <p:cxnSp>
+        <p:nvCxnSpPr>
+          <p:cNvPr id="51" name="Elbow Connector 50"/>
+          <p:cNvCxnSpPr>
+            <a:stCxn id="36" idx="4"/>
+            <a:endCxn id="58" idx="2"/>
+          </p:cNvCxnSpPr>
+          <p:nvPr/>
+        </p:nvCxnSpPr>
+        <p:spPr>
+          <a:xfrm flipV="1">
+            <a:off x="1607133" y="2202870"/>
+            <a:ext cx="2479963" cy="720440"/>
+          </a:xfrm>
+          <a:prstGeom prst="bentConnector3">
+            <a:avLst>
+              <a:gd name="adj1" fmla="val 68994"/>
+            </a:avLst>
+          </a:prstGeom>
+          <a:ln>
+            <a:solidFill>
+              <a:schemeClr val="tx1"/>
+            </a:solidFill>
+            <a:tailEnd type="triangle" w="lg" len="lg"/>
+          </a:ln>
+        </p:spPr>
+        <p:style>
+          <a:lnRef idx="1">
+            <a:schemeClr val="accent1"/>
+          </a:lnRef>
+          <a:fillRef idx="0">
+            <a:schemeClr val="accent1"/>
+          </a:fillRef>
+          <a:effectRef idx="0">
+            <a:schemeClr val="accent1"/>
+          </a:effectRef>
+          <a:fontRef idx="minor">
+            <a:schemeClr val="tx1"/>
+          </a:fontRef>
+        </p:style>
+      </p:cxnSp>
+      <p:sp>
+        <p:nvSpPr>
+          <p:cNvPr id="58" name="Magnetic Disk 57"/>
+          <p:cNvSpPr/>
+          <p:nvPr/>
+        </p:nvSpPr>
+        <p:spPr>
+          <a:xfrm>
+            <a:off x="4087096" y="1620978"/>
+            <a:ext cx="909851" cy="1163783"/>
+          </a:xfrm>
+          <a:prstGeom prst="flowChartMagneticDisk">
+            <a:avLst/>
+          </a:prstGeom>
+          <a:solidFill>
+            <a:schemeClr val="bg1"/>
+          </a:solidFill>
+          <a:ln>
+            <a:solidFill>
+              <a:schemeClr val="tx1"/>
+            </a:solidFill>
+          </a:ln>
+        </p:spPr>
+        <p:style>
+          <a:lnRef idx="2">
+            <a:schemeClr val="accent1">
+              <a:shade val="50000"/>
+            </a:schemeClr>
+          </a:lnRef>
+          <a:fillRef idx="1">
+            <a:schemeClr val="accent1"/>
+          </a:fillRef>
+          <a:effectRef idx="0">
+            <a:schemeClr val="accent1"/>
+          </a:effectRef>
+          <a:fontRef idx="minor">
+            <a:schemeClr val="lt1"/>
+          </a:fontRef>
+        </p:style>
+        <p:txBody>
+          <a:bodyPr rtlCol="0" anchor="ctr"/>
+          <a:lstStyle/>
+          <a:p>
+            <a:pPr algn="ctr"/>
+            <a:r>
+              <a:rPr lang="en-US" sz="1200" dirty="0" smtClean="0">
+                <a:solidFill>
+                  <a:schemeClr val="tx1"/>
+                </a:solidFill>
+                <a:latin typeface="CMU Typewriter Text Variable Width Medium" charset="0"/>
+                <a:ea typeface="CMU Typewriter Text Variable Width Medium" charset="0"/>
+                <a:cs typeface="CMU Typewriter Text Variable Width Medium" charset="0"/>
+              </a:rPr>
+              <a:t>Known house numbers</a:t>
+            </a:r>
+            <a:endParaRPr lang="en-US" sz="1200" dirty="0">
+              <a:solidFill>
+                <a:schemeClr val="tx1"/>
+              </a:solidFill>
+              <a:latin typeface="CMU Typewriter Text Variable Width Medium" charset="0"/>
+              <a:ea typeface="CMU Typewriter Text Variable Width Medium" charset="0"/>
+              <a:cs typeface="CMU Typewriter Text Variable Width Medium" charset="0"/>
+            </a:endParaRPr>
+          </a:p>
+        </p:txBody>
+      </p:sp>
+      <p:cxnSp>
+        <p:nvCxnSpPr>
+          <p:cNvPr id="71" name="Elbow Connector 70"/>
+          <p:cNvCxnSpPr>
+            <a:stCxn id="43" idx="4"/>
+            <a:endCxn id="58" idx="2"/>
+          </p:cNvCxnSpPr>
+          <p:nvPr/>
+        </p:nvCxnSpPr>
+        <p:spPr>
+          <a:xfrm>
+            <a:off x="3061860" y="1607125"/>
+            <a:ext cx="1025236" cy="595745"/>
+          </a:xfrm>
+          <a:prstGeom prst="bentConnector3">
+            <a:avLst>
+              <a:gd name="adj1" fmla="val 56757"/>
+            </a:avLst>
+          </a:prstGeom>
+          <a:ln>
+            <a:solidFill>
+              <a:schemeClr val="tx1"/>
+            </a:solidFill>
+            <a:tailEnd type="triangle" w="lg" len="lg"/>
+          </a:ln>
+        </p:spPr>
+        <p:style>
+          <a:lnRef idx="1">
+            <a:schemeClr val="accent1"/>
+          </a:lnRef>
+          <a:fillRef idx="0">
+            <a:schemeClr val="accent1"/>
+          </a:fillRef>
+          <a:effectRef idx="0">
+            <a:schemeClr val="accent1"/>
+          </a:effectRef>
+          <a:fontRef idx="minor">
+            <a:schemeClr val="tx1"/>
+          </a:fontRef>
+        </p:style>
+      </p:cxnSp>
+      <p:sp>
+        <p:nvSpPr>
+          <p:cNvPr id="82" name="Magnetic Disk 81"/>
+          <p:cNvSpPr/>
+          <p:nvPr/>
+        </p:nvSpPr>
+        <p:spPr>
+          <a:xfrm>
+            <a:off x="7804662" y="1620978"/>
+            <a:ext cx="909851" cy="1163783"/>
+          </a:xfrm>
+          <a:prstGeom prst="flowChartMagneticDisk">
+            <a:avLst/>
+          </a:prstGeom>
+          <a:solidFill>
+            <a:schemeClr val="bg1"/>
+          </a:solidFill>
+          <a:ln>
+            <a:solidFill>
+              <a:schemeClr val="tx1"/>
+            </a:solidFill>
+          </a:ln>
+        </p:spPr>
+        <p:style>
+          <a:lnRef idx="2">
+            <a:schemeClr val="accent1">
+              <a:shade val="50000"/>
+            </a:schemeClr>
+          </a:lnRef>
+          <a:fillRef idx="1">
+            <a:schemeClr val="accent1"/>
+          </a:fillRef>
+          <a:effectRef idx="0">
+            <a:schemeClr val="accent1"/>
+          </a:effectRef>
+          <a:fontRef idx="minor">
+            <a:schemeClr val="lt1"/>
+          </a:fontRef>
+        </p:style>
+        <p:txBody>
+          <a:bodyPr rtlCol="0" anchor="ctr"/>
+          <a:lstStyle/>
+          <a:p>
+            <a:pPr algn="ctr"/>
+            <a:r>
+              <a:rPr lang="en-US" sz="1200" dirty="0" smtClean="0">
+                <a:solidFill>
+                  <a:schemeClr val="tx1"/>
+                </a:solidFill>
+                <a:latin typeface="CMU Typewriter Text Variable Width Medium" charset="0"/>
+                <a:ea typeface="CMU Typewriter Text Variable Width Medium" charset="0"/>
+                <a:cs typeface="CMU Typewriter Text Variable Width Medium" charset="0"/>
+              </a:rPr>
+              <a:t>Inference data</a:t>
+            </a:r>
+            <a:endParaRPr lang="en-US" sz="1200" dirty="0">
+              <a:solidFill>
+                <a:schemeClr val="tx1"/>
+              </a:solidFill>
+              <a:latin typeface="CMU Typewriter Text Variable Width Medium" charset="0"/>
+              <a:ea typeface="CMU Typewriter Text Variable Width Medium" charset="0"/>
+              <a:cs typeface="CMU Typewriter Text Variable Width Medium" charset="0"/>
+            </a:endParaRPr>
+          </a:p>
+        </p:txBody>
+      </p:sp>
+      <p:cxnSp>
+        <p:nvCxnSpPr>
+          <p:cNvPr id="83" name="Elbow Connector 82"/>
+          <p:cNvCxnSpPr>
+            <a:stCxn id="58" idx="4"/>
+            <a:endCxn id="87" idx="1"/>
+          </p:cNvCxnSpPr>
+          <p:nvPr/>
+        </p:nvCxnSpPr>
+        <p:spPr>
+          <a:xfrm flipV="1">
+            <a:off x="4996947" y="2202869"/>
+            <a:ext cx="992877" cy="1"/>
+          </a:xfrm>
+          <a:prstGeom prst="bentConnector3">
+            <a:avLst>
+              <a:gd name="adj1" fmla="val 50000"/>
+            </a:avLst>
+          </a:prstGeom>
+          <a:ln>
+            <a:solidFill>
+              <a:schemeClr val="tx1"/>
+            </a:solidFill>
+            <a:tailEnd type="triangle" w="lg" len="lg"/>
+          </a:ln>
+        </p:spPr>
+        <p:style>
+          <a:lnRef idx="1">
+            <a:schemeClr val="accent1"/>
+          </a:lnRef>
+          <a:fillRef idx="0">
+            <a:schemeClr val="accent1"/>
+          </a:fillRef>
+          <a:effectRef idx="0">
+            <a:schemeClr val="accent1"/>
+          </a:effectRef>
+          <a:fontRef idx="minor">
+            <a:schemeClr val="tx1"/>
+          </a:fontRef>
+        </p:style>
+      </p:cxnSp>
+      <p:sp>
+        <p:nvSpPr>
+          <p:cNvPr id="87" name="Rectangle 86"/>
+          <p:cNvSpPr/>
+          <p:nvPr/>
+        </p:nvSpPr>
+        <p:spPr>
+          <a:xfrm>
+            <a:off x="5989824" y="1859969"/>
+            <a:ext cx="1015931" cy="685799"/>
+          </a:xfrm>
+          <a:prstGeom prst="rect">
+            <a:avLst/>
+          </a:prstGeom>
+          <a:solidFill>
+            <a:schemeClr val="bg1"/>
+          </a:solidFill>
+          <a:ln>
+            <a:solidFill>
+              <a:schemeClr val="tx1"/>
+            </a:solidFill>
+          </a:ln>
+        </p:spPr>
+        <p:style>
+          <a:lnRef idx="2">
+            <a:schemeClr val="accent1">
+              <a:shade val="50000"/>
+            </a:schemeClr>
+          </a:lnRef>
+          <a:fillRef idx="1">
+            <a:schemeClr val="accent1"/>
+          </a:fillRef>
+          <a:effectRef idx="0">
+            <a:schemeClr val="accent1"/>
+          </a:effectRef>
+          <a:fontRef idx="minor">
+            <a:schemeClr val="lt1"/>
+          </a:fontRef>
+        </p:style>
+        <p:txBody>
+          <a:bodyPr rtlCol="0" anchor="ctr"/>
+          <a:lstStyle/>
+          <a:p>
+            <a:pPr algn="ctr"/>
+            <a:r>
+              <a:rPr lang="en-US" sz="1200" smtClean="0">
+                <a:solidFill>
+                  <a:schemeClr val="tx1"/>
+                </a:solidFill>
+                <a:latin typeface="CMU Typewriter Text Variable Width Medium" charset="0"/>
+                <a:ea typeface="CMU Typewriter Text Variable Width Medium" charset="0"/>
+                <a:cs typeface="CMU Typewriter Text Variable Width Medium" charset="0"/>
+              </a:rPr>
+              <a:t>Inference</a:t>
+            </a:r>
+            <a:endParaRPr lang="en-US" sz="1200" dirty="0">
+              <a:solidFill>
+                <a:schemeClr val="tx1"/>
+              </a:solidFill>
+              <a:latin typeface="CMU Typewriter Text Variable Width Medium" charset="0"/>
+              <a:ea typeface="CMU Typewriter Text Variable Width Medium" charset="0"/>
+              <a:cs typeface="CMU Typewriter Text Variable Width Medium" charset="0"/>
+            </a:endParaRPr>
+          </a:p>
+        </p:txBody>
+      </p:sp>
+      <p:cxnSp>
+        <p:nvCxnSpPr>
+          <p:cNvPr id="90" name="Elbow Connector 89"/>
+          <p:cNvCxnSpPr>
+            <a:stCxn id="87" idx="3"/>
+            <a:endCxn id="82" idx="2"/>
+          </p:cNvCxnSpPr>
+          <p:nvPr/>
+        </p:nvCxnSpPr>
+        <p:spPr>
+          <a:xfrm>
+            <a:off x="7005755" y="2202869"/>
+            <a:ext cx="798907" cy="1"/>
+          </a:xfrm>
+          <a:prstGeom prst="bentConnector3">
+            <a:avLst>
+              <a:gd name="adj1" fmla="val 50000"/>
+            </a:avLst>
+          </a:prstGeom>
+          <a:ln>
+            <a:solidFill>
+              <a:schemeClr val="tx1"/>
+            </a:solidFill>
+            <a:tailEnd type="triangle" w="lg" len="lg"/>
+          </a:ln>
+        </p:spPr>
+        <p:style>
+          <a:lnRef idx="1">
+            <a:schemeClr val="accent1"/>
+          </a:lnRef>
+          <a:fillRef idx="0">
+            <a:schemeClr val="accent1"/>
+          </a:fillRef>
+          <a:effectRef idx="0">
+            <a:schemeClr val="accent1"/>
+          </a:effectRef>
+          <a:fontRef idx="minor">
+            <a:schemeClr val="tx1"/>
+          </a:fontRef>
+        </p:style>
+      </p:cxnSp>
+      <p:sp>
+        <p:nvSpPr>
+          <p:cNvPr id="94" name="Magnetic Disk 93"/>
+          <p:cNvSpPr/>
+          <p:nvPr/>
+        </p:nvSpPr>
+        <p:spPr>
+          <a:xfrm>
+            <a:off x="697281" y="4804060"/>
+            <a:ext cx="909851" cy="609600"/>
+          </a:xfrm>
+          <a:prstGeom prst="flowChartMagneticDisk">
+            <a:avLst/>
+          </a:prstGeom>
+          <a:solidFill>
+            <a:schemeClr val="bg1"/>
+          </a:solidFill>
+          <a:ln>
+            <a:solidFill>
+              <a:schemeClr val="tx1"/>
+            </a:solidFill>
+          </a:ln>
+        </p:spPr>
+        <p:style>
+          <a:lnRef idx="2">
+            <a:schemeClr val="accent1">
+              <a:shade val="50000"/>
+            </a:schemeClr>
+          </a:lnRef>
+          <a:fillRef idx="1">
+            <a:schemeClr val="accent1"/>
+          </a:fillRef>
+          <a:effectRef idx="0">
+            <a:schemeClr val="accent1"/>
+          </a:effectRef>
+          <a:fontRef idx="minor">
+            <a:schemeClr val="lt1"/>
+          </a:fontRef>
+        </p:style>
+        <p:txBody>
+          <a:bodyPr rtlCol="0" anchor="ctr"/>
+          <a:lstStyle/>
+          <a:p>
+            <a:pPr algn="ctr"/>
+            <a:r>
+              <a:rPr lang="en-US" sz="1200" dirty="0" smtClean="0">
+                <a:solidFill>
+                  <a:schemeClr val="tx1"/>
+                </a:solidFill>
+                <a:latin typeface="CMU Typewriter Text Variable Width Medium" charset="0"/>
+                <a:ea typeface="CMU Typewriter Text Variable Width Medium" charset="0"/>
+                <a:cs typeface="CMU Typewriter Text Variable Width Medium" charset="0"/>
+              </a:rPr>
+              <a:t>OSOR</a:t>
+            </a:r>
+            <a:endParaRPr lang="en-US" sz="1200" dirty="0">
+              <a:solidFill>
+                <a:schemeClr val="tx1"/>
+              </a:solidFill>
+              <a:latin typeface="CMU Typewriter Text Variable Width Medium" charset="0"/>
+              <a:ea typeface="CMU Typewriter Text Variable Width Medium" charset="0"/>
+              <a:cs typeface="CMU Typewriter Text Variable Width Medium" charset="0"/>
+            </a:endParaRPr>
+          </a:p>
+        </p:txBody>
+      </p:sp>
+      <p:sp>
+        <p:nvSpPr>
+          <p:cNvPr id="96" name="Magnetic Disk 95"/>
+          <p:cNvSpPr/>
+          <p:nvPr/>
+        </p:nvSpPr>
+        <p:spPr>
+          <a:xfrm>
+            <a:off x="4087096" y="3671460"/>
+            <a:ext cx="909851" cy="1163783"/>
+          </a:xfrm>
+          <a:prstGeom prst="flowChartMagneticDisk">
+            <a:avLst/>
+          </a:prstGeom>
+          <a:solidFill>
+            <a:schemeClr val="bg1"/>
+          </a:solidFill>
+          <a:ln>
+            <a:solidFill>
+              <a:schemeClr val="tx1"/>
+            </a:solidFill>
+          </a:ln>
+        </p:spPr>
+        <p:style>
+          <a:lnRef idx="2">
+            <a:schemeClr val="accent1">
+              <a:shade val="50000"/>
+            </a:schemeClr>
+          </a:lnRef>
+          <a:fillRef idx="1">
+            <a:schemeClr val="accent1"/>
+          </a:fillRef>
+          <a:effectRef idx="0">
+            <a:schemeClr val="accent1"/>
+          </a:effectRef>
+          <a:fontRef idx="minor">
+            <a:schemeClr val="lt1"/>
+          </a:fontRef>
+        </p:style>
+        <p:txBody>
+          <a:bodyPr rtlCol="0" anchor="ctr"/>
+          <a:lstStyle/>
+          <a:p>
+            <a:pPr algn="ctr"/>
+            <a:r>
+              <a:rPr lang="en-US" sz="1200" dirty="0" smtClean="0">
+                <a:solidFill>
+                  <a:schemeClr val="tx1"/>
+                </a:solidFill>
+                <a:latin typeface="CMU Typewriter Text Variable Width Medium" charset="0"/>
+                <a:ea typeface="CMU Typewriter Text Variable Width Medium" charset="0"/>
+                <a:cs typeface="CMU Typewriter Text Variable Width Medium" charset="0"/>
+              </a:rPr>
+              <a:t>Streets for which data is missing</a:t>
+            </a:r>
+            <a:endParaRPr lang="en-US" sz="1200" dirty="0">
+              <a:solidFill>
+                <a:schemeClr val="tx1"/>
+              </a:solidFill>
+              <a:latin typeface="CMU Typewriter Text Variable Width Medium" charset="0"/>
+              <a:ea typeface="CMU Typewriter Text Variable Width Medium" charset="0"/>
+              <a:cs typeface="CMU Typewriter Text Variable Width Medium" charset="0"/>
+            </a:endParaRPr>
+          </a:p>
+        </p:txBody>
+      </p:sp>
+      <p:cxnSp>
+        <p:nvCxnSpPr>
+          <p:cNvPr id="97" name="Elbow Connector 96"/>
+          <p:cNvCxnSpPr>
+            <a:stCxn id="43" idx="4"/>
+            <a:endCxn id="96" idx="2"/>
+          </p:cNvCxnSpPr>
+          <p:nvPr/>
+        </p:nvCxnSpPr>
+        <p:spPr>
+          <a:xfrm>
+            <a:off x="3061860" y="1607125"/>
+            <a:ext cx="1025236" cy="2646227"/>
+          </a:xfrm>
+          <a:prstGeom prst="bentConnector3">
+            <a:avLst>
+              <a:gd name="adj1" fmla="val 56757"/>
+            </a:avLst>
+          </a:prstGeom>
+          <a:ln>
+            <a:solidFill>
+              <a:schemeClr val="tx1"/>
+            </a:solidFill>
+            <a:tailEnd type="triangle" w="lg" len="lg"/>
+          </a:ln>
+        </p:spPr>
+        <p:style>
+          <a:lnRef idx="1">
+            <a:schemeClr val="accent1"/>
+          </a:lnRef>
+          <a:fillRef idx="0">
+            <a:schemeClr val="accent1"/>
+          </a:fillRef>
+          <a:effectRef idx="0">
+            <a:schemeClr val="accent1"/>
+          </a:effectRef>
+          <a:fontRef idx="minor">
+            <a:schemeClr val="tx1"/>
+          </a:fontRef>
+        </p:style>
+      </p:cxnSp>
+      <p:cxnSp>
+        <p:nvCxnSpPr>
+          <p:cNvPr id="100" name="Elbow Connector 99"/>
+          <p:cNvCxnSpPr>
+            <a:stCxn id="36" idx="4"/>
+            <a:endCxn id="96" idx="2"/>
+          </p:cNvCxnSpPr>
+          <p:nvPr/>
+        </p:nvCxnSpPr>
+        <p:spPr>
+          <a:xfrm>
+            <a:off x="1607133" y="2923310"/>
+            <a:ext cx="2479963" cy="1330042"/>
+          </a:xfrm>
+          <a:prstGeom prst="bentConnector3">
+            <a:avLst>
+              <a:gd name="adj1" fmla="val 68994"/>
+            </a:avLst>
+          </a:prstGeom>
+          <a:ln>
+            <a:solidFill>
+              <a:schemeClr val="tx1"/>
+            </a:solidFill>
+            <a:tailEnd type="triangle" w="lg" len="lg"/>
+          </a:ln>
+        </p:spPr>
+        <p:style>
+          <a:lnRef idx="1">
+            <a:schemeClr val="accent1"/>
+          </a:lnRef>
+          <a:fillRef idx="0">
+            <a:schemeClr val="accent1"/>
+          </a:fillRef>
+          <a:effectRef idx="0">
+            <a:schemeClr val="accent1"/>
+          </a:effectRef>
+          <a:fontRef idx="minor">
+            <a:schemeClr val="tx1"/>
+          </a:fontRef>
+        </p:style>
+      </p:cxnSp>
+      <p:sp>
+        <p:nvSpPr>
+          <p:cNvPr id="106" name="Rectangle 105"/>
+          <p:cNvSpPr/>
+          <p:nvPr/>
+        </p:nvSpPr>
+        <p:spPr>
+          <a:xfrm>
+            <a:off x="5948257" y="4156368"/>
+            <a:ext cx="1366947" cy="924790"/>
+          </a:xfrm>
+          <a:prstGeom prst="rect">
+            <a:avLst/>
+          </a:prstGeom>
+          <a:solidFill>
+            <a:schemeClr val="bg1"/>
+          </a:solidFill>
+          <a:ln>
+            <a:solidFill>
+              <a:schemeClr val="tx1"/>
+            </a:solidFill>
+          </a:ln>
+        </p:spPr>
+        <p:style>
+          <a:lnRef idx="2">
+            <a:schemeClr val="accent1">
+              <a:shade val="50000"/>
+            </a:schemeClr>
+          </a:lnRef>
+          <a:fillRef idx="1">
+            <a:schemeClr val="accent1"/>
+          </a:fillRef>
+          <a:effectRef idx="0">
+            <a:schemeClr val="accent1"/>
+          </a:effectRef>
+          <a:fontRef idx="minor">
+            <a:schemeClr val="lt1"/>
+          </a:fontRef>
+        </p:style>
+        <p:txBody>
+          <a:bodyPr rtlCol="0" anchor="ctr"/>
+          <a:lstStyle/>
+          <a:p>
+            <a:pPr algn="ctr"/>
+            <a:r>
+              <a:rPr lang="en-US" sz="1200" dirty="0" smtClean="0">
+                <a:solidFill>
+                  <a:schemeClr val="tx1"/>
+                </a:solidFill>
+                <a:latin typeface="CMU Typewriter Text Variable Width Medium" charset="0"/>
+                <a:ea typeface="CMU Typewriter Text Variable Width Medium" charset="0"/>
+                <a:cs typeface="CMU Typewriter Text Variable Width Medium" charset="0"/>
+              </a:rPr>
+              <a:t>Augmentation with elements to support crowdsourcing</a:t>
+            </a:r>
+            <a:endParaRPr lang="en-US" sz="1200" dirty="0">
+              <a:solidFill>
+                <a:schemeClr val="tx1"/>
+              </a:solidFill>
+              <a:latin typeface="CMU Typewriter Text Variable Width Medium" charset="0"/>
+              <a:ea typeface="CMU Typewriter Text Variable Width Medium" charset="0"/>
+              <a:cs typeface="CMU Typewriter Text Variable Width Medium" charset="0"/>
+            </a:endParaRPr>
+          </a:p>
+        </p:txBody>
+      </p:sp>
+      <p:cxnSp>
+        <p:nvCxnSpPr>
+          <p:cNvPr id="107" name="Elbow Connector 106"/>
+          <p:cNvCxnSpPr>
+            <a:stCxn id="94" idx="4"/>
+            <a:endCxn id="106" idx="1"/>
+          </p:cNvCxnSpPr>
+          <p:nvPr/>
+        </p:nvCxnSpPr>
+        <p:spPr>
+          <a:xfrm flipV="1">
+            <a:off x="1607132" y="4618763"/>
+            <a:ext cx="4341125" cy="490097"/>
+          </a:xfrm>
+          <a:prstGeom prst="bentConnector3">
+            <a:avLst>
+              <a:gd name="adj1" fmla="val 89255"/>
+            </a:avLst>
+          </a:prstGeom>
+          <a:ln>
+            <a:solidFill>
+              <a:schemeClr val="tx1"/>
+            </a:solidFill>
+            <a:tailEnd type="triangle" w="lg" len="lg"/>
+          </a:ln>
+        </p:spPr>
+        <p:style>
+          <a:lnRef idx="1">
+            <a:schemeClr val="accent1"/>
+          </a:lnRef>
+          <a:fillRef idx="0">
+            <a:schemeClr val="accent1"/>
+          </a:fillRef>
+          <a:effectRef idx="0">
+            <a:schemeClr val="accent1"/>
+          </a:effectRef>
+          <a:fontRef idx="minor">
+            <a:schemeClr val="tx1"/>
+          </a:fontRef>
+        </p:style>
+      </p:cxnSp>
+      <p:cxnSp>
+        <p:nvCxnSpPr>
+          <p:cNvPr id="111" name="Elbow Connector 110"/>
+          <p:cNvCxnSpPr>
+            <a:stCxn id="96" idx="4"/>
+            <a:endCxn id="106" idx="1"/>
+          </p:cNvCxnSpPr>
+          <p:nvPr/>
+        </p:nvCxnSpPr>
+        <p:spPr>
+          <a:xfrm>
+            <a:off x="4996947" y="4253352"/>
+            <a:ext cx="951310" cy="365411"/>
+          </a:xfrm>
+          <a:prstGeom prst="bentConnector3">
+            <a:avLst>
+              <a:gd name="adj1" fmla="val 50000"/>
+            </a:avLst>
+          </a:prstGeom>
+          <a:ln>
+            <a:solidFill>
+              <a:schemeClr val="tx1"/>
+            </a:solidFill>
+            <a:tailEnd type="triangle" w="lg" len="lg"/>
+          </a:ln>
+        </p:spPr>
+        <p:style>
+          <a:lnRef idx="1">
+            <a:schemeClr val="accent1"/>
+          </a:lnRef>
+          <a:fillRef idx="0">
+            <a:schemeClr val="accent1"/>
+          </a:fillRef>
+          <a:effectRef idx="0">
+            <a:schemeClr val="accent1"/>
+          </a:effectRef>
+          <a:fontRef idx="minor">
+            <a:schemeClr val="tx1"/>
+          </a:fontRef>
+        </p:style>
+      </p:cxnSp>
+      <p:sp>
+        <p:nvSpPr>
+          <p:cNvPr id="117" name="Cloud 116"/>
+          <p:cNvSpPr/>
+          <p:nvPr/>
+        </p:nvSpPr>
+        <p:spPr>
+          <a:xfrm>
+            <a:off x="7804662" y="4199658"/>
+            <a:ext cx="1011382" cy="827807"/>
+          </a:xfrm>
+          <a:prstGeom prst="cloud">
+            <a:avLst/>
+          </a:prstGeom>
+          <a:solidFill>
+            <a:schemeClr val="bg1"/>
+          </a:solidFill>
+          <a:ln>
+            <a:solidFill>
+              <a:schemeClr val="tx1"/>
+            </a:solidFill>
+          </a:ln>
+        </p:spPr>
+        <p:style>
+          <a:lnRef idx="2">
+            <a:schemeClr val="accent1">
+              <a:shade val="50000"/>
+            </a:schemeClr>
+          </a:lnRef>
+          <a:fillRef idx="1">
+            <a:schemeClr val="accent1"/>
+          </a:fillRef>
+          <a:effectRef idx="0">
+            <a:schemeClr val="accent1"/>
+          </a:effectRef>
+          <a:fontRef idx="minor">
+            <a:schemeClr val="lt1"/>
+          </a:fontRef>
+        </p:style>
+        <p:txBody>
+          <a:bodyPr rtlCol="0" anchor="ctr"/>
+          <a:lstStyle/>
+          <a:p>
+            <a:pPr algn="ctr"/>
+            <a:r>
+              <a:rPr lang="en-US" sz="1200" dirty="0" err="1" smtClean="0">
+                <a:solidFill>
+                  <a:schemeClr val="tx1"/>
+                </a:solidFill>
+                <a:latin typeface="CMU Typewriter Text Variable Width Medium" charset="0"/>
+                <a:ea typeface="CMU Typewriter Text Variable Width Medium" charset="0"/>
+                <a:cs typeface="CMU Typewriter Text Variable Width Medium" charset="0"/>
+              </a:rPr>
+              <a:t>Crowdflower</a:t>
+            </a:r>
+            <a:endParaRPr lang="en-US" sz="1200" dirty="0">
+              <a:solidFill>
+                <a:schemeClr val="tx1"/>
+              </a:solidFill>
+              <a:latin typeface="CMU Typewriter Text Variable Width Medium" charset="0"/>
+              <a:ea typeface="CMU Typewriter Text Variable Width Medium" charset="0"/>
+              <a:cs typeface="CMU Typewriter Text Variable Width Medium" charset="0"/>
+            </a:endParaRPr>
+          </a:p>
+        </p:txBody>
+      </p:sp>
+      <p:cxnSp>
+        <p:nvCxnSpPr>
+          <p:cNvPr id="118" name="Elbow Connector 117"/>
+          <p:cNvCxnSpPr>
+            <a:stCxn id="106" idx="3"/>
+            <a:endCxn id="117" idx="2"/>
+          </p:cNvCxnSpPr>
+          <p:nvPr/>
+        </p:nvCxnSpPr>
+        <p:spPr>
+          <a:xfrm flipV="1">
+            <a:off x="7315204" y="4613562"/>
+            <a:ext cx="492595" cy="5201"/>
+          </a:xfrm>
+          <a:prstGeom prst="bentConnector3">
+            <a:avLst>
+              <a:gd name="adj1" fmla="val 50000"/>
+            </a:avLst>
+          </a:prstGeom>
+          <a:ln>
+            <a:solidFill>
+              <a:schemeClr val="tx1"/>
+            </a:solidFill>
+            <a:tailEnd type="triangle" w="lg" len="lg"/>
+          </a:ln>
+        </p:spPr>
+        <p:style>
+          <a:lnRef idx="1">
+            <a:schemeClr val="accent1"/>
+          </a:lnRef>
+          <a:fillRef idx="0">
+            <a:schemeClr val="accent1"/>
+          </a:fillRef>
+          <a:effectRef idx="0">
+            <a:schemeClr val="accent1"/>
+          </a:effectRef>
+          <a:fontRef idx="minor">
+            <a:schemeClr val="tx1"/>
+          </a:fontRef>
+        </p:style>
+      </p:cxnSp>
+      <p:sp>
+        <p:nvSpPr>
+          <p:cNvPr id="122" name="Rectangle 121"/>
+          <p:cNvSpPr/>
+          <p:nvPr/>
+        </p:nvSpPr>
+        <p:spPr>
+          <a:xfrm>
+            <a:off x="9236987" y="4270661"/>
+            <a:ext cx="1366947" cy="685799"/>
+          </a:xfrm>
+          <a:prstGeom prst="rect">
+            <a:avLst/>
+          </a:prstGeom>
+          <a:solidFill>
+            <a:schemeClr val="bg1"/>
+          </a:solidFill>
+          <a:ln>
+            <a:solidFill>
+              <a:schemeClr val="tx1"/>
+            </a:solidFill>
+          </a:ln>
+        </p:spPr>
+        <p:style>
+          <a:lnRef idx="2">
+            <a:schemeClr val="accent1">
+              <a:shade val="50000"/>
+            </a:schemeClr>
+          </a:lnRef>
+          <a:fillRef idx="1">
+            <a:schemeClr val="accent1"/>
+          </a:fillRef>
+          <a:effectRef idx="0">
+            <a:schemeClr val="accent1"/>
+          </a:effectRef>
+          <a:fontRef idx="minor">
+            <a:schemeClr val="lt1"/>
+          </a:fontRef>
+        </p:style>
+        <p:txBody>
+          <a:bodyPr rtlCol="0" anchor="ctr"/>
+          <a:lstStyle/>
+          <a:p>
+            <a:pPr algn="ctr"/>
+            <a:r>
+              <a:rPr lang="en-US" sz="1200" dirty="0" smtClean="0">
+                <a:solidFill>
+                  <a:schemeClr val="tx1"/>
+                </a:solidFill>
+                <a:latin typeface="CMU Typewriter Text Variable Width Medium" charset="0"/>
+                <a:ea typeface="CMU Typewriter Text Variable Width Medium" charset="0"/>
+                <a:cs typeface="CMU Typewriter Text Variable Width Medium" charset="0"/>
+              </a:rPr>
+              <a:t>Results collection and aggregation</a:t>
+            </a:r>
+            <a:endParaRPr lang="en-US" sz="1200" dirty="0">
+              <a:solidFill>
+                <a:schemeClr val="tx1"/>
+              </a:solidFill>
+              <a:latin typeface="CMU Typewriter Text Variable Width Medium" charset="0"/>
+              <a:ea typeface="CMU Typewriter Text Variable Width Medium" charset="0"/>
+              <a:cs typeface="CMU Typewriter Text Variable Width Medium" charset="0"/>
+            </a:endParaRPr>
+          </a:p>
+        </p:txBody>
+      </p:sp>
+      <p:cxnSp>
+        <p:nvCxnSpPr>
+          <p:cNvPr id="124" name="Elbow Connector 123"/>
+          <p:cNvCxnSpPr>
+            <a:stCxn id="122" idx="3"/>
+            <a:endCxn id="58" idx="3"/>
+          </p:cNvCxnSpPr>
+          <p:nvPr/>
+        </p:nvCxnSpPr>
+        <p:spPr>
+          <a:xfrm flipH="1" flipV="1">
+            <a:off x="4542022" y="2784761"/>
+            <a:ext cx="6061912" cy="1828800"/>
+          </a:xfrm>
+          <a:prstGeom prst="bentConnector4">
+            <a:avLst>
+              <a:gd name="adj1" fmla="val -3771"/>
+              <a:gd name="adj2" fmla="val 79072"/>
+            </a:avLst>
+          </a:prstGeom>
+          <a:ln>
+            <a:solidFill>
+              <a:schemeClr val="tx1"/>
+            </a:solidFill>
+            <a:tailEnd type="triangle" w="lg" len="lg"/>
+          </a:ln>
+        </p:spPr>
+        <p:style>
+          <a:lnRef idx="1">
+            <a:schemeClr val="accent1"/>
+          </a:lnRef>
+          <a:fillRef idx="0">
+            <a:schemeClr val="accent1"/>
+          </a:fillRef>
+          <a:effectRef idx="0">
+            <a:schemeClr val="accent1"/>
+          </a:effectRef>
+          <a:fontRef idx="minor">
+            <a:schemeClr val="tx1"/>
+          </a:fontRef>
+        </p:style>
+      </p:cxnSp>
+      <p:cxnSp>
+        <p:nvCxnSpPr>
+          <p:cNvPr id="128" name="Elbow Connector 127"/>
+          <p:cNvCxnSpPr>
+            <a:stCxn id="117" idx="0"/>
+            <a:endCxn id="122" idx="1"/>
+          </p:cNvCxnSpPr>
+          <p:nvPr/>
+        </p:nvCxnSpPr>
+        <p:spPr>
+          <a:xfrm flipV="1">
+            <a:off x="8815201" y="4613561"/>
+            <a:ext cx="421786" cy="1"/>
+          </a:xfrm>
+          <a:prstGeom prst="bentConnector3">
+            <a:avLst>
+              <a:gd name="adj1" fmla="val 50000"/>
+            </a:avLst>
+          </a:prstGeom>
+          <a:ln>
+            <a:solidFill>
+              <a:schemeClr val="tx1"/>
+            </a:solidFill>
+            <a:tailEnd type="triangle" w="lg" len="lg"/>
+          </a:ln>
+        </p:spPr>
+        <p:style>
+          <a:lnRef idx="1">
+            <a:schemeClr val="accent1"/>
+          </a:lnRef>
+          <a:fillRef idx="0">
+            <a:schemeClr val="accent1"/>
+          </a:fillRef>
+          <a:effectRef idx="0">
+            <a:schemeClr val="accent1"/>
+          </a:effectRef>
+          <a:fontRef idx="minor">
+            <a:schemeClr val="tx1"/>
+          </a:fontRef>
+        </p:style>
+      </p:cxnSp>
+      <p:cxnSp>
+        <p:nvCxnSpPr>
+          <p:cNvPr id="131" name="Elbow Connector 130"/>
+          <p:cNvCxnSpPr>
+            <a:stCxn id="122" idx="0"/>
+            <a:endCxn id="96" idx="1"/>
+          </p:cNvCxnSpPr>
+          <p:nvPr/>
+        </p:nvCxnSpPr>
+        <p:spPr>
+          <a:xfrm rot="16200000" flipV="1">
+            <a:off x="6931642" y="1281841"/>
+            <a:ext cx="599201" cy="5378439"/>
+          </a:xfrm>
+          <a:prstGeom prst="bentConnector3">
+            <a:avLst>
+              <a:gd name="adj1" fmla="val 149712"/>
+            </a:avLst>
+          </a:prstGeom>
+          <a:ln>
+            <a:solidFill>
+              <a:schemeClr val="tx1"/>
+            </a:solidFill>
+            <a:tailEnd type="triangle" w="lg" len="lg"/>
+          </a:ln>
+        </p:spPr>
+        <p:style>
+          <a:lnRef idx="1">
+            <a:schemeClr val="accent1"/>
+          </a:lnRef>
+          <a:fillRef idx="0">
+            <a:schemeClr val="accent1"/>
+          </a:fillRef>
+          <a:effectRef idx="0">
+            <a:schemeClr val="accent1"/>
+          </a:effectRef>
+          <a:fontRef idx="minor">
+            <a:schemeClr val="tx1"/>
+          </a:fontRef>
+        </p:style>
+      </p:cxnSp>
+      <p:sp>
+        <p:nvSpPr>
+          <p:cNvPr id="143" name="TextBox 142"/>
+          <p:cNvSpPr txBox="1"/>
+          <p:nvPr/>
+        </p:nvSpPr>
+        <p:spPr>
+          <a:xfrm>
+            <a:off x="10603934" y="4655125"/>
+            <a:ext cx="708848" cy="276999"/>
+          </a:xfrm>
+          <a:prstGeom prst="rect">
+            <a:avLst/>
+          </a:prstGeom>
+          <a:noFill/>
+        </p:spPr>
+        <p:txBody>
+          <a:bodyPr wrap="none" rtlCol="0">
+            <a:spAutoFit/>
+          </a:bodyPr>
+          <a:lstStyle/>
+          <a:p>
+            <a:r>
+              <a:rPr lang="en-US" sz="1200" dirty="0" smtClean="0">
+                <a:latin typeface="CMU Typewriter Text Variable Width Medium" charset="0"/>
+                <a:ea typeface="CMU Typewriter Text Variable Width Medium" charset="0"/>
+                <a:cs typeface="CMU Typewriter Text Variable Width Medium" charset="0"/>
+              </a:rPr>
+              <a:t>Success</a:t>
+            </a:r>
+            <a:endParaRPr lang="en-US" sz="1200" dirty="0">
+              <a:latin typeface="CMU Typewriter Text Variable Width Medium" charset="0"/>
+              <a:ea typeface="CMU Typewriter Text Variable Width Medium" charset="0"/>
+              <a:cs typeface="CMU Typewriter Text Variable Width Medium" charset="0"/>
+            </a:endParaRPr>
+          </a:p>
+        </p:txBody>
+      </p:sp>
+      <p:sp>
+        <p:nvSpPr>
+          <p:cNvPr id="144" name="TextBox 143"/>
+          <p:cNvSpPr txBox="1"/>
+          <p:nvPr/>
+        </p:nvSpPr>
+        <p:spPr>
+          <a:xfrm>
+            <a:off x="9895087" y="3978082"/>
+            <a:ext cx="455574" cy="276999"/>
+          </a:xfrm>
+          <a:prstGeom prst="rect">
+            <a:avLst/>
+          </a:prstGeom>
+          <a:noFill/>
+        </p:spPr>
+        <p:txBody>
+          <a:bodyPr wrap="none" rtlCol="0">
+            <a:spAutoFit/>
+          </a:bodyPr>
+          <a:lstStyle/>
+          <a:p>
+            <a:r>
+              <a:rPr lang="en-US" sz="1200" dirty="0" smtClean="0">
+                <a:latin typeface="CMU Typewriter Text Variable Width Medium" charset="0"/>
+                <a:ea typeface="CMU Typewriter Text Variable Width Medium" charset="0"/>
+                <a:cs typeface="CMU Typewriter Text Variable Width Medium" charset="0"/>
+              </a:rPr>
+              <a:t>Fail</a:t>
+            </a:r>
+            <a:endParaRPr lang="en-US" sz="1200" dirty="0">
+              <a:latin typeface="CMU Typewriter Text Variable Width Medium" charset="0"/>
+              <a:ea typeface="CMU Typewriter Text Variable Width Medium" charset="0"/>
+              <a:cs typeface="CMU Typewriter Text Variable Width Medium" charset="0"/>
+            </a:endParaRPr>
+          </a:p>
+        </p:txBody>
+      </p:sp>
+      <p:sp>
+        <p:nvSpPr>
+          <p:cNvPr id="149" name="Cloud 148"/>
+          <p:cNvSpPr/>
+          <p:nvPr/>
+        </p:nvSpPr>
+        <p:spPr>
+          <a:xfrm>
+            <a:off x="9404923" y="713070"/>
+            <a:ext cx="1553435" cy="1104034"/>
+          </a:xfrm>
+          <a:prstGeom prst="cloud">
+            <a:avLst/>
+          </a:prstGeom>
+          <a:solidFill>
+            <a:schemeClr val="bg1"/>
+          </a:solidFill>
+          <a:ln>
+            <a:solidFill>
+              <a:schemeClr val="tx1"/>
+            </a:solidFill>
+          </a:ln>
+        </p:spPr>
+        <p:style>
+          <a:lnRef idx="2">
+            <a:schemeClr val="accent1">
+              <a:shade val="50000"/>
+            </a:schemeClr>
+          </a:lnRef>
+          <a:fillRef idx="1">
+            <a:schemeClr val="accent1"/>
+          </a:fillRef>
+          <a:effectRef idx="0">
+            <a:schemeClr val="accent1"/>
+          </a:effectRef>
+          <a:fontRef idx="minor">
+            <a:schemeClr val="lt1"/>
+          </a:fontRef>
+        </p:style>
+        <p:txBody>
+          <a:bodyPr rtlCol="0" anchor="ctr"/>
+          <a:lstStyle/>
+          <a:p>
+            <a:pPr algn="ctr"/>
+            <a:r>
+              <a:rPr lang="en-US" sz="1200" dirty="0" smtClean="0">
+                <a:solidFill>
+                  <a:schemeClr val="tx1"/>
+                </a:solidFill>
+                <a:latin typeface="CMU Typewriter Text Variable Width Medium" charset="0"/>
+                <a:ea typeface="CMU Typewriter Text Variable Width Medium" charset="0"/>
+                <a:cs typeface="CMU Typewriter Text Variable Width Medium" charset="0"/>
+              </a:rPr>
+              <a:t>Other OLAF creation processes</a:t>
+            </a:r>
+            <a:endParaRPr lang="en-US" sz="1200" dirty="0">
+              <a:solidFill>
+                <a:schemeClr val="tx1"/>
+              </a:solidFill>
+              <a:latin typeface="CMU Typewriter Text Variable Width Medium" charset="0"/>
+              <a:ea typeface="CMU Typewriter Text Variable Width Medium" charset="0"/>
+              <a:cs typeface="CMU Typewriter Text Variable Width Medium" charset="0"/>
+            </a:endParaRPr>
+          </a:p>
+        </p:txBody>
+      </p:sp>
+      <p:cxnSp>
+        <p:nvCxnSpPr>
+          <p:cNvPr id="159" name="Elbow Connector 158"/>
+          <p:cNvCxnSpPr>
+            <a:stCxn id="82" idx="4"/>
+            <a:endCxn id="149" idx="1"/>
+          </p:cNvCxnSpPr>
+          <p:nvPr/>
+        </p:nvCxnSpPr>
+        <p:spPr>
+          <a:xfrm flipV="1">
+            <a:off x="8714513" y="1815928"/>
+            <a:ext cx="1467128" cy="386942"/>
+          </a:xfrm>
+          <a:prstGeom prst="bentConnector2">
+            <a:avLst/>
+          </a:prstGeom>
+          <a:ln>
+            <a:solidFill>
+              <a:schemeClr val="tx1"/>
+            </a:solidFill>
+            <a:tailEnd type="triangle" w="lg" len="lg"/>
+          </a:ln>
+        </p:spPr>
+        <p:style>
+          <a:lnRef idx="1">
+            <a:schemeClr val="accent1"/>
+          </a:lnRef>
+          <a:fillRef idx="0">
+            <a:schemeClr val="accent1"/>
+          </a:fillRef>
+          <a:effectRef idx="0">
+            <a:schemeClr val="accent1"/>
+          </a:effectRef>
+          <a:fontRef idx="minor">
+            <a:schemeClr val="tx1"/>
+          </a:fontRef>
+        </p:style>
+      </p:cxnSp>
+      <p:cxnSp>
+        <p:nvCxnSpPr>
+          <p:cNvPr id="187" name="Elbow Connector 186"/>
+          <p:cNvCxnSpPr>
+            <a:stCxn id="58" idx="4"/>
+            <a:endCxn id="149" idx="2"/>
+          </p:cNvCxnSpPr>
+          <p:nvPr/>
+        </p:nvCxnSpPr>
+        <p:spPr>
+          <a:xfrm flipV="1">
+            <a:off x="4996947" y="1265087"/>
+            <a:ext cx="4412795" cy="937783"/>
+          </a:xfrm>
+          <a:prstGeom prst="bentConnector3">
+            <a:avLst>
+              <a:gd name="adj1" fmla="val 8557"/>
+            </a:avLst>
+          </a:prstGeom>
+          <a:ln>
+            <a:solidFill>
+              <a:schemeClr val="tx1"/>
+            </a:solidFill>
+            <a:tailEnd type="triangle" w="lg" len="lg"/>
+          </a:ln>
+        </p:spPr>
+        <p:style>
+          <a:lnRef idx="1">
+            <a:schemeClr val="accent1"/>
+          </a:lnRef>
+          <a:fillRef idx="0">
+            <a:schemeClr val="accent1"/>
+          </a:fillRef>
+          <a:effectRef idx="0">
+            <a:schemeClr val="accent1"/>
+          </a:effectRef>
+          <a:fontRef idx="minor">
+            <a:schemeClr val="tx1"/>
+          </a:fontRef>
+        </p:style>
+      </p:cxnSp>
+    </p:spTree>
+    <p:extLst>
+      <p:ext uri="{BB962C8B-B14F-4D97-AF65-F5344CB8AC3E}">
+        <p14:creationId xmlns:p14="http://schemas.microsoft.com/office/powerpoint/2010/main" val="1708015843"/>
       </p:ext>
     </p:extLst>
   </p:cSld>

</xml_diff>

<commit_message>
Revised inference results picture
</commit_message>
<xml_diff>
--- a/images_src/misc_powerpoint.pptx
+++ b/images_src/misc_powerpoint.pptx
@@ -4355,7 +4355,7 @@
         <p:spPr bwMode="auto">
           <a:xfrm>
             <a:off x="7408968" y="2188597"/>
-            <a:ext cx="1164188" cy="3062139"/>
+            <a:ext cx="1164188" cy="2912400"/>
           </a:xfrm>
           <a:prstGeom prst="rect">
             <a:avLst/>
@@ -4392,29 +4392,26 @@
               </a:spcAft>
             </a:pPr>
             <a:r>
-              <a:rPr lang="en-US" sz="1305" dirty="0">
-                <a:latin typeface="Lucida Sans" pitchFamily="-106" charset="0"/>
-                <a:ea typeface="ＭＳ Ｐゴシック" pitchFamily="-106" charset="-128"/>
-                <a:cs typeface="ＭＳ Ｐゴシック" pitchFamily="-106" charset="-128"/>
+              <a:rPr lang="en-US" sz="1200" dirty="0">
+                <a:latin typeface="CMU Typewriter Text Variable Width Medium" charset="0"/>
+                <a:ea typeface="CMU Typewriter Text Variable Width Medium" charset="0"/>
+                <a:cs typeface="CMU Typewriter Text Variable Width Medium" charset="0"/>
               </a:rPr>
-              <a:t>82% of </a:t>
-            </a:r>
-            <a:r>
-              <a:rPr lang="en-US" sz="1305" u="sng" dirty="0">
-                <a:latin typeface="Lucida Sans" pitchFamily="-106" charset="0"/>
-                <a:ea typeface="ＭＳ Ｐゴシック" pitchFamily="-106" charset="-128"/>
-                <a:cs typeface="ＭＳ Ｐゴシック" pitchFamily="-106" charset="-128"/>
+              <a:t>82% of streets are referenced in </a:t>
+            </a:r>
+            <a:r>
+              <a:rPr lang="en-US" sz="1200" dirty="0" smtClean="0">
+                <a:latin typeface="CMU Typewriter Text Variable Width Medium" charset="0"/>
+                <a:ea typeface="CMU Typewriter Text Variable Width Medium" charset="0"/>
+                <a:cs typeface="CMU Typewriter Text Variable Width Medium" charset="0"/>
               </a:rPr>
-              <a:t>streets</a:t>
-            </a:r>
-            <a:r>
-              <a:rPr lang="en-US" sz="1305" dirty="0">
-                <a:latin typeface="Lucida Sans" pitchFamily="-106" charset="0"/>
-                <a:ea typeface="ＭＳ Ｐゴシック" pitchFamily="-106" charset="-128"/>
-                <a:cs typeface="ＭＳ Ｐゴシック" pitchFamily="-106" charset="-128"/>
-              </a:rPr>
-              <a:t> are referenced in Land Registry’s “Price Paid Data” (LRPP)</a:t>
-            </a:r>
+              <a:t>LRPP</a:t>
+            </a:r>
+            <a:endParaRPr lang="en-US" sz="1200" dirty="0">
+              <a:latin typeface="CMU Typewriter Text Variable Width Medium" charset="0"/>
+              <a:ea typeface="CMU Typewriter Text Variable Width Medium" charset="0"/>
+              <a:cs typeface="CMU Typewriter Text Variable Width Medium" charset="0"/>
+            </a:endParaRPr>
           </a:p>
         </p:txBody>
       </p:sp>
@@ -4426,8 +4423,8 @@
         </p:nvSpPr>
         <p:spPr bwMode="auto">
           <a:xfrm>
-            <a:off x="7408968" y="5250737"/>
-            <a:ext cx="1164188" cy="448699"/>
+            <a:off x="7408968" y="5100998"/>
+            <a:ext cx="1164188" cy="637718"/>
           </a:xfrm>
           <a:prstGeom prst="rect">
             <a:avLst/>
@@ -4465,10 +4462,10 @@
                 <a:spcPct val="0"/>
               </a:spcAft>
             </a:pPr>
-            <a:endParaRPr lang="en-US" sz="1305" dirty="0">
-              <a:latin typeface="Lucida Sans" pitchFamily="-106" charset="0"/>
-              <a:ea typeface="ＭＳ Ｐゴシック" pitchFamily="-106" charset="-128"/>
-              <a:cs typeface="ＭＳ Ｐゴシック" pitchFamily="-106" charset="-128"/>
+            <a:endParaRPr lang="en-US" sz="1200" dirty="0">
+              <a:latin typeface="CMU Typewriter Text Variable Width Medium" charset="0"/>
+              <a:ea typeface="CMU Typewriter Text Variable Width Medium" charset="0"/>
+              <a:cs typeface="CMU Typewriter Text Variable Width Medium" charset="0"/>
             </a:endParaRPr>
           </a:p>
         </p:txBody>
@@ -4482,7 +4479,7 @@
         <p:spPr bwMode="auto">
           <a:xfrm>
             <a:off x="6244780" y="2188597"/>
-            <a:ext cx="1164188" cy="3510837"/>
+            <a:ext cx="1164188" cy="3553199"/>
           </a:xfrm>
           <a:prstGeom prst="rect">
             <a:avLst/>
@@ -4519,26 +4516,26 @@
               </a:spcAft>
             </a:pPr>
             <a:r>
-              <a:rPr lang="en-US" sz="1305" dirty="0">
-                <a:latin typeface="Lucida Sans" pitchFamily="-106" charset="0"/>
-                <a:ea typeface="ＭＳ Ｐゴシック" pitchFamily="-106" charset="-128"/>
-                <a:cs typeface="ＭＳ Ｐゴシック" pitchFamily="-106" charset="-128"/>
+              <a:rPr lang="en-US" sz="1200" dirty="0">
+                <a:latin typeface="CMU Typewriter Text Variable Width Medium" charset="0"/>
+                <a:ea typeface="CMU Typewriter Text Variable Width Medium" charset="0"/>
+                <a:cs typeface="CMU Typewriter Text Variable Width Medium" charset="0"/>
               </a:rPr>
               <a:t>98% of </a:t>
             </a:r>
             <a:r>
-              <a:rPr lang="en-US" sz="1305">
-                <a:latin typeface="Lucida Sans" pitchFamily="-106" charset="0"/>
-                <a:ea typeface="ＭＳ Ｐゴシック" pitchFamily="-106" charset="-128"/>
-                <a:cs typeface="ＭＳ Ｐゴシック" pitchFamily="-106" charset="-128"/>
+              <a:rPr lang="en-US" sz="1200">
+                <a:latin typeface="CMU Typewriter Text Variable Width Medium" charset="0"/>
+                <a:ea typeface="CMU Typewriter Text Variable Width Medium" charset="0"/>
+                <a:cs typeface="CMU Typewriter Text Variable Width Medium" charset="0"/>
               </a:rPr>
               <a:t>addresses include a </a:t>
             </a:r>
             <a:r>
-              <a:rPr lang="en-US" sz="1305" dirty="0">
-                <a:latin typeface="Lucida Sans" pitchFamily="-106" charset="0"/>
-                <a:ea typeface="ＭＳ Ｐゴシック" pitchFamily="-106" charset="-128"/>
-                <a:cs typeface="ＭＳ Ｐゴシック" pitchFamily="-106" charset="-128"/>
+              <a:rPr lang="en-US" sz="1200" dirty="0">
+                <a:latin typeface="CMU Typewriter Text Variable Width Medium" charset="0"/>
+                <a:ea typeface="CMU Typewriter Text Variable Width Medium" charset="0"/>
+                <a:cs typeface="CMU Typewriter Text Variable Width Medium" charset="0"/>
               </a:rPr>
               <a:t>house number</a:t>
             </a:r>
@@ -4553,8 +4550,8 @@
         </p:nvSpPr>
         <p:spPr bwMode="auto">
           <a:xfrm>
-            <a:off x="6244780" y="5704900"/>
-            <a:ext cx="1164188" cy="119342"/>
+            <a:off x="6244780" y="5741796"/>
+            <a:ext cx="1164188" cy="82446"/>
           </a:xfrm>
           <a:prstGeom prst="rect">
             <a:avLst/>
@@ -4592,10 +4589,10 @@
                 <a:spcPct val="0"/>
               </a:spcAft>
             </a:pPr>
-            <a:endParaRPr lang="en-US" sz="1305" dirty="0">
-              <a:latin typeface="Lucida Sans" pitchFamily="-106" charset="0"/>
-              <a:ea typeface="ＭＳ Ｐゴシック" pitchFamily="-106" charset="-128"/>
-              <a:cs typeface="ＭＳ Ｐゴシック" pitchFamily="-106" charset="-128"/>
+            <a:endParaRPr lang="en-US" sz="1200" dirty="0">
+              <a:latin typeface="CMU Typewriter Text Variable Width Medium" charset="0"/>
+              <a:ea typeface="CMU Typewriter Text Variable Width Medium" charset="0"/>
+              <a:cs typeface="CMU Typewriter Text Variable Width Medium" charset="0"/>
             </a:endParaRPr>
           </a:p>
         </p:txBody>
@@ -4608,8 +4605,8 @@
         </p:nvSpPr>
         <p:spPr bwMode="auto">
           <a:xfrm>
-            <a:off x="8573156" y="5037183"/>
-            <a:ext cx="1164188" cy="662251"/>
+            <a:off x="8573156" y="4703128"/>
+            <a:ext cx="1164188" cy="1029958"/>
           </a:xfrm>
           <a:prstGeom prst="rect">
             <a:avLst/>
@@ -4647,10 +4644,10 @@
                 <a:spcPct val="0"/>
               </a:spcAft>
             </a:pPr>
-            <a:endParaRPr lang="en-US" sz="1305" dirty="0">
-              <a:latin typeface="Lucida Sans" pitchFamily="-106" charset="0"/>
-              <a:ea typeface="ＭＳ Ｐゴシック" pitchFamily="-106" charset="-128"/>
-              <a:cs typeface="ＭＳ Ｐゴシック" pitchFamily="-106" charset="-128"/>
+            <a:endParaRPr lang="en-US" sz="1200" dirty="0">
+              <a:latin typeface="CMU Typewriter Text Variable Width Medium" charset="0"/>
+              <a:ea typeface="CMU Typewriter Text Variable Width Medium" charset="0"/>
+              <a:cs typeface="CMU Typewriter Text Variable Width Medium" charset="0"/>
             </a:endParaRPr>
           </a:p>
         </p:txBody>
@@ -4664,7 +4661,7 @@
         <p:spPr bwMode="auto">
           <a:xfrm>
             <a:off x="8573156" y="2183127"/>
-            <a:ext cx="1164188" cy="2854055"/>
+            <a:ext cx="1164188" cy="2520000"/>
           </a:xfrm>
           <a:prstGeom prst="rect">
             <a:avLst/>
@@ -4701,10 +4698,10 @@
               </a:spcAft>
             </a:pPr>
             <a:r>
-              <a:rPr lang="en-US" sz="1305" dirty="0">
-                <a:latin typeface="Lucida Sans" pitchFamily="-106" charset="0"/>
-                <a:ea typeface="ＭＳ Ｐゴシック" pitchFamily="-106" charset="-128"/>
-                <a:cs typeface="ＭＳ Ｐゴシック" pitchFamily="-106" charset="-128"/>
+              <a:rPr lang="en-US" sz="1200" dirty="0">
+                <a:latin typeface="CMU Typewriter Text Variable Width Medium" charset="0"/>
+                <a:ea typeface="CMU Typewriter Text Variable Width Medium" charset="0"/>
+                <a:cs typeface="CMU Typewriter Text Variable Width Medium" charset="0"/>
               </a:rPr>
               <a:t>74% of the streets qualify for house number inference</a:t>
             </a:r>
@@ -4757,10 +4754,10 @@
               </a:spcAft>
             </a:pPr>
             <a:r>
-              <a:rPr lang="en-US" sz="1142" dirty="0">
-                <a:latin typeface="Lucida Sans" pitchFamily="-106" charset="0"/>
-                <a:ea typeface="ＭＳ Ｐゴシック" pitchFamily="-106" charset="-128"/>
-                <a:cs typeface="ＭＳ Ｐゴシック" pitchFamily="-106" charset="-128"/>
+              <a:rPr lang="en-US" sz="1200" dirty="0">
+                <a:latin typeface="CMU Typewriter Text Variable Width Medium" charset="0"/>
+                <a:ea typeface="CMU Typewriter Text Variable Width Medium" charset="0"/>
+                <a:cs typeface="CMU Typewriter Text Variable Width Medium" charset="0"/>
               </a:rPr>
               <a:t>111k house numbers are in LRPP</a:t>
             </a:r>
@@ -4813,86 +4810,12 @@
               </a:spcAft>
             </a:pPr>
             <a:r>
-              <a:rPr lang="en-US" sz="1142" dirty="0">
-                <a:latin typeface="Lucida Sans" pitchFamily="-106" charset="0"/>
-                <a:ea typeface="ＭＳ Ｐゴシック" pitchFamily="-106" charset="-128"/>
-                <a:cs typeface="ＭＳ Ｐゴシック" pitchFamily="-106" charset="-128"/>
+              <a:rPr lang="en-US" sz="1200" dirty="0">
+                <a:latin typeface="CMU Typewriter Text Variable Width Medium" charset="0"/>
+                <a:ea typeface="CMU Typewriter Text Variable Width Medium" charset="0"/>
+                <a:cs typeface="CMU Typewriter Text Variable Width Medium" charset="0"/>
               </a:rPr>
               <a:t>113k house numbers can be inferred</a:t>
-            </a:r>
-          </a:p>
-        </p:txBody>
-      </p:sp>
-      <p:sp>
-        <p:nvSpPr>
-          <p:cNvPr id="16" name="Rectangle 15"/>
-          <p:cNvSpPr/>
-          <p:nvPr/>
-        </p:nvSpPr>
-        <p:spPr bwMode="auto">
-          <a:xfrm>
-            <a:off x="9737345" y="4103915"/>
-            <a:ext cx="1164188" cy="1595519"/>
-          </a:xfrm>
-          <a:prstGeom prst="rect">
-            <a:avLst/>
-          </a:prstGeom>
-          <a:solidFill>
-            <a:schemeClr val="bg1"/>
-          </a:solidFill>
-          <a:ln w="12700" cap="flat" cmpd="sng" algn="ctr">
-            <a:solidFill>
-              <a:srgbClr val="000000"/>
-            </a:solidFill>
-            <a:prstDash val="solid"/>
-            <a:round/>
-            <a:headEnd type="none" w="med" len="med"/>
-            <a:tailEnd type="none" w="med" len="med"/>
-          </a:ln>
-          <a:effectLst/>
-        </p:spPr>
-        <p:txBody>
-          <a:bodyPr vert="horz" wrap="square" lIns="99441" tIns="49721" rIns="99441" bIns="0" numCol="1" rtlCol="0" anchor="ctr" anchorCtr="0" compatLnSpc="1">
-            <a:prstTxWarp prst="textNoShape">
-              <a:avLst/>
-            </a:prstTxWarp>
-            <a:noAutofit/>
-          </a:bodyPr>
-          <a:lstStyle/>
-          <a:p>
-            <a:pPr algn="ctr" defTabSz="994355" eaLnBrk="0" fontAlgn="base" hangingPunct="0">
-              <a:spcBef>
-                <a:spcPct val="0"/>
-              </a:spcBef>
-              <a:spcAft>
-                <a:spcPct val="0"/>
-              </a:spcAft>
-            </a:pPr>
-            <a:r>
-              <a:rPr lang="en-US" sz="3480" b="1" dirty="0">
-                <a:latin typeface="Lucida Sans" pitchFamily="-106" charset="0"/>
-                <a:ea typeface="ＭＳ Ｐゴシック" pitchFamily="-106" charset="-128"/>
-                <a:cs typeface="ＭＳ Ｐゴシック" pitchFamily="-106" charset="-128"/>
-              </a:rPr>
-              <a:t>?</a:t>
-            </a:r>
-          </a:p>
-          <a:p>
-            <a:pPr algn="ctr" defTabSz="994355" eaLnBrk="0" fontAlgn="base" hangingPunct="0">
-              <a:spcBef>
-                <a:spcPct val="0"/>
-              </a:spcBef>
-              <a:spcAft>
-                <a:spcPct val="0"/>
-              </a:spcAft>
-            </a:pPr>
-            <a:r>
-              <a:rPr lang="en-US" sz="1142" dirty="0">
-                <a:latin typeface="Lucida Sans" pitchFamily="-106" charset="0"/>
-                <a:ea typeface="ＭＳ Ｐゴシック" pitchFamily="-106" charset="-128"/>
-                <a:cs typeface="ＭＳ Ｐゴシック" pitchFamily="-106" charset="-128"/>
-              </a:rPr>
-              <a:t>Not known and not suitable for inference</a:t>
             </a:r>
           </a:p>
         </p:txBody>
@@ -4918,8 +4841,8 @@
         </p:blipFill>
         <p:spPr bwMode="auto">
           <a:xfrm>
-            <a:off x="3532466" y="2188000"/>
-            <a:ext cx="2712798" cy="3632360"/>
+            <a:off x="3532466" y="2196934"/>
+            <a:ext cx="2712798" cy="3623425"/>
           </a:xfrm>
           <a:prstGeom prst="rect">
             <a:avLst/>
@@ -4935,6 +4858,79 @@
           </a:ln>
         </p:spPr>
       </p:pic>
+      <p:sp>
+        <p:nvSpPr>
+          <p:cNvPr id="2" name="Cloud 1"/>
+          <p:cNvSpPr/>
+          <p:nvPr/>
+        </p:nvSpPr>
+        <p:spPr>
+          <a:xfrm>
+            <a:off x="9624732" y="4008646"/>
+            <a:ext cx="1389413" cy="1811713"/>
+          </a:xfrm>
+          <a:prstGeom prst="cloud">
+            <a:avLst/>
+          </a:prstGeom>
+          <a:solidFill>
+            <a:schemeClr val="bg1"/>
+          </a:solidFill>
+          <a:ln>
+            <a:solidFill>
+              <a:schemeClr val="tx1"/>
+            </a:solidFill>
+          </a:ln>
+        </p:spPr>
+        <p:style>
+          <a:lnRef idx="2">
+            <a:schemeClr val="accent1">
+              <a:shade val="50000"/>
+            </a:schemeClr>
+          </a:lnRef>
+          <a:fillRef idx="1">
+            <a:schemeClr val="accent1"/>
+          </a:fillRef>
+          <a:effectRef idx="0">
+            <a:schemeClr val="accent1"/>
+          </a:effectRef>
+          <a:fontRef idx="minor">
+            <a:schemeClr val="lt1"/>
+          </a:fontRef>
+        </p:style>
+        <p:txBody>
+          <a:bodyPr lIns="0" rtlCol="0" anchor="ctr"/>
+          <a:lstStyle/>
+          <a:p>
+            <a:pPr algn="ctr" defTabSz="994355" eaLnBrk="0" fontAlgn="base" hangingPunct="0">
+              <a:spcBef>
+                <a:spcPct val="0"/>
+              </a:spcBef>
+              <a:spcAft>
+                <a:spcPct val="0"/>
+              </a:spcAft>
+            </a:pPr>
+            <a:r>
+              <a:rPr lang="en-US" sz="1200" dirty="0">
+                <a:solidFill>
+                  <a:schemeClr val="tx1"/>
+                </a:solidFill>
+                <a:latin typeface="CMU Typewriter Text Variable Width Medium" charset="0"/>
+                <a:ea typeface="CMU Typewriter Text Variable Width Medium" charset="0"/>
+                <a:cs typeface="CMU Typewriter Text Variable Width Medium" charset="0"/>
+              </a:rPr>
+              <a:t>Not known and not suitable for inference</a:t>
+            </a:r>
+            <a:endParaRPr lang="en-US" sz="1200" dirty="0">
+              <a:solidFill>
+                <a:schemeClr val="tx1"/>
+              </a:solidFill>
+              <a:latin typeface="CMU Typewriter Text Variable Width Medium" charset="0"/>
+              <a:ea typeface="CMU Typewriter Text Variable Width Medium" charset="0"/>
+              <a:cs typeface="CMU Typewriter Text Variable Width Medium" charset="0"/>
+            </a:endParaRPr>
+          </a:p>
+        </p:txBody>
+      </p:sp>
     </p:spTree>
     <p:extLst>
       <p:ext uri="{BB962C8B-B14F-4D97-AF65-F5344CB8AC3E}">

</xml_diff>

<commit_message>
Fixed no. of named roads
</commit_message>
<xml_diff>
--- a/images_src/misc_powerpoint.pptx
+++ b/images_src/misc_powerpoint.pptx
@@ -3956,9 +3956,9 @@
         <p:grpSpPr>
           <a:xfrm>
             <a:off x="7693928" y="3071434"/>
-            <a:ext cx="2649332" cy="2788941"/>
+            <a:ext cx="2649332" cy="2330441"/>
             <a:chOff x="5692023" y="979017"/>
-            <a:chExt cx="2436167" cy="2564543"/>
+            <a:chExt cx="2436167" cy="2142934"/>
           </a:xfrm>
         </p:grpSpPr>
         <p:sp>
@@ -3970,7 +3970,7 @@
           <p:spPr bwMode="auto">
             <a:xfrm>
               <a:off x="5692023" y="979017"/>
-              <a:ext cx="2436167" cy="2564543"/>
+              <a:ext cx="2436167" cy="2142934"/>
             </a:xfrm>
             <a:prstGeom prst="wedgeRoundRectCallout">
               <a:avLst>
@@ -4039,32 +4039,12 @@
                 <a:buChar char="•"/>
               </a:pPr>
               <a:r>
-                <a:rPr lang="en-US" sz="1200" dirty="0">
+                <a:rPr lang="en-US" sz="1200" dirty="0" smtClean="0">
                   <a:latin typeface="CMU Typewriter Text Variable Width Medium" charset="0"/>
                   <a:ea typeface="CMU Typewriter Text Variable Width Medium" charset="0"/>
                   <a:cs typeface="CMU Typewriter Text Variable Width Medium" charset="0"/>
                 </a:rPr>
-                <a:t>4,401 “named roads”</a:t>
-              </a:r>
-            </a:p>
-            <a:p>
-              <a:pPr marL="186441" indent="-186441" defTabSz="994355" eaLnBrk="0" fontAlgn="base" hangingPunct="0">
-                <a:spcBef>
-                  <a:spcPct val="0"/>
-                </a:spcBef>
-                <a:spcAft>
-                  <a:spcPts val="652"/>
-                </a:spcAft>
-                <a:buFont typeface="Arial" charset="0"/>
-                <a:buChar char="•"/>
-              </a:pPr>
-              <a:r>
-                <a:rPr lang="en-US" sz="1200" dirty="0">
-                  <a:latin typeface="CMU Typewriter Text Variable Width Medium" charset="0"/>
-                  <a:ea typeface="CMU Typewriter Text Variable Width Medium" charset="0"/>
-                  <a:cs typeface="CMU Typewriter Text Variable Width Medium" charset="0"/>
-                </a:rPr>
-                <a:t>14,088 </a:t>
+                <a:t>3,982 “named roads</a:t>
               </a:r>
               <a:r>
                 <a:rPr lang="en-US" sz="1200" dirty="0" smtClean="0">
@@ -4072,15 +4052,8 @@
                   <a:ea typeface="CMU Typewriter Text Variable Width Medium" charset="0"/>
                   <a:cs typeface="CMU Typewriter Text Variable Width Medium" charset="0"/>
                 </a:rPr>
-                <a:t>postcodes</a:t>
+                <a:t>”</a:t>
               </a:r>
-              <a:br>
-                <a:rPr lang="en-US" sz="1200" dirty="0" smtClean="0">
-                  <a:latin typeface="CMU Typewriter Text Variable Width Medium" charset="0"/>
-                  <a:ea typeface="CMU Typewriter Text Variable Width Medium" charset="0"/>
-                  <a:cs typeface="CMU Typewriter Text Variable Width Medium" charset="0"/>
-                </a:rPr>
-              </a:br>
               <a:endParaRPr lang="en-US" sz="1200" dirty="0">
                 <a:latin typeface="CMU Typewriter Text Variable Width Medium" charset="0"/>
                 <a:ea typeface="CMU Typewriter Text Variable Width Medium" charset="0"/>

</xml_diff>

<commit_message>
Revised problem decomposition pictures
</commit_message>
<xml_diff>
--- a/images_src/misc_powerpoint.pptx
+++ b/images_src/misc_powerpoint.pptx
@@ -204,7 +204,7 @@
           <a:p>
             <a:fld id="{8A2C6B5F-9BC6-4B49-8DDC-1983D75D835F}" type="datetimeFigureOut">
               <a:rPr lang="en-US" smtClean="0"/>
-              <a:t>1/7/16</a:t>
+              <a:t>1/10/16</a:t>
             </a:fld>
             <a:endParaRPr lang="en-US"/>
           </a:p>
@@ -829,7 +829,7 @@
           <a:p>
             <a:fld id="{70491AAC-A65D-7044-B83C-B384503BD135}" type="datetimeFigureOut">
               <a:rPr lang="en-US" smtClean="0"/>
-              <a:t>1/7/16</a:t>
+              <a:t>1/10/16</a:t>
             </a:fld>
             <a:endParaRPr lang="en-US"/>
           </a:p>
@@ -999,7 +999,7 @@
           <a:p>
             <a:fld id="{70491AAC-A65D-7044-B83C-B384503BD135}" type="datetimeFigureOut">
               <a:rPr lang="en-US" smtClean="0"/>
-              <a:t>1/7/16</a:t>
+              <a:t>1/10/16</a:t>
             </a:fld>
             <a:endParaRPr lang="en-US"/>
           </a:p>
@@ -1179,7 +1179,7 @@
           <a:p>
             <a:fld id="{70491AAC-A65D-7044-B83C-B384503BD135}" type="datetimeFigureOut">
               <a:rPr lang="en-US" smtClean="0"/>
-              <a:t>1/7/16</a:t>
+              <a:t>1/10/16</a:t>
             </a:fld>
             <a:endParaRPr lang="en-US"/>
           </a:p>
@@ -1349,7 +1349,7 @@
           <a:p>
             <a:fld id="{70491AAC-A65D-7044-B83C-B384503BD135}" type="datetimeFigureOut">
               <a:rPr lang="en-US" smtClean="0"/>
-              <a:t>1/7/16</a:t>
+              <a:t>1/10/16</a:t>
             </a:fld>
             <a:endParaRPr lang="en-US"/>
           </a:p>
@@ -1595,7 +1595,7 @@
           <a:p>
             <a:fld id="{70491AAC-A65D-7044-B83C-B384503BD135}" type="datetimeFigureOut">
               <a:rPr lang="en-US" smtClean="0"/>
-              <a:t>1/7/16</a:t>
+              <a:t>1/10/16</a:t>
             </a:fld>
             <a:endParaRPr lang="en-US"/>
           </a:p>
@@ -1827,7 +1827,7 @@
           <a:p>
             <a:fld id="{70491AAC-A65D-7044-B83C-B384503BD135}" type="datetimeFigureOut">
               <a:rPr lang="en-US" smtClean="0"/>
-              <a:t>1/7/16</a:t>
+              <a:t>1/10/16</a:t>
             </a:fld>
             <a:endParaRPr lang="en-US"/>
           </a:p>
@@ -2194,7 +2194,7 @@
           <a:p>
             <a:fld id="{70491AAC-A65D-7044-B83C-B384503BD135}" type="datetimeFigureOut">
               <a:rPr lang="en-US" smtClean="0"/>
-              <a:t>1/7/16</a:t>
+              <a:t>1/10/16</a:t>
             </a:fld>
             <a:endParaRPr lang="en-US"/>
           </a:p>
@@ -2312,7 +2312,7 @@
           <a:p>
             <a:fld id="{70491AAC-A65D-7044-B83C-B384503BD135}" type="datetimeFigureOut">
               <a:rPr lang="en-US" smtClean="0"/>
-              <a:t>1/7/16</a:t>
+              <a:t>1/10/16</a:t>
             </a:fld>
             <a:endParaRPr lang="en-US"/>
           </a:p>
@@ -2407,7 +2407,7 @@
           <a:p>
             <a:fld id="{70491AAC-A65D-7044-B83C-B384503BD135}" type="datetimeFigureOut">
               <a:rPr lang="en-US" smtClean="0"/>
-              <a:t>1/7/16</a:t>
+              <a:t>1/10/16</a:t>
             </a:fld>
             <a:endParaRPr lang="en-US"/>
           </a:p>
@@ -2684,7 +2684,7 @@
           <a:p>
             <a:fld id="{70491AAC-A65D-7044-B83C-B384503BD135}" type="datetimeFigureOut">
               <a:rPr lang="en-US" smtClean="0"/>
-              <a:t>1/7/16</a:t>
+              <a:t>1/10/16</a:t>
             </a:fld>
             <a:endParaRPr lang="en-US"/>
           </a:p>
@@ -2941,7 +2941,7 @@
           <a:p>
             <a:fld id="{70491AAC-A65D-7044-B83C-B384503BD135}" type="datetimeFigureOut">
               <a:rPr lang="en-US" smtClean="0"/>
-              <a:t>1/7/16</a:t>
+              <a:t>1/10/16</a:t>
             </a:fld>
             <a:endParaRPr lang="en-US"/>
           </a:p>
@@ -3154,7 +3154,7 @@
           <a:p>
             <a:fld id="{70491AAC-A65D-7044-B83C-B384503BD135}" type="datetimeFigureOut">
               <a:rPr lang="en-US" smtClean="0"/>
-              <a:t>1/7/16</a:t>
+              <a:t>1/10/16</a:t>
             </a:fld>
             <a:endParaRPr lang="en-US"/>
           </a:p>
@@ -5376,7 +5376,7 @@
         </p:nvSpPr>
         <p:spPr>
           <a:xfrm>
-            <a:off x="3364847" y="3592094"/>
+            <a:off x="3364846" y="3484810"/>
             <a:ext cx="658066" cy="658066"/>
           </a:xfrm>
           <a:prstGeom prst="ellipse">
@@ -5434,7 +5434,7 @@
         </p:nvSpPr>
         <p:spPr>
           <a:xfrm>
-            <a:off x="4634183" y="3010470"/>
+            <a:off x="4634182" y="2903186"/>
             <a:ext cx="2734628" cy="487102"/>
           </a:xfrm>
           <a:prstGeom prst="roundRect">
@@ -5524,7 +5524,7 @@
         </p:nvSpPr>
         <p:spPr>
           <a:xfrm>
-            <a:off x="4634183" y="3668535"/>
+            <a:off x="4634182" y="3561251"/>
             <a:ext cx="2734628" cy="487102"/>
           </a:xfrm>
           <a:prstGeom prst="roundRect">
@@ -5532,7 +5532,7 @@
           </a:prstGeom>
           <a:solidFill>
             <a:schemeClr val="bg1">
-              <a:lumMod val="75000"/>
+              <a:lumMod val="85000"/>
             </a:schemeClr>
           </a:solidFill>
           <a:ln>
@@ -5616,7 +5616,7 @@
         </p:nvSpPr>
         <p:spPr>
           <a:xfrm>
-            <a:off x="4634183" y="4326604"/>
+            <a:off x="4634182" y="4219320"/>
             <a:ext cx="2734628" cy="740489"/>
           </a:xfrm>
           <a:prstGeom prst="roundRect">
@@ -5624,7 +5624,7 @@
           </a:prstGeom>
           <a:solidFill>
             <a:schemeClr val="bg1">
-              <a:lumMod val="75000"/>
+              <a:lumMod val="85000"/>
             </a:schemeClr>
           </a:solidFill>
           <a:ln>
@@ -5678,7 +5678,7 @@
         </p:nvCxnSpPr>
         <p:spPr>
           <a:xfrm flipV="1">
-            <a:off x="4022913" y="3254021"/>
+            <a:off x="4022912" y="3146737"/>
             <a:ext cx="611270" cy="667106"/>
           </a:xfrm>
           <a:prstGeom prst="straightConnector1">
@@ -5717,8 +5717,8 @@
         </p:nvCxnSpPr>
         <p:spPr>
           <a:xfrm flipV="1">
-            <a:off x="4022913" y="3912087"/>
-            <a:ext cx="611270" cy="9040"/>
+            <a:off x="4022912" y="3804802"/>
+            <a:ext cx="611270" cy="9041"/>
           </a:xfrm>
           <a:prstGeom prst="straightConnector1">
             <a:avLst/>
@@ -5756,8 +5756,8 @@
         </p:nvCxnSpPr>
         <p:spPr>
           <a:xfrm>
-            <a:off x="4022913" y="3921130"/>
-            <a:ext cx="611270" cy="775719"/>
+            <a:off x="4022912" y="3813843"/>
+            <a:ext cx="611270" cy="775722"/>
           </a:xfrm>
           <a:prstGeom prst="straightConnector1">
             <a:avLst/>
@@ -6044,7 +6044,9 @@
             <a:avLst/>
           </a:prstGeom>
           <a:solidFill>
-            <a:schemeClr val="bg1"/>
+            <a:schemeClr val="bg1">
+              <a:lumMod val="85000"/>
+            </a:schemeClr>
           </a:solidFill>
           <a:ln>
             <a:solidFill>
@@ -6119,8 +6121,8 @@
         </p:nvCxnSpPr>
         <p:spPr>
           <a:xfrm flipV="1">
-            <a:off x="7368811" y="2899359"/>
-            <a:ext cx="634668" cy="354665"/>
+            <a:off x="7368810" y="2899359"/>
+            <a:ext cx="634668" cy="247378"/>
           </a:xfrm>
           <a:prstGeom prst="straightConnector1">
             <a:avLst/>
@@ -6158,8 +6160,8 @@
         </p:nvCxnSpPr>
         <p:spPr>
           <a:xfrm>
-            <a:off x="7368811" y="3254021"/>
-            <a:ext cx="634668" cy="521638"/>
+            <a:off x="7368810" y="3146737"/>
+            <a:ext cx="634668" cy="628925"/>
           </a:xfrm>
           <a:prstGeom prst="straightConnector1">
             <a:avLst/>
@@ -6197,8 +6199,8 @@
         </p:nvCxnSpPr>
         <p:spPr>
           <a:xfrm>
-            <a:off x="7368811" y="3254024"/>
-            <a:ext cx="634668" cy="1813069"/>
+            <a:off x="7368810" y="3146737"/>
+            <a:ext cx="634668" cy="1920356"/>
           </a:xfrm>
           <a:prstGeom prst="straightConnector1">
             <a:avLst/>
@@ -6236,8 +6238,8 @@
         </p:nvCxnSpPr>
         <p:spPr>
           <a:xfrm>
-            <a:off x="7368811" y="3254024"/>
-            <a:ext cx="634668" cy="1177661"/>
+            <a:off x="7368810" y="3146737"/>
+            <a:ext cx="634668" cy="1284944"/>
           </a:xfrm>
           <a:prstGeom prst="straightConnector1">
             <a:avLst/>
@@ -6383,6 +6385,115 @@
           </a:fontRef>
         </p:style>
       </p:cxnSp>
+      <p:grpSp>
+        <p:nvGrpSpPr>
+          <p:cNvPr id="3" name="Group 2"/>
+          <p:cNvGrpSpPr/>
+          <p:nvPr/>
+        </p:nvGrpSpPr>
+        <p:grpSpPr>
+          <a:xfrm>
+            <a:off x="3364846" y="5145608"/>
+            <a:ext cx="5032952" cy="215444"/>
+            <a:chOff x="3372342" y="5543426"/>
+            <a:chExt cx="5032952" cy="215444"/>
+          </a:xfrm>
+        </p:grpSpPr>
+        <p:sp>
+          <p:nvSpPr>
+            <p:cNvPr id="22" name="Rounded Rectangle 21"/>
+            <p:cNvSpPr/>
+            <p:nvPr/>
+          </p:nvSpPr>
+          <p:spPr>
+            <a:xfrm>
+              <a:off x="3372342" y="5597177"/>
+              <a:ext cx="98265" cy="95058"/>
+            </a:xfrm>
+            <a:prstGeom prst="roundRect">
+              <a:avLst/>
+            </a:prstGeom>
+            <a:solidFill>
+              <a:schemeClr val="bg1">
+                <a:lumMod val="85000"/>
+              </a:schemeClr>
+            </a:solidFill>
+            <a:ln>
+              <a:solidFill>
+                <a:schemeClr val="tx1"/>
+              </a:solidFill>
+            </a:ln>
+          </p:spPr>
+          <p:style>
+            <a:lnRef idx="2">
+              <a:schemeClr val="accent1">
+                <a:shade val="50000"/>
+              </a:schemeClr>
+            </a:lnRef>
+            <a:fillRef idx="1">
+              <a:schemeClr val="accent1"/>
+            </a:fillRef>
+            <a:effectRef idx="0">
+              <a:schemeClr val="accent1"/>
+            </a:effectRef>
+            <a:fontRef idx="minor">
+              <a:schemeClr val="lt1"/>
+            </a:fontRef>
+          </p:style>
+          <p:txBody>
+            <a:bodyPr rtlCol="0" anchor="ctr"/>
+            <a:lstStyle/>
+            <a:p>
+              <a:endParaRPr lang="en-US" sz="979" i="1" dirty="0">
+                <a:solidFill>
+                  <a:schemeClr val="tx1"/>
+                </a:solidFill>
+                <a:latin typeface="CMU Typewriter Text Variable Width Medium" charset="0"/>
+                <a:ea typeface="CMU Typewriter Text Variable Width Medium" charset="0"/>
+                <a:cs typeface="CMU Typewriter Text Variable Width Medium" charset="0"/>
+              </a:endParaRPr>
+            </a:p>
+          </p:txBody>
+        </p:sp>
+        <p:sp>
+          <p:nvSpPr>
+            <p:cNvPr id="2" name="TextBox 1"/>
+            <p:cNvSpPr txBox="1"/>
+            <p:nvPr/>
+          </p:nvSpPr>
+          <p:spPr>
+            <a:xfrm>
+              <a:off x="3418142" y="5543426"/>
+              <a:ext cx="4987152" cy="215444"/>
+            </a:xfrm>
+            <a:prstGeom prst="rect">
+              <a:avLst/>
+            </a:prstGeom>
+            <a:noFill/>
+          </p:spPr>
+          <p:txBody>
+            <a:bodyPr wrap="square" rtlCol="0">
+              <a:spAutoFit/>
+            </a:bodyPr>
+            <a:lstStyle/>
+            <a:p>
+              <a:r>
+                <a:rPr lang="en-US" sz="800" dirty="0" smtClean="0">
+                  <a:latin typeface="CMU Typewriter Text Variable Width Medium" charset="0"/>
+                  <a:ea typeface="CMU Typewriter Text Variable Width Medium" charset="0"/>
+                  <a:cs typeface="CMU Typewriter Text Variable Width Medium" charset="0"/>
+                </a:rPr>
+                <a:t>Greyed-out boxes indicate processes that are not developed in this document</a:t>
+              </a:r>
+              <a:endParaRPr lang="en-US" sz="800" dirty="0">
+                <a:latin typeface="CMU Typewriter Text Variable Width Medium" charset="0"/>
+                <a:ea typeface="CMU Typewriter Text Variable Width Medium" charset="0"/>
+                <a:cs typeface="CMU Typewriter Text Variable Width Medium" charset="0"/>
+              </a:endParaRPr>
+            </a:p>
+          </p:txBody>
+        </p:sp>
+      </p:grpSp>
     </p:spTree>
     <p:extLst>
       <p:ext uri="{BB962C8B-B14F-4D97-AF65-F5344CB8AC3E}">

</xml_diff>

<commit_message>
Removed a few pictures
</commit_message>
<xml_diff>
--- a/images_src/misc_powerpoint.pptx
+++ b/images_src/misc_powerpoint.pptx
@@ -5,17 +5,14 @@
     <p:sldMasterId id="2147483696" r:id="rId1"/>
   </p:sldMasterIdLst>
   <p:notesMasterIdLst>
-    <p:notesMasterId r:id="rId10"/>
+    <p:notesMasterId r:id="rId7"/>
   </p:notesMasterIdLst>
   <p:sldIdLst>
-    <p:sldId id="258" r:id="rId2"/>
-    <p:sldId id="259" r:id="rId3"/>
-    <p:sldId id="260" r:id="rId4"/>
-    <p:sldId id="261" r:id="rId5"/>
-    <p:sldId id="262" r:id="rId6"/>
-    <p:sldId id="263" r:id="rId7"/>
-    <p:sldId id="264" r:id="rId8"/>
-    <p:sldId id="265" r:id="rId9"/>
+    <p:sldId id="261" r:id="rId2"/>
+    <p:sldId id="262" r:id="rId3"/>
+    <p:sldId id="263" r:id="rId4"/>
+    <p:sldId id="264" r:id="rId5"/>
+    <p:sldId id="265" r:id="rId6"/>
   </p:sldIdLst>
   <p:sldSz cx="14400213" cy="7747000"/>
   <p:notesSz cx="6858000" cy="9144000"/>
@@ -204,7 +201,7 @@
           <a:p>
             <a:fld id="{8A2C6B5F-9BC6-4B49-8DDC-1983D75D835F}" type="datetimeFigureOut">
               <a:rPr lang="en-US" smtClean="0"/>
-              <a:t>1/10/16</a:t>
+              <a:t>1/12/16</a:t>
             </a:fld>
             <a:endParaRPr lang="en-US"/>
           </a:p>
@@ -472,232 +469,6 @@
 </p:notesMaster>
 </file>
 
-<file path=ppt/notesSlides/notesSlide1.xml><?xml version="1.0" encoding="utf-8"?>
-<p:notes xmlns:a="http://schemas.openxmlformats.org/drawingml/2006/main" xmlns:r="http://schemas.openxmlformats.org/officeDocument/2006/relationships" xmlns:p="http://schemas.openxmlformats.org/presentationml/2006/main">
-  <p:cSld>
-    <p:spTree>
-      <p:nvGrpSpPr>
-        <p:cNvPr id="1" name=""/>
-        <p:cNvGrpSpPr/>
-        <p:nvPr/>
-      </p:nvGrpSpPr>
-      <p:grpSpPr>
-        <a:xfrm>
-          <a:off x="0" y="0"/>
-          <a:ext cx="0" cy="0"/>
-          <a:chOff x="0" y="0"/>
-          <a:chExt cx="0" cy="0"/>
-        </a:xfrm>
-      </p:grpSpPr>
-      <p:sp>
-        <p:nvSpPr>
-          <p:cNvPr id="20482" name="Rectangle 7"/>
-          <p:cNvSpPr>
-            <a:spLocks noGrp="1" noChangeArrowheads="1"/>
-          </p:cNvSpPr>
-          <p:nvPr>
-            <p:ph type="sldNum" sz="quarter" idx="5"/>
-          </p:nvPr>
-        </p:nvSpPr>
-        <p:spPr>
-          <a:noFill/>
-        </p:spPr>
-        <p:txBody>
-          <a:bodyPr/>
-          <a:lstStyle/>
-          <a:p>
-            <a:fld id="{76734F6A-AB36-C748-8F7D-322521CEE13A}" type="slidenum">
-              <a:rPr lang="en-GB"/>
-              <a:pPr/>
-              <a:t>1</a:t>
-            </a:fld>
-            <a:endParaRPr lang="en-GB"/>
-          </a:p>
-        </p:txBody>
-      </p:sp>
-      <p:sp>
-        <p:nvSpPr>
-          <p:cNvPr id="20483" name="Rectangle 2"/>
-          <p:cNvSpPr>
-            <a:spLocks noGrp="1" noRot="1" noChangeAspect="1" noChangeArrowheads="1" noTextEdit="1"/>
-          </p:cNvSpPr>
-          <p:nvPr>
-            <p:ph type="sldImg"/>
-          </p:nvPr>
-        </p:nvSpPr>
-        <p:spPr>
-          <a:xfrm>
-            <a:off x="241300" y="685800"/>
-            <a:ext cx="6375400" cy="3429000"/>
-          </a:xfrm>
-          <a:ln/>
-        </p:spPr>
-      </p:sp>
-      <p:sp>
-        <p:nvSpPr>
-          <p:cNvPr id="20484" name="Rectangle 3"/>
-          <p:cNvSpPr>
-            <a:spLocks noGrp="1" noChangeArrowheads="1"/>
-          </p:cNvSpPr>
-          <p:nvPr>
-            <p:ph type="body" idx="1"/>
-          </p:nvPr>
-        </p:nvSpPr>
-        <p:spPr>
-          <a:noFill/>
-          <a:ln/>
-        </p:spPr>
-        <p:txBody>
-          <a:bodyPr/>
-          <a:lstStyle/>
-          <a:p>
-            <a:pPr marL="171450" marR="0" indent="-171450" algn="l" defTabSz="457200" rtl="0" eaLnBrk="1" fontAlgn="auto" latinLnBrk="0" hangingPunct="1">
-              <a:lnSpc>
-                <a:spcPct val="100000"/>
-              </a:lnSpc>
-              <a:spcBef>
-                <a:spcPts val="0"/>
-              </a:spcBef>
-              <a:spcAft>
-                <a:spcPts val="0"/>
-              </a:spcAft>
-              <a:buClrTx/>
-              <a:buSzTx/>
-              <a:buFont typeface="Arial"/>
-              <a:buChar char="•"/>
-              <a:tabLst/>
-              <a:defRPr/>
-            </a:pPr>
-            <a:endParaRPr lang="en-GB" sz="1200" dirty="0" smtClean="0"/>
-          </a:p>
-        </p:txBody>
-      </p:sp>
-    </p:spTree>
-    <p:extLst>
-      <p:ext uri="{BB962C8B-B14F-4D97-AF65-F5344CB8AC3E}">
-        <p14:creationId xmlns:p14="http://schemas.microsoft.com/office/powerpoint/2010/main" val="950813419"/>
-      </p:ext>
-    </p:extLst>
-  </p:cSld>
-  <p:clrMapOvr>
-    <a:masterClrMapping/>
-  </p:clrMapOvr>
-</p:notes>
-</file>
-
-<file path=ppt/notesSlides/notesSlide2.xml><?xml version="1.0" encoding="utf-8"?>
-<p:notes xmlns:a="http://schemas.openxmlformats.org/drawingml/2006/main" xmlns:r="http://schemas.openxmlformats.org/officeDocument/2006/relationships" xmlns:p="http://schemas.openxmlformats.org/presentationml/2006/main">
-  <p:cSld>
-    <p:spTree>
-      <p:nvGrpSpPr>
-        <p:cNvPr id="1" name=""/>
-        <p:cNvGrpSpPr/>
-        <p:nvPr/>
-      </p:nvGrpSpPr>
-      <p:grpSpPr>
-        <a:xfrm>
-          <a:off x="0" y="0"/>
-          <a:ext cx="0" cy="0"/>
-          <a:chOff x="0" y="0"/>
-          <a:chExt cx="0" cy="0"/>
-        </a:xfrm>
-      </p:grpSpPr>
-      <p:sp>
-        <p:nvSpPr>
-          <p:cNvPr id="20482" name="Rectangle 7"/>
-          <p:cNvSpPr>
-            <a:spLocks noGrp="1" noChangeArrowheads="1"/>
-          </p:cNvSpPr>
-          <p:nvPr>
-            <p:ph type="sldNum" sz="quarter" idx="5"/>
-          </p:nvPr>
-        </p:nvSpPr>
-        <p:spPr>
-          <a:noFill/>
-        </p:spPr>
-        <p:txBody>
-          <a:bodyPr/>
-          <a:lstStyle/>
-          <a:p>
-            <a:fld id="{76734F6A-AB36-C748-8F7D-322521CEE13A}" type="slidenum">
-              <a:rPr lang="en-GB"/>
-              <a:pPr/>
-              <a:t>3</a:t>
-            </a:fld>
-            <a:endParaRPr lang="en-GB"/>
-          </a:p>
-        </p:txBody>
-      </p:sp>
-      <p:sp>
-        <p:nvSpPr>
-          <p:cNvPr id="20483" name="Rectangle 2"/>
-          <p:cNvSpPr>
-            <a:spLocks noGrp="1" noRot="1" noChangeAspect="1" noChangeArrowheads="1" noTextEdit="1"/>
-          </p:cNvSpPr>
-          <p:nvPr>
-            <p:ph type="sldImg"/>
-          </p:nvPr>
-        </p:nvSpPr>
-        <p:spPr>
-          <a:xfrm>
-            <a:off x="241300" y="685800"/>
-            <a:ext cx="6375400" cy="3429000"/>
-          </a:xfrm>
-          <a:ln/>
-        </p:spPr>
-      </p:sp>
-      <p:sp>
-        <p:nvSpPr>
-          <p:cNvPr id="20484" name="Rectangle 3"/>
-          <p:cNvSpPr>
-            <a:spLocks noGrp="1" noChangeArrowheads="1"/>
-          </p:cNvSpPr>
-          <p:nvPr>
-            <p:ph type="body" idx="1"/>
-          </p:nvPr>
-        </p:nvSpPr>
-        <p:spPr>
-          <a:noFill/>
-          <a:ln/>
-        </p:spPr>
-        <p:txBody>
-          <a:bodyPr/>
-          <a:lstStyle/>
-          <a:p>
-            <a:pPr marL="171450" marR="0" indent="-171450" algn="l" defTabSz="457200" rtl="0" eaLnBrk="1" fontAlgn="auto" latinLnBrk="0" hangingPunct="1">
-              <a:lnSpc>
-                <a:spcPct val="100000"/>
-              </a:lnSpc>
-              <a:spcBef>
-                <a:spcPts val="0"/>
-              </a:spcBef>
-              <a:spcAft>
-                <a:spcPts val="0"/>
-              </a:spcAft>
-              <a:buClrTx/>
-              <a:buSzTx/>
-              <a:buFont typeface="Arial"/>
-              <a:buChar char="•"/>
-              <a:tabLst/>
-              <a:defRPr/>
-            </a:pPr>
-            <a:endParaRPr lang="en-GB" sz="1200" dirty="0" smtClean="0"/>
-          </a:p>
-        </p:txBody>
-      </p:sp>
-    </p:spTree>
-    <p:extLst>
-      <p:ext uri="{BB962C8B-B14F-4D97-AF65-F5344CB8AC3E}">
-        <p14:creationId xmlns:p14="http://schemas.microsoft.com/office/powerpoint/2010/main" val="185492562"/>
-      </p:ext>
-    </p:extLst>
-  </p:cSld>
-  <p:clrMapOvr>
-    <a:masterClrMapping/>
-  </p:clrMapOvr>
-</p:notes>
-</file>
-
 <file path=ppt/slideLayouts/slideLayout1.xml><?xml version="1.0" encoding="utf-8"?>
 <p:sldLayout xmlns:a="http://schemas.openxmlformats.org/drawingml/2006/main" xmlns:r="http://schemas.openxmlformats.org/officeDocument/2006/relationships" xmlns:p="http://schemas.openxmlformats.org/presentationml/2006/main" type="title" preserve="1">
   <p:cSld name="Title Slide">
@@ -829,7 +600,7 @@
           <a:p>
             <a:fld id="{70491AAC-A65D-7044-B83C-B384503BD135}" type="datetimeFigureOut">
               <a:rPr lang="en-US" smtClean="0"/>
-              <a:t>1/10/16</a:t>
+              <a:t>1/12/16</a:t>
             </a:fld>
             <a:endParaRPr lang="en-US"/>
           </a:p>
@@ -999,7 +770,7 @@
           <a:p>
             <a:fld id="{70491AAC-A65D-7044-B83C-B384503BD135}" type="datetimeFigureOut">
               <a:rPr lang="en-US" smtClean="0"/>
-              <a:t>1/10/16</a:t>
+              <a:t>1/12/16</a:t>
             </a:fld>
             <a:endParaRPr lang="en-US"/>
           </a:p>
@@ -1179,7 +950,7 @@
           <a:p>
             <a:fld id="{70491AAC-A65D-7044-B83C-B384503BD135}" type="datetimeFigureOut">
               <a:rPr lang="en-US" smtClean="0"/>
-              <a:t>1/10/16</a:t>
+              <a:t>1/12/16</a:t>
             </a:fld>
             <a:endParaRPr lang="en-US"/>
           </a:p>
@@ -1349,7 +1120,7 @@
           <a:p>
             <a:fld id="{70491AAC-A65D-7044-B83C-B384503BD135}" type="datetimeFigureOut">
               <a:rPr lang="en-US" smtClean="0"/>
-              <a:t>1/10/16</a:t>
+              <a:t>1/12/16</a:t>
             </a:fld>
             <a:endParaRPr lang="en-US"/>
           </a:p>
@@ -1595,7 +1366,7 @@
           <a:p>
             <a:fld id="{70491AAC-A65D-7044-B83C-B384503BD135}" type="datetimeFigureOut">
               <a:rPr lang="en-US" smtClean="0"/>
-              <a:t>1/10/16</a:t>
+              <a:t>1/12/16</a:t>
             </a:fld>
             <a:endParaRPr lang="en-US"/>
           </a:p>
@@ -1827,7 +1598,7 @@
           <a:p>
             <a:fld id="{70491AAC-A65D-7044-B83C-B384503BD135}" type="datetimeFigureOut">
               <a:rPr lang="en-US" smtClean="0"/>
-              <a:t>1/10/16</a:t>
+              <a:t>1/12/16</a:t>
             </a:fld>
             <a:endParaRPr lang="en-US"/>
           </a:p>
@@ -2194,7 +1965,7 @@
           <a:p>
             <a:fld id="{70491AAC-A65D-7044-B83C-B384503BD135}" type="datetimeFigureOut">
               <a:rPr lang="en-US" smtClean="0"/>
-              <a:t>1/10/16</a:t>
+              <a:t>1/12/16</a:t>
             </a:fld>
             <a:endParaRPr lang="en-US"/>
           </a:p>
@@ -2312,7 +2083,7 @@
           <a:p>
             <a:fld id="{70491AAC-A65D-7044-B83C-B384503BD135}" type="datetimeFigureOut">
               <a:rPr lang="en-US" smtClean="0"/>
-              <a:t>1/10/16</a:t>
+              <a:t>1/12/16</a:t>
             </a:fld>
             <a:endParaRPr lang="en-US"/>
           </a:p>
@@ -2407,7 +2178,7 @@
           <a:p>
             <a:fld id="{70491AAC-A65D-7044-B83C-B384503BD135}" type="datetimeFigureOut">
               <a:rPr lang="en-US" smtClean="0"/>
-              <a:t>1/10/16</a:t>
+              <a:t>1/12/16</a:t>
             </a:fld>
             <a:endParaRPr lang="en-US"/>
           </a:p>
@@ -2684,7 +2455,7 @@
           <a:p>
             <a:fld id="{70491AAC-A65D-7044-B83C-B384503BD135}" type="datetimeFigureOut">
               <a:rPr lang="en-US" smtClean="0"/>
-              <a:t>1/10/16</a:t>
+              <a:t>1/12/16</a:t>
             </a:fld>
             <a:endParaRPr lang="en-US"/>
           </a:p>
@@ -2941,7 +2712,7 @@
           <a:p>
             <a:fld id="{70491AAC-A65D-7044-B83C-B384503BD135}" type="datetimeFigureOut">
               <a:rPr lang="en-US" smtClean="0"/>
-              <a:t>1/10/16</a:t>
+              <a:t>1/12/16</a:t>
             </a:fld>
             <a:endParaRPr lang="en-US"/>
           </a:p>
@@ -3154,7 +2925,7 @@
           <a:p>
             <a:fld id="{70491AAC-A65D-7044-B83C-B384503BD135}" type="datetimeFigureOut">
               <a:rPr lang="en-US" smtClean="0"/>
-              <a:t>1/10/16</a:t>
+              <a:t>1/12/16</a:t>
             </a:fld>
             <a:endParaRPr lang="en-US"/>
           </a:p>
@@ -3559,1373 +3330,6 @@
           <a:chExt cx="0" cy="0"/>
         </a:xfrm>
       </p:grpSpPr>
-      <p:pic>
-        <p:nvPicPr>
-          <p:cNvPr id="12" name="Content Placeholder 4"/>
-          <p:cNvPicPr>
-            <a:picLocks noGrp="1" noChangeAspect="1"/>
-          </p:cNvPicPr>
-          <p:nvPr>
-            <p:ph idx="1"/>
-          </p:nvPr>
-        </p:nvPicPr>
-        <p:blipFill rotWithShape="1">
-          <a:blip r:embed="rId3" cstate="print">
-            <a:extLst>
-              <a:ext uri="{28A0092B-C50C-407E-A947-70E740481C1C}">
-                <a14:useLocalDpi xmlns:a14="http://schemas.microsoft.com/office/drawing/2010/main"/>
-              </a:ext>
-            </a:extLst>
-          </a:blip>
-          <a:srcRect b="56171"/>
-          <a:stretch/>
-        </p:blipFill>
-        <p:spPr>
-          <a:xfrm>
-            <a:off x="7527469" y="2502734"/>
-            <a:ext cx="1164188" cy="80149"/>
-          </a:xfrm>
-          <a:ln>
-            <a:solidFill>
-              <a:schemeClr val="tx1"/>
-            </a:solidFill>
-          </a:ln>
-        </p:spPr>
-      </p:pic>
-      <p:pic>
-        <p:nvPicPr>
-          <p:cNvPr id="3" name="Picture 2"/>
-          <p:cNvPicPr>
-            <a:picLocks noChangeAspect="1"/>
-          </p:cNvPicPr>
-          <p:nvPr/>
-        </p:nvPicPr>
-        <p:blipFill>
-          <a:blip r:embed="rId4" cstate="print">
-            <a:clrChange>
-              <a:clrFrom>
-                <a:srgbClr val="CDCDCD"/>
-              </a:clrFrom>
-              <a:clrTo>
-                <a:srgbClr val="CDCDCD">
-                  <a:alpha val="0"/>
-                </a:srgbClr>
-              </a:clrTo>
-            </a:clrChange>
-            <a:extLst>
-              <a:ext uri="{28A0092B-C50C-407E-A947-70E740481C1C}">
-                <a14:useLocalDpi xmlns:a14="http://schemas.microsoft.com/office/drawing/2010/main"/>
-              </a:ext>
-            </a:extLst>
-          </a:blip>
-          <a:stretch>
-            <a:fillRect/>
-          </a:stretch>
-        </p:blipFill>
-        <p:spPr>
-          <a:xfrm>
-            <a:off x="2588343" y="2509114"/>
-            <a:ext cx="2606180" cy="3464174"/>
-          </a:xfrm>
-          <a:prstGeom prst="rect">
-            <a:avLst/>
-          </a:prstGeom>
-          <a:ln w="12700">
-            <a:solidFill>
-              <a:srgbClr val="000000"/>
-            </a:solidFill>
-          </a:ln>
-        </p:spPr>
-      </p:pic>
-      <p:sp>
-        <p:nvSpPr>
-          <p:cNvPr id="13" name="TextBox 12"/>
-          <p:cNvSpPr txBox="1"/>
-          <p:nvPr/>
-        </p:nvSpPr>
-        <p:spPr>
-          <a:xfrm>
-            <a:off x="2587404" y="5985700"/>
-            <a:ext cx="2607120" cy="276999"/>
-          </a:xfrm>
-          <a:prstGeom prst="rect">
-            <a:avLst/>
-          </a:prstGeom>
-          <a:noFill/>
-        </p:spPr>
-        <p:txBody>
-          <a:bodyPr wrap="square" rtlCol="0">
-            <a:spAutoFit/>
-          </a:bodyPr>
-          <a:lstStyle/>
-          <a:p>
-            <a:pPr algn="ctr"/>
-            <a:r>
-              <a:rPr lang="en-US" sz="1200">
-                <a:latin typeface="CMU Typewriter Text Variable Width Medium" charset="0"/>
-                <a:ea typeface="CMU Typewriter Text Variable Width Medium" charset="0"/>
-                <a:cs typeface="CMU Typewriter Text Variable Width Medium" charset="0"/>
-              </a:rPr>
-              <a:t>35m addresses</a:t>
-            </a:r>
-          </a:p>
-        </p:txBody>
-      </p:sp>
-      <p:sp>
-        <p:nvSpPr>
-          <p:cNvPr id="19" name="Rectangle 18"/>
-          <p:cNvSpPr/>
-          <p:nvPr/>
-        </p:nvSpPr>
-        <p:spPr bwMode="auto">
-          <a:xfrm>
-            <a:off x="5195463" y="2498962"/>
-            <a:ext cx="1164188" cy="2908800"/>
-          </a:xfrm>
-          <a:prstGeom prst="rect">
-            <a:avLst/>
-          </a:prstGeom>
-          <a:solidFill>
-            <a:schemeClr val="bg1"/>
-          </a:solidFill>
-          <a:ln w="12700" cap="flat" cmpd="sng" algn="ctr">
-            <a:solidFill>
-              <a:schemeClr val="tx1"/>
-            </a:solidFill>
-            <a:prstDash val="solid"/>
-            <a:round/>
-            <a:headEnd type="none" w="med" len="med"/>
-            <a:tailEnd type="none" w="med" len="med"/>
-          </a:ln>
-          <a:effectLst/>
-        </p:spPr>
-        <p:txBody>
-          <a:bodyPr vert="horz" wrap="square" lIns="99441" tIns="49721" rIns="99441" bIns="0" numCol="1" rtlCol="0" anchor="ctr" anchorCtr="0" compatLnSpc="1">
-            <a:prstTxWarp prst="textNoShape">
-              <a:avLst/>
-            </a:prstTxWarp>
-            <a:noAutofit/>
-          </a:bodyPr>
-          <a:lstStyle/>
-          <a:p>
-            <a:pPr algn="ctr" defTabSz="994355" eaLnBrk="0" fontAlgn="base" hangingPunct="0">
-              <a:spcBef>
-                <a:spcPct val="0"/>
-              </a:spcBef>
-              <a:spcAft>
-                <a:spcPct val="0"/>
-              </a:spcAft>
-            </a:pPr>
-            <a:r>
-              <a:rPr lang="en-US" sz="1200" dirty="0">
-                <a:latin typeface="CMU Typewriter Text Variable Width Medium" charset="0"/>
-                <a:ea typeface="CMU Typewriter Text Variable Width Medium" charset="0"/>
-                <a:cs typeface="CMU Typewriter Text Variable Width Medium" charset="0"/>
-              </a:rPr>
-              <a:t>84% of addresses are in England and Wales</a:t>
-            </a:r>
-          </a:p>
-        </p:txBody>
-      </p:sp>
-      <p:sp>
-        <p:nvSpPr>
-          <p:cNvPr id="21" name="Rectangle 20"/>
-          <p:cNvSpPr/>
-          <p:nvPr/>
-        </p:nvSpPr>
-        <p:spPr bwMode="auto">
-          <a:xfrm>
-            <a:off x="5195463" y="5407761"/>
-            <a:ext cx="1164188" cy="572053"/>
-          </a:xfrm>
-          <a:prstGeom prst="rect">
-            <a:avLst/>
-          </a:prstGeom>
-          <a:solidFill>
-            <a:schemeClr val="bg1">
-              <a:lumMod val="85000"/>
-            </a:schemeClr>
-          </a:solidFill>
-          <a:ln w="12700" cap="flat" cmpd="sng" algn="ctr">
-            <a:solidFill>
-              <a:schemeClr val="tx1"/>
-            </a:solidFill>
-            <a:prstDash val="solid"/>
-            <a:round/>
-            <a:headEnd type="none" w="med" len="med"/>
-            <a:tailEnd type="none" w="med" len="med"/>
-          </a:ln>
-          <a:effectLst/>
-        </p:spPr>
-        <p:txBody>
-          <a:bodyPr vert="horz" wrap="square" lIns="99441" tIns="49721" rIns="99441" bIns="0" numCol="1" rtlCol="0" anchor="ctr" anchorCtr="0" compatLnSpc="1">
-            <a:prstTxWarp prst="textNoShape">
-              <a:avLst/>
-            </a:prstTxWarp>
-            <a:noAutofit/>
-          </a:bodyPr>
-          <a:lstStyle/>
-          <a:p>
-            <a:pPr algn="ctr" defTabSz="994355" eaLnBrk="0" fontAlgn="base" hangingPunct="0">
-              <a:spcBef>
-                <a:spcPct val="0"/>
-              </a:spcBef>
-              <a:spcAft>
-                <a:spcPct val="0"/>
-              </a:spcAft>
-            </a:pPr>
-            <a:endParaRPr lang="en-US" sz="1200" dirty="0">
-              <a:latin typeface="CMU Typewriter Text Variable Width Medium" charset="0"/>
-              <a:ea typeface="CMU Typewriter Text Variable Width Medium" charset="0"/>
-              <a:cs typeface="CMU Typewriter Text Variable Width Medium" charset="0"/>
-            </a:endParaRPr>
-          </a:p>
-        </p:txBody>
-      </p:sp>
-      <p:sp>
-        <p:nvSpPr>
-          <p:cNvPr id="22" name="Rectangle 21"/>
-          <p:cNvSpPr/>
-          <p:nvPr/>
-        </p:nvSpPr>
-        <p:spPr bwMode="auto">
-          <a:xfrm>
-            <a:off x="6359652" y="2498963"/>
-            <a:ext cx="1164188" cy="406799"/>
-          </a:xfrm>
-          <a:prstGeom prst="rect">
-            <a:avLst/>
-          </a:prstGeom>
-          <a:solidFill>
-            <a:schemeClr val="bg1"/>
-          </a:solidFill>
-          <a:ln w="12700" cap="flat" cmpd="sng" algn="ctr">
-            <a:solidFill>
-              <a:schemeClr val="tx1"/>
-            </a:solidFill>
-            <a:prstDash val="solid"/>
-            <a:round/>
-            <a:headEnd type="none" w="med" len="med"/>
-            <a:tailEnd type="none" w="med" len="med"/>
-          </a:ln>
-          <a:effectLst/>
-        </p:spPr>
-        <p:txBody>
-          <a:bodyPr vert="horz" wrap="square" lIns="0" tIns="0" rIns="0" bIns="0" numCol="1" rtlCol="0" anchor="ctr" anchorCtr="0" compatLnSpc="1">
-            <a:prstTxWarp prst="textNoShape">
-              <a:avLst/>
-            </a:prstTxWarp>
-            <a:noAutofit/>
-          </a:bodyPr>
-          <a:lstStyle/>
-          <a:p>
-            <a:pPr algn="ctr" defTabSz="994355" eaLnBrk="0" fontAlgn="base" hangingPunct="0">
-              <a:spcBef>
-                <a:spcPct val="0"/>
-              </a:spcBef>
-              <a:spcAft>
-                <a:spcPct val="0"/>
-              </a:spcAft>
-            </a:pPr>
-            <a:r>
-              <a:rPr lang="en-US" sz="1200" dirty="0">
-                <a:latin typeface="CMU Typewriter Text Variable Width Medium" charset="0"/>
-                <a:ea typeface="CMU Typewriter Text Variable Width Medium" charset="0"/>
-                <a:cs typeface="CMU Typewriter Text Variable Width Medium" charset="0"/>
-              </a:rPr>
-              <a:t>14% in London</a:t>
-            </a:r>
-          </a:p>
-        </p:txBody>
-      </p:sp>
-      <p:sp>
-        <p:nvSpPr>
-          <p:cNvPr id="23" name="Rectangle 22"/>
-          <p:cNvSpPr/>
-          <p:nvPr/>
-        </p:nvSpPr>
-        <p:spPr bwMode="auto">
-          <a:xfrm>
-            <a:off x="6359652" y="2905762"/>
-            <a:ext cx="1164188" cy="2496113"/>
-          </a:xfrm>
-          <a:prstGeom prst="rect">
-            <a:avLst/>
-          </a:prstGeom>
-          <a:solidFill>
-            <a:schemeClr val="bg1">
-              <a:lumMod val="85000"/>
-            </a:schemeClr>
-          </a:solidFill>
-          <a:ln w="12700" cap="flat" cmpd="sng" algn="ctr">
-            <a:solidFill>
-              <a:schemeClr val="tx1"/>
-            </a:solidFill>
-            <a:prstDash val="solid"/>
-            <a:round/>
-            <a:headEnd type="none" w="med" len="med"/>
-            <a:tailEnd type="none" w="med" len="med"/>
-          </a:ln>
-          <a:effectLst/>
-        </p:spPr>
-        <p:txBody>
-          <a:bodyPr vert="horz" wrap="square" lIns="99441" tIns="49721" rIns="99441" bIns="0" numCol="1" rtlCol="0" anchor="ctr" anchorCtr="0" compatLnSpc="1">
-            <a:prstTxWarp prst="textNoShape">
-              <a:avLst/>
-            </a:prstTxWarp>
-            <a:noAutofit/>
-          </a:bodyPr>
-          <a:lstStyle/>
-          <a:p>
-            <a:pPr algn="ctr" defTabSz="994355" eaLnBrk="0" fontAlgn="base" hangingPunct="0">
-              <a:spcBef>
-                <a:spcPct val="0"/>
-              </a:spcBef>
-              <a:spcAft>
-                <a:spcPct val="0"/>
-              </a:spcAft>
-            </a:pPr>
-            <a:endParaRPr lang="en-US" sz="1200" dirty="0">
-              <a:latin typeface="CMU Typewriter Text Variable Width Medium" charset="0"/>
-              <a:ea typeface="CMU Typewriter Text Variable Width Medium" charset="0"/>
-              <a:cs typeface="CMU Typewriter Text Variable Width Medium" charset="0"/>
-            </a:endParaRPr>
-          </a:p>
-        </p:txBody>
-      </p:sp>
-      <p:sp>
-        <p:nvSpPr>
-          <p:cNvPr id="15" name="Rectangle 14"/>
-          <p:cNvSpPr/>
-          <p:nvPr/>
-        </p:nvSpPr>
-        <p:spPr bwMode="auto">
-          <a:xfrm>
-            <a:off x="7523840" y="2582883"/>
-            <a:ext cx="1175752" cy="316992"/>
-          </a:xfrm>
-          <a:prstGeom prst="rect">
-            <a:avLst/>
-          </a:prstGeom>
-          <a:solidFill>
-            <a:schemeClr val="bg1">
-              <a:lumMod val="85000"/>
-            </a:schemeClr>
-          </a:solidFill>
-          <a:ln w="12700" cap="flat" cmpd="sng" algn="ctr">
-            <a:solidFill>
-              <a:schemeClr val="tx1"/>
-            </a:solidFill>
-            <a:prstDash val="solid"/>
-            <a:round/>
-            <a:headEnd type="none" w="med" len="med"/>
-            <a:tailEnd type="none" w="med" len="med"/>
-          </a:ln>
-          <a:effectLst/>
-        </p:spPr>
-        <p:txBody>
-          <a:bodyPr vert="horz" wrap="square" lIns="99441" tIns="49721" rIns="99441" bIns="0" numCol="1" rtlCol="0" anchor="ctr" anchorCtr="0" compatLnSpc="1">
-            <a:prstTxWarp prst="textNoShape">
-              <a:avLst/>
-            </a:prstTxWarp>
-            <a:noAutofit/>
-          </a:bodyPr>
-          <a:lstStyle/>
-          <a:p>
-            <a:pPr algn="ctr" defTabSz="994355" eaLnBrk="0" fontAlgn="base" hangingPunct="0">
-              <a:spcBef>
-                <a:spcPct val="0"/>
-              </a:spcBef>
-              <a:spcAft>
-                <a:spcPct val="0"/>
-              </a:spcAft>
-            </a:pPr>
-            <a:endParaRPr lang="en-US" sz="1200" dirty="0">
-              <a:latin typeface="CMU Typewriter Text Variable Width Medium" charset="0"/>
-              <a:ea typeface="CMU Typewriter Text Variable Width Medium" charset="0"/>
-              <a:cs typeface="CMU Typewriter Text Variable Width Medium" charset="0"/>
-            </a:endParaRPr>
-          </a:p>
-        </p:txBody>
-      </p:sp>
-      <p:grpSp>
-        <p:nvGrpSpPr>
-          <p:cNvPr id="7" name="Group 6"/>
-          <p:cNvGrpSpPr/>
-          <p:nvPr/>
-        </p:nvGrpSpPr>
-        <p:grpSpPr>
-          <a:xfrm>
-            <a:off x="7693928" y="3071434"/>
-            <a:ext cx="2649332" cy="2330441"/>
-            <a:chOff x="5692023" y="979017"/>
-            <a:chExt cx="2436167" cy="2142934"/>
-          </a:xfrm>
-        </p:grpSpPr>
-        <p:sp>
-          <p:nvSpPr>
-            <p:cNvPr id="18" name="Rounded Rectangular Callout 17"/>
-            <p:cNvSpPr/>
-            <p:nvPr/>
-          </p:nvSpPr>
-          <p:spPr bwMode="auto">
-            <a:xfrm>
-              <a:off x="5692023" y="979017"/>
-              <a:ext cx="2436167" cy="2142934"/>
-            </a:xfrm>
-            <a:prstGeom prst="wedgeRoundRectCallout">
-              <a:avLst>
-                <a:gd name="adj1" fmla="val -25741"/>
-                <a:gd name="adj2" fmla="val -68715"/>
-                <a:gd name="adj3" fmla="val 16667"/>
-              </a:avLst>
-            </a:prstGeom>
-            <a:solidFill>
-              <a:schemeClr val="bg1"/>
-            </a:solidFill>
-            <a:ln w="12700" cap="flat" cmpd="sng" algn="ctr">
-              <a:solidFill>
-                <a:schemeClr val="tx1"/>
-              </a:solidFill>
-              <a:prstDash val="solid"/>
-              <a:round/>
-              <a:headEnd type="none" w="med" len="med"/>
-              <a:tailEnd type="none" w="med" len="med"/>
-            </a:ln>
-            <a:effectLst>
-              <a:outerShdw blurRad="50800" dist="76200" dir="2700000" algn="tl" rotWithShape="0">
-                <a:prstClr val="black">
-                  <a:alpha val="40000"/>
-                </a:prstClr>
-              </a:outerShdw>
-            </a:effectLst>
-          </p:spPr>
-          <p:txBody>
-            <a:bodyPr vert="horz" wrap="square" lIns="99441" tIns="49721" rIns="99441" bIns="0" numCol="1" rtlCol="0" anchor="b" anchorCtr="0" compatLnSpc="1">
-              <a:prstTxWarp prst="textNoShape">
-                <a:avLst/>
-              </a:prstTxWarp>
-              <a:noAutofit/>
-            </a:bodyPr>
-            <a:lstStyle/>
-            <a:p>
-              <a:pPr marL="186441" indent="-186441" defTabSz="994355" eaLnBrk="0" fontAlgn="base" hangingPunct="0">
-                <a:spcBef>
-                  <a:spcPct val="0"/>
-                </a:spcBef>
-                <a:spcAft>
-                  <a:spcPts val="652"/>
-                </a:spcAft>
-                <a:buFont typeface="Arial" charset="0"/>
-                <a:buChar char="•"/>
-              </a:pPr>
-              <a:r>
-                <a:rPr lang="en-US" sz="1200" dirty="0">
-                  <a:latin typeface="CMU Typewriter Text Variable Width Medium" charset="0"/>
-                  <a:ea typeface="CMU Typewriter Text Variable Width Medium" charset="0"/>
-                  <a:cs typeface="CMU Typewriter Text Variable Width Medium" charset="0"/>
-                </a:rPr>
-                <a:t>~113km2 area (2%)</a:t>
-              </a:r>
-            </a:p>
-            <a:p>
-              <a:pPr marL="186441" indent="-186441" defTabSz="994355" eaLnBrk="0" fontAlgn="base" hangingPunct="0">
-                <a:spcBef>
-                  <a:spcPct val="0"/>
-                </a:spcBef>
-                <a:spcAft>
-                  <a:spcPts val="652"/>
-                </a:spcAft>
-                <a:buFont typeface="Arial" charset="0"/>
-                <a:buChar char="•"/>
-              </a:pPr>
-              <a:r>
-                <a:rPr lang="en-US" sz="1200" dirty="0" smtClean="0">
-                  <a:latin typeface="CMU Typewriter Text Variable Width Medium" charset="0"/>
-                  <a:ea typeface="CMU Typewriter Text Variable Width Medium" charset="0"/>
-                  <a:cs typeface="CMU Typewriter Text Variable Width Medium" charset="0"/>
-                </a:rPr>
-                <a:t>3,982 “named roads”</a:t>
-              </a:r>
-              <a:endParaRPr lang="en-US" sz="1200" dirty="0">
-                <a:latin typeface="CMU Typewriter Text Variable Width Medium" charset="0"/>
-                <a:ea typeface="CMU Typewriter Text Variable Width Medium" charset="0"/>
-                <a:cs typeface="CMU Typewriter Text Variable Width Medium" charset="0"/>
-              </a:endParaRPr>
-            </a:p>
-          </p:txBody>
-        </p:sp>
-        <p:pic>
-          <p:nvPicPr>
-            <p:cNvPr id="16" name="Content Placeholder 4"/>
-            <p:cNvPicPr>
-              <a:picLocks noChangeAspect="1"/>
-            </p:cNvPicPr>
-            <p:nvPr/>
-          </p:nvPicPr>
-          <p:blipFill rotWithShape="1">
-            <a:blip r:embed="rId5" cstate="print">
-              <a:extLst>
-                <a:ext uri="{28A0092B-C50C-407E-A947-70E740481C1C}">
-                  <a14:useLocalDpi xmlns:a14="http://schemas.microsoft.com/office/drawing/2010/main"/>
-                </a:ext>
-              </a:extLst>
-            </a:blip>
-            <a:srcRect/>
-            <a:stretch/>
-          </p:blipFill>
-          <p:spPr bwMode="auto">
-            <a:xfrm>
-              <a:off x="5977542" y="1181350"/>
-              <a:ext cx="1865128" cy="1280161"/>
-            </a:xfrm>
-            <a:prstGeom prst="rect">
-              <a:avLst/>
-            </a:prstGeom>
-            <a:noFill/>
-            <a:ln w="12700">
-              <a:solidFill>
-                <a:schemeClr val="tx1"/>
-              </a:solidFill>
-              <a:miter lim="800000"/>
-              <a:headEnd/>
-              <a:tailEnd/>
-            </a:ln>
-          </p:spPr>
-        </p:pic>
-      </p:grpSp>
-      <p:sp>
-        <p:nvSpPr>
-          <p:cNvPr id="5" name="Rectangle 4"/>
-          <p:cNvSpPr/>
-          <p:nvPr/>
-        </p:nvSpPr>
-        <p:spPr>
-          <a:xfrm>
-            <a:off x="8632764" y="1873750"/>
-            <a:ext cx="2733672" cy="206289"/>
-          </a:xfrm>
-          <a:prstGeom prst="rect">
-            <a:avLst/>
-          </a:prstGeom>
-          <a:solidFill>
-            <a:schemeClr val="bg1"/>
-          </a:solidFill>
-          <a:ln>
-            <a:noFill/>
-          </a:ln>
-        </p:spPr>
-        <p:style>
-          <a:lnRef idx="2">
-            <a:schemeClr val="accent1">
-              <a:shade val="50000"/>
-            </a:schemeClr>
-          </a:lnRef>
-          <a:fillRef idx="1">
-            <a:schemeClr val="accent1"/>
-          </a:fillRef>
-          <a:effectRef idx="0">
-            <a:schemeClr val="accent1"/>
-          </a:effectRef>
-          <a:fontRef idx="minor">
-            <a:schemeClr val="lt1"/>
-          </a:fontRef>
-        </p:style>
-        <p:txBody>
-          <a:bodyPr rtlCol="0" anchor="ctr"/>
-          <a:lstStyle/>
-          <a:p>
-            <a:pPr algn="ctr"/>
-            <a:endParaRPr lang="en-US" sz="1200">
-              <a:latin typeface="CMU Typewriter Text Variable Width Medium" charset="0"/>
-              <a:ea typeface="CMU Typewriter Text Variable Width Medium" charset="0"/>
-              <a:cs typeface="CMU Typewriter Text Variable Width Medium" charset="0"/>
-            </a:endParaRPr>
-          </a:p>
-        </p:txBody>
-      </p:sp>
-    </p:spTree>
-    <p:extLst>
-      <p:ext uri="{BB962C8B-B14F-4D97-AF65-F5344CB8AC3E}">
-        <p14:creationId xmlns:p14="http://schemas.microsoft.com/office/powerpoint/2010/main" val="1584571638"/>
-      </p:ext>
-    </p:extLst>
-  </p:cSld>
-  <p:clrMapOvr>
-    <a:masterClrMapping/>
-  </p:clrMapOvr>
-  <p:timing>
-    <p:tnLst>
-      <p:par>
-        <p:cTn id="1" dur="indefinite" restart="never" nodeType="tmRoot">
-          <p:childTnLst>
-            <p:seq concurrent="1" nextAc="seek">
-              <p:cTn id="2" dur="indefinite" nodeType="mainSeq">
-                <p:childTnLst>
-                  <p:par>
-                    <p:cTn id="3" fill="hold">
-                      <p:stCondLst>
-                        <p:cond delay="indefinite"/>
-                      </p:stCondLst>
-                      <p:childTnLst>
-                        <p:par>
-                          <p:cTn id="4" fill="hold">
-                            <p:stCondLst>
-                              <p:cond delay="0"/>
-                            </p:stCondLst>
-                            <p:childTnLst>
-                              <p:par>
-                                <p:cTn id="5" presetID="1" presetClass="entr" presetSubtype="0" fill="hold" nodeType="clickEffect">
-                                  <p:stCondLst>
-                                    <p:cond delay="0"/>
-                                  </p:stCondLst>
-                                  <p:childTnLst>
-                                    <p:set>
-                                      <p:cBhvr>
-                                        <p:cTn id="6" dur="1" fill="hold">
-                                          <p:stCondLst>
-                                            <p:cond delay="0"/>
-                                          </p:stCondLst>
-                                        </p:cTn>
-                                        <p:tgtEl>
-                                          <p:spTgt spid="7"/>
-                                        </p:tgtEl>
-                                        <p:attrNameLst>
-                                          <p:attrName>style.visibility</p:attrName>
-                                        </p:attrNameLst>
-                                      </p:cBhvr>
-                                      <p:to>
-                                        <p:strVal val="visible"/>
-                                      </p:to>
-                                    </p:set>
-                                  </p:childTnLst>
-                                </p:cTn>
-                              </p:par>
-                            </p:childTnLst>
-                          </p:cTn>
-                        </p:par>
-                      </p:childTnLst>
-                    </p:cTn>
-                  </p:par>
-                </p:childTnLst>
-              </p:cTn>
-              <p:prevCondLst>
-                <p:cond evt="onPrev" delay="0">
-                  <p:tgtEl>
-                    <p:sldTgt/>
-                  </p:tgtEl>
-                </p:cond>
-              </p:prevCondLst>
-              <p:nextCondLst>
-                <p:cond evt="onNext" delay="0">
-                  <p:tgtEl>
-                    <p:sldTgt/>
-                  </p:tgtEl>
-                </p:cond>
-              </p:nextCondLst>
-            </p:seq>
-          </p:childTnLst>
-        </p:cTn>
-      </p:par>
-    </p:tnLst>
-  </p:timing>
-</p:sld>
-</file>
-
-<file path=ppt/slides/slide2.xml><?xml version="1.0" encoding="utf-8"?>
-<p:sld xmlns:a="http://schemas.openxmlformats.org/drawingml/2006/main" xmlns:r="http://schemas.openxmlformats.org/officeDocument/2006/relationships" xmlns:p="http://schemas.openxmlformats.org/presentationml/2006/main">
-  <p:cSld>
-    <p:spTree>
-      <p:nvGrpSpPr>
-        <p:cNvPr id="1" name=""/>
-        <p:cNvGrpSpPr/>
-        <p:nvPr/>
-      </p:nvGrpSpPr>
-      <p:grpSpPr>
-        <a:xfrm>
-          <a:off x="0" y="0"/>
-          <a:ext cx="0" cy="0"/>
-          <a:chOff x="0" y="0"/>
-          <a:chExt cx="0" cy="0"/>
-        </a:xfrm>
-      </p:grpSpPr>
-      <p:pic>
-        <p:nvPicPr>
-          <p:cNvPr id="4" name="Content Placeholder 4"/>
-          <p:cNvPicPr>
-            <a:picLocks noGrp="1" noChangeAspect="1"/>
-          </p:cNvPicPr>
-          <p:nvPr>
-            <p:ph idx="1"/>
-          </p:nvPr>
-        </p:nvPicPr>
-        <p:blipFill rotWithShape="1">
-          <a:blip r:embed="rId2">
-            <a:extLst>
-              <a:ext uri="{28A0092B-C50C-407E-A947-70E740481C1C}">
-                <a14:useLocalDpi xmlns:a14="http://schemas.microsoft.com/office/drawing/2010/main" val="0"/>
-              </a:ext>
-            </a:extLst>
-          </a:blip>
-          <a:srcRect t="4354"/>
-          <a:stretch/>
-        </p:blipFill>
-        <p:spPr>
-          <a:xfrm>
-            <a:off x="2580407" y="1810781"/>
-            <a:ext cx="5189666" cy="4108094"/>
-          </a:xfrm>
-          <a:ln>
-            <a:solidFill>
-              <a:schemeClr val="accent1"/>
-            </a:solidFill>
-          </a:ln>
-        </p:spPr>
-      </p:pic>
-    </p:spTree>
-    <p:extLst>
-      <p:ext uri="{BB962C8B-B14F-4D97-AF65-F5344CB8AC3E}">
-        <p14:creationId xmlns:p14="http://schemas.microsoft.com/office/powerpoint/2010/main" val="994333688"/>
-      </p:ext>
-    </p:extLst>
-  </p:cSld>
-  <p:clrMapOvr>
-    <a:masterClrMapping/>
-  </p:clrMapOvr>
-</p:sld>
-</file>
-
-<file path=ppt/slides/slide3.xml><?xml version="1.0" encoding="utf-8"?>
-<p:sld xmlns:a="http://schemas.openxmlformats.org/drawingml/2006/main" xmlns:r="http://schemas.openxmlformats.org/officeDocument/2006/relationships" xmlns:p="http://schemas.openxmlformats.org/presentationml/2006/main">
-  <p:cSld>
-    <p:spTree>
-      <p:nvGrpSpPr>
-        <p:cNvPr id="1" name=""/>
-        <p:cNvGrpSpPr/>
-        <p:nvPr/>
-      </p:nvGrpSpPr>
-      <p:grpSpPr>
-        <a:xfrm>
-          <a:off x="0" y="0"/>
-          <a:ext cx="0" cy="0"/>
-          <a:chOff x="0" y="0"/>
-          <a:chExt cx="0" cy="0"/>
-        </a:xfrm>
-      </p:grpSpPr>
-      <p:sp>
-        <p:nvSpPr>
-          <p:cNvPr id="5" name="Rectangle 4"/>
-          <p:cNvSpPr/>
-          <p:nvPr/>
-        </p:nvSpPr>
-        <p:spPr bwMode="auto">
-          <a:xfrm>
-            <a:off x="7408968" y="2188597"/>
-            <a:ext cx="1164188" cy="2912400"/>
-          </a:xfrm>
-          <a:prstGeom prst="rect">
-            <a:avLst/>
-          </a:prstGeom>
-          <a:solidFill>
-            <a:schemeClr val="bg1"/>
-          </a:solidFill>
-          <a:ln w="12700" cap="flat" cmpd="sng" algn="ctr">
-            <a:solidFill>
-              <a:srgbClr val="000000"/>
-            </a:solidFill>
-            <a:prstDash val="solid"/>
-            <a:round/>
-            <a:headEnd type="none" w="med" len="med"/>
-            <a:tailEnd type="none" w="med" len="med"/>
-          </a:ln>
-          <a:effectLst/>
-        </p:spPr>
-        <p:txBody>
-          <a:bodyPr vert="horz" wrap="square" lIns="99441" tIns="49721" rIns="99441" bIns="0" numCol="1" rtlCol="0" anchor="ctr" anchorCtr="0" compatLnSpc="1">
-            <a:prstTxWarp prst="textNoShape">
-              <a:avLst/>
-            </a:prstTxWarp>
-            <a:noAutofit/>
-          </a:bodyPr>
-          <a:lstStyle/>
-          <a:p>
-            <a:pPr algn="ctr" defTabSz="994355" eaLnBrk="0" fontAlgn="base" hangingPunct="0">
-              <a:spcBef>
-                <a:spcPct val="0"/>
-              </a:spcBef>
-              <a:spcAft>
-                <a:spcPct val="0"/>
-              </a:spcAft>
-            </a:pPr>
-            <a:r>
-              <a:rPr lang="en-US" sz="1200" dirty="0">
-                <a:latin typeface="CMU Typewriter Text Variable Width Medium" charset="0"/>
-                <a:ea typeface="CMU Typewriter Text Variable Width Medium" charset="0"/>
-                <a:cs typeface="CMU Typewriter Text Variable Width Medium" charset="0"/>
-              </a:rPr>
-              <a:t>82% of streets are referenced in </a:t>
-            </a:r>
-            <a:r>
-              <a:rPr lang="en-US" sz="1200" dirty="0" smtClean="0">
-                <a:latin typeface="CMU Typewriter Text Variable Width Medium" charset="0"/>
-                <a:ea typeface="CMU Typewriter Text Variable Width Medium" charset="0"/>
-                <a:cs typeface="CMU Typewriter Text Variable Width Medium" charset="0"/>
-              </a:rPr>
-              <a:t>LRPP</a:t>
-            </a:r>
-            <a:endParaRPr lang="en-US" sz="1200" dirty="0">
-              <a:latin typeface="CMU Typewriter Text Variable Width Medium" charset="0"/>
-              <a:ea typeface="CMU Typewriter Text Variable Width Medium" charset="0"/>
-              <a:cs typeface="CMU Typewriter Text Variable Width Medium" charset="0"/>
-            </a:endParaRPr>
-          </a:p>
-        </p:txBody>
-      </p:sp>
-      <p:sp>
-        <p:nvSpPr>
-          <p:cNvPr id="8" name="Rectangle 7"/>
-          <p:cNvSpPr/>
-          <p:nvPr/>
-        </p:nvSpPr>
-        <p:spPr bwMode="auto">
-          <a:xfrm>
-            <a:off x="7408968" y="5100998"/>
-            <a:ext cx="1164188" cy="637718"/>
-          </a:xfrm>
-          <a:prstGeom prst="rect">
-            <a:avLst/>
-          </a:prstGeom>
-          <a:solidFill>
-            <a:schemeClr val="bg1">
-              <a:lumMod val="85000"/>
-            </a:schemeClr>
-          </a:solidFill>
-          <a:ln w="12700" cap="flat" cmpd="sng" algn="ctr">
-            <a:solidFill>
-              <a:srgbClr val="000000"/>
-            </a:solidFill>
-            <a:prstDash val="solid"/>
-            <a:round/>
-            <a:headEnd type="none" w="med" len="med"/>
-            <a:tailEnd type="none" w="med" len="med"/>
-          </a:ln>
-          <a:effectLst/>
-        </p:spPr>
-        <p:txBody>
-          <a:bodyPr vert="horz" wrap="square" lIns="99441" tIns="49721" rIns="99441" bIns="0" numCol="1" rtlCol="0" anchor="ctr" anchorCtr="0" compatLnSpc="1">
-            <a:prstTxWarp prst="textNoShape">
-              <a:avLst/>
-            </a:prstTxWarp>
-            <a:noAutofit/>
-          </a:bodyPr>
-          <a:lstStyle/>
-          <a:p>
-            <a:pPr algn="ctr" defTabSz="994355" eaLnBrk="0" fontAlgn="base" hangingPunct="0">
-              <a:spcBef>
-                <a:spcPct val="0"/>
-              </a:spcBef>
-              <a:spcAft>
-                <a:spcPct val="0"/>
-              </a:spcAft>
-            </a:pPr>
-            <a:endParaRPr lang="en-US" sz="1200" dirty="0">
-              <a:latin typeface="CMU Typewriter Text Variable Width Medium" charset="0"/>
-              <a:ea typeface="CMU Typewriter Text Variable Width Medium" charset="0"/>
-              <a:cs typeface="CMU Typewriter Text Variable Width Medium" charset="0"/>
-            </a:endParaRPr>
-          </a:p>
-        </p:txBody>
-      </p:sp>
-      <p:sp>
-        <p:nvSpPr>
-          <p:cNvPr id="9" name="Rectangle 8"/>
-          <p:cNvSpPr/>
-          <p:nvPr/>
-        </p:nvSpPr>
-        <p:spPr bwMode="auto">
-          <a:xfrm>
-            <a:off x="6244780" y="2188597"/>
-            <a:ext cx="1164188" cy="3553199"/>
-          </a:xfrm>
-          <a:prstGeom prst="rect">
-            <a:avLst/>
-          </a:prstGeom>
-          <a:solidFill>
-            <a:schemeClr val="bg1"/>
-          </a:solidFill>
-          <a:ln w="12700" cap="flat" cmpd="sng" algn="ctr">
-            <a:solidFill>
-              <a:srgbClr val="000000"/>
-            </a:solidFill>
-            <a:prstDash val="solid"/>
-            <a:round/>
-            <a:headEnd type="none" w="med" len="med"/>
-            <a:tailEnd type="none" w="med" len="med"/>
-          </a:ln>
-          <a:effectLst/>
-        </p:spPr>
-        <p:txBody>
-          <a:bodyPr vert="horz" wrap="square" lIns="99441" tIns="49721" rIns="99441" bIns="0" numCol="1" rtlCol="0" anchor="ctr" anchorCtr="0" compatLnSpc="1">
-            <a:prstTxWarp prst="textNoShape">
-              <a:avLst/>
-            </a:prstTxWarp>
-            <a:noAutofit/>
-          </a:bodyPr>
-          <a:lstStyle/>
-          <a:p>
-            <a:pPr algn="ctr" defTabSz="994355" eaLnBrk="0" fontAlgn="base" hangingPunct="0">
-              <a:spcBef>
-                <a:spcPct val="0"/>
-              </a:spcBef>
-              <a:spcAft>
-                <a:spcPct val="0"/>
-              </a:spcAft>
-            </a:pPr>
-            <a:r>
-              <a:rPr lang="en-US" sz="1200" dirty="0">
-                <a:latin typeface="CMU Typewriter Text Variable Width Medium" charset="0"/>
-                <a:ea typeface="CMU Typewriter Text Variable Width Medium" charset="0"/>
-                <a:cs typeface="CMU Typewriter Text Variable Width Medium" charset="0"/>
-              </a:rPr>
-              <a:t>98% of </a:t>
-            </a:r>
-            <a:r>
-              <a:rPr lang="en-US" sz="1200">
-                <a:latin typeface="CMU Typewriter Text Variable Width Medium" charset="0"/>
-                <a:ea typeface="CMU Typewriter Text Variable Width Medium" charset="0"/>
-                <a:cs typeface="CMU Typewriter Text Variable Width Medium" charset="0"/>
-              </a:rPr>
-              <a:t>addresses include a </a:t>
-            </a:r>
-            <a:r>
-              <a:rPr lang="en-US" sz="1200" dirty="0">
-                <a:latin typeface="CMU Typewriter Text Variable Width Medium" charset="0"/>
-                <a:ea typeface="CMU Typewriter Text Variable Width Medium" charset="0"/>
-                <a:cs typeface="CMU Typewriter Text Variable Width Medium" charset="0"/>
-              </a:rPr>
-              <a:t>house number</a:t>
-            </a:r>
-          </a:p>
-        </p:txBody>
-      </p:sp>
-      <p:sp>
-        <p:nvSpPr>
-          <p:cNvPr id="10" name="Rectangle 9"/>
-          <p:cNvSpPr/>
-          <p:nvPr/>
-        </p:nvSpPr>
-        <p:spPr bwMode="auto">
-          <a:xfrm>
-            <a:off x="6244780" y="5741796"/>
-            <a:ext cx="1164188" cy="82446"/>
-          </a:xfrm>
-          <a:prstGeom prst="rect">
-            <a:avLst/>
-          </a:prstGeom>
-          <a:solidFill>
-            <a:schemeClr val="bg1">
-              <a:lumMod val="85000"/>
-            </a:schemeClr>
-          </a:solidFill>
-          <a:ln w="12700" cap="flat" cmpd="sng" algn="ctr">
-            <a:solidFill>
-              <a:srgbClr val="000000"/>
-            </a:solidFill>
-            <a:prstDash val="solid"/>
-            <a:round/>
-            <a:headEnd type="none" w="med" len="med"/>
-            <a:tailEnd type="none" w="med" len="med"/>
-          </a:ln>
-          <a:effectLst/>
-        </p:spPr>
-        <p:txBody>
-          <a:bodyPr vert="horz" wrap="square" lIns="99441" tIns="49721" rIns="99441" bIns="0" numCol="1" rtlCol="0" anchor="ctr" anchorCtr="0" compatLnSpc="1">
-            <a:prstTxWarp prst="textNoShape">
-              <a:avLst/>
-            </a:prstTxWarp>
-            <a:noAutofit/>
-          </a:bodyPr>
-          <a:lstStyle/>
-          <a:p>
-            <a:pPr algn="ctr" defTabSz="994355" eaLnBrk="0" fontAlgn="base" hangingPunct="0">
-              <a:spcBef>
-                <a:spcPct val="0"/>
-              </a:spcBef>
-              <a:spcAft>
-                <a:spcPct val="0"/>
-              </a:spcAft>
-            </a:pPr>
-            <a:endParaRPr lang="en-US" sz="1200" dirty="0">
-              <a:latin typeface="CMU Typewriter Text Variable Width Medium" charset="0"/>
-              <a:ea typeface="CMU Typewriter Text Variable Width Medium" charset="0"/>
-              <a:cs typeface="CMU Typewriter Text Variable Width Medium" charset="0"/>
-            </a:endParaRPr>
-          </a:p>
-        </p:txBody>
-      </p:sp>
-      <p:sp>
-        <p:nvSpPr>
-          <p:cNvPr id="11" name="Rectangle 10"/>
-          <p:cNvSpPr/>
-          <p:nvPr/>
-        </p:nvSpPr>
-        <p:spPr bwMode="auto">
-          <a:xfrm>
-            <a:off x="8573156" y="4703128"/>
-            <a:ext cx="1164188" cy="1029958"/>
-          </a:xfrm>
-          <a:prstGeom prst="rect">
-            <a:avLst/>
-          </a:prstGeom>
-          <a:solidFill>
-            <a:schemeClr val="bg1">
-              <a:lumMod val="85000"/>
-            </a:schemeClr>
-          </a:solidFill>
-          <a:ln w="12700" cap="flat" cmpd="sng" algn="ctr">
-            <a:solidFill>
-              <a:srgbClr val="000000"/>
-            </a:solidFill>
-            <a:prstDash val="solid"/>
-            <a:round/>
-            <a:headEnd type="none" w="med" len="med"/>
-            <a:tailEnd type="none" w="med" len="med"/>
-          </a:ln>
-          <a:effectLst/>
-        </p:spPr>
-        <p:txBody>
-          <a:bodyPr vert="horz" wrap="square" lIns="99441" tIns="49721" rIns="99441" bIns="0" numCol="1" rtlCol="0" anchor="ctr" anchorCtr="0" compatLnSpc="1">
-            <a:prstTxWarp prst="textNoShape">
-              <a:avLst/>
-            </a:prstTxWarp>
-            <a:noAutofit/>
-          </a:bodyPr>
-          <a:lstStyle/>
-          <a:p>
-            <a:pPr algn="ctr" defTabSz="994355" eaLnBrk="0" fontAlgn="base" hangingPunct="0">
-              <a:spcBef>
-                <a:spcPct val="0"/>
-              </a:spcBef>
-              <a:spcAft>
-                <a:spcPct val="0"/>
-              </a:spcAft>
-            </a:pPr>
-            <a:endParaRPr lang="en-US" sz="1200" dirty="0">
-              <a:latin typeface="CMU Typewriter Text Variable Width Medium" charset="0"/>
-              <a:ea typeface="CMU Typewriter Text Variable Width Medium" charset="0"/>
-              <a:cs typeface="CMU Typewriter Text Variable Width Medium" charset="0"/>
-            </a:endParaRPr>
-          </a:p>
-        </p:txBody>
-      </p:sp>
-      <p:sp>
-        <p:nvSpPr>
-          <p:cNvPr id="12" name="Rectangle 11"/>
-          <p:cNvSpPr/>
-          <p:nvPr/>
-        </p:nvSpPr>
-        <p:spPr bwMode="auto">
-          <a:xfrm>
-            <a:off x="8573156" y="2183127"/>
-            <a:ext cx="1164188" cy="2520000"/>
-          </a:xfrm>
-          <a:prstGeom prst="rect">
-            <a:avLst/>
-          </a:prstGeom>
-          <a:solidFill>
-            <a:schemeClr val="bg1"/>
-          </a:solidFill>
-          <a:ln w="12700" cap="flat" cmpd="sng" algn="ctr">
-            <a:solidFill>
-              <a:srgbClr val="000000"/>
-            </a:solidFill>
-            <a:prstDash val="solid"/>
-            <a:round/>
-            <a:headEnd type="none" w="med" len="med"/>
-            <a:tailEnd type="none" w="med" len="med"/>
-          </a:ln>
-          <a:effectLst/>
-        </p:spPr>
-        <p:txBody>
-          <a:bodyPr vert="horz" wrap="square" lIns="99441" tIns="49721" rIns="99441" bIns="0" numCol="1" rtlCol="0" anchor="ctr" anchorCtr="0" compatLnSpc="1">
-            <a:prstTxWarp prst="textNoShape">
-              <a:avLst/>
-            </a:prstTxWarp>
-            <a:noAutofit/>
-          </a:bodyPr>
-          <a:lstStyle/>
-          <a:p>
-            <a:pPr algn="ctr" defTabSz="994355" eaLnBrk="0" fontAlgn="base" hangingPunct="0">
-              <a:spcBef>
-                <a:spcPct val="0"/>
-              </a:spcBef>
-              <a:spcAft>
-                <a:spcPct val="0"/>
-              </a:spcAft>
-            </a:pPr>
-            <a:r>
-              <a:rPr lang="en-US" sz="1200" dirty="0">
-                <a:latin typeface="CMU Typewriter Text Variable Width Medium" charset="0"/>
-                <a:ea typeface="CMU Typewriter Text Variable Width Medium" charset="0"/>
-                <a:cs typeface="CMU Typewriter Text Variable Width Medium" charset="0"/>
-              </a:rPr>
-              <a:t>74% of the streets qualify for house number inference</a:t>
-            </a:r>
-          </a:p>
-        </p:txBody>
-      </p:sp>
-      <p:sp>
-        <p:nvSpPr>
-          <p:cNvPr id="14" name="Rectangle 13"/>
-          <p:cNvSpPr/>
-          <p:nvPr/>
-        </p:nvSpPr>
-        <p:spPr bwMode="auto">
-          <a:xfrm>
-            <a:off x="9737345" y="2188597"/>
-            <a:ext cx="1164188" cy="933267"/>
-          </a:xfrm>
-          <a:prstGeom prst="rect">
-            <a:avLst/>
-          </a:prstGeom>
-          <a:solidFill>
-            <a:schemeClr val="bg1"/>
-          </a:solidFill>
-          <a:ln w="12700" cap="flat" cmpd="sng" algn="ctr">
-            <a:solidFill>
-              <a:srgbClr val="000000"/>
-            </a:solidFill>
-            <a:prstDash val="solid"/>
-            <a:round/>
-            <a:headEnd type="none" w="med" len="med"/>
-            <a:tailEnd type="none" w="med" len="med"/>
-          </a:ln>
-          <a:effectLst/>
-        </p:spPr>
-        <p:txBody>
-          <a:bodyPr vert="horz" wrap="square" lIns="99441" tIns="49721" rIns="99441" bIns="0" numCol="1" rtlCol="0" anchor="ctr" anchorCtr="0" compatLnSpc="1">
-            <a:prstTxWarp prst="textNoShape">
-              <a:avLst/>
-            </a:prstTxWarp>
-            <a:noAutofit/>
-          </a:bodyPr>
-          <a:lstStyle/>
-          <a:p>
-            <a:pPr algn="ctr" defTabSz="994355" eaLnBrk="0" fontAlgn="base" hangingPunct="0">
-              <a:spcBef>
-                <a:spcPct val="0"/>
-              </a:spcBef>
-              <a:spcAft>
-                <a:spcPct val="0"/>
-              </a:spcAft>
-            </a:pPr>
-            <a:r>
-              <a:rPr lang="en-US" sz="1200" dirty="0">
-                <a:latin typeface="CMU Typewriter Text Variable Width Medium" charset="0"/>
-                <a:ea typeface="CMU Typewriter Text Variable Width Medium" charset="0"/>
-                <a:cs typeface="CMU Typewriter Text Variable Width Medium" charset="0"/>
-              </a:rPr>
-              <a:t>111k house numbers are in LRPP</a:t>
-            </a:r>
-          </a:p>
-        </p:txBody>
-      </p:sp>
-      <p:sp>
-        <p:nvSpPr>
-          <p:cNvPr id="15" name="Rectangle 14"/>
-          <p:cNvSpPr/>
-          <p:nvPr/>
-        </p:nvSpPr>
-        <p:spPr bwMode="auto">
-          <a:xfrm>
-            <a:off x="9737345" y="3121860"/>
-            <a:ext cx="1164188" cy="976580"/>
-          </a:xfrm>
-          <a:prstGeom prst="rect">
-            <a:avLst/>
-          </a:prstGeom>
-          <a:solidFill>
-            <a:schemeClr val="bg1"/>
-          </a:solidFill>
-          <a:ln w="12700" cap="flat" cmpd="sng" algn="ctr">
-            <a:solidFill>
-              <a:srgbClr val="000000"/>
-            </a:solidFill>
-            <a:prstDash val="solid"/>
-            <a:round/>
-            <a:headEnd type="none" w="med" len="med"/>
-            <a:tailEnd type="none" w="med" len="med"/>
-          </a:ln>
-          <a:effectLst/>
-        </p:spPr>
-        <p:txBody>
-          <a:bodyPr vert="horz" wrap="square" lIns="99441" tIns="49721" rIns="99441" bIns="0" numCol="1" rtlCol="0" anchor="ctr" anchorCtr="0" compatLnSpc="1">
-            <a:prstTxWarp prst="textNoShape">
-              <a:avLst/>
-            </a:prstTxWarp>
-            <a:noAutofit/>
-          </a:bodyPr>
-          <a:lstStyle/>
-          <a:p>
-            <a:pPr algn="ctr" defTabSz="994355" eaLnBrk="0" fontAlgn="base" hangingPunct="0">
-              <a:spcBef>
-                <a:spcPct val="0"/>
-              </a:spcBef>
-              <a:spcAft>
-                <a:spcPct val="0"/>
-              </a:spcAft>
-            </a:pPr>
-            <a:r>
-              <a:rPr lang="en-US" sz="1200" dirty="0">
-                <a:latin typeface="CMU Typewriter Text Variable Width Medium" charset="0"/>
-                <a:ea typeface="CMU Typewriter Text Variable Width Medium" charset="0"/>
-                <a:cs typeface="CMU Typewriter Text Variable Width Medium" charset="0"/>
-              </a:rPr>
-              <a:t>113k house numbers can be inferred</a:t>
-            </a:r>
-          </a:p>
-        </p:txBody>
-      </p:sp>
-      <p:pic>
-        <p:nvPicPr>
-          <p:cNvPr id="17" name="Content Placeholder 4"/>
-          <p:cNvPicPr>
-            <a:picLocks noChangeAspect="1"/>
-          </p:cNvPicPr>
-          <p:nvPr/>
-        </p:nvPicPr>
-        <p:blipFill rotWithShape="1">
-          <a:blip r:embed="rId3" cstate="print">
-            <a:extLst>
-              <a:ext uri="{28A0092B-C50C-407E-A947-70E740481C1C}">
-                <a14:useLocalDpi xmlns:a14="http://schemas.microsoft.com/office/drawing/2010/main"/>
-              </a:ext>
-            </a:extLst>
-          </a:blip>
-          <a:srcRect/>
-          <a:stretch/>
-        </p:blipFill>
-        <p:spPr bwMode="auto">
-          <a:xfrm>
-            <a:off x="3532466" y="2196934"/>
-            <a:ext cx="2712798" cy="3623425"/>
-          </a:xfrm>
-          <a:prstGeom prst="rect">
-            <a:avLst/>
-          </a:prstGeom>
-          <a:noFill/>
-          <a:ln w="9525">
-            <a:solidFill>
-              <a:srgbClr val="000000"/>
-            </a:solidFill>
-            <a:miter lim="800000"/>
-            <a:headEnd/>
-            <a:tailEnd/>
-          </a:ln>
-        </p:spPr>
-      </p:pic>
-      <p:sp>
-        <p:nvSpPr>
-          <p:cNvPr id="2" name="Cloud 1"/>
-          <p:cNvSpPr/>
-          <p:nvPr/>
-        </p:nvSpPr>
-        <p:spPr>
-          <a:xfrm>
-            <a:off x="9624732" y="4008646"/>
-            <a:ext cx="1389413" cy="1811713"/>
-          </a:xfrm>
-          <a:prstGeom prst="cloud">
-            <a:avLst/>
-          </a:prstGeom>
-          <a:solidFill>
-            <a:schemeClr val="bg1"/>
-          </a:solidFill>
-          <a:ln>
-            <a:solidFill>
-              <a:schemeClr val="tx1"/>
-            </a:solidFill>
-          </a:ln>
-        </p:spPr>
-        <p:style>
-          <a:lnRef idx="2">
-            <a:schemeClr val="accent1">
-              <a:shade val="50000"/>
-            </a:schemeClr>
-          </a:lnRef>
-          <a:fillRef idx="1">
-            <a:schemeClr val="accent1"/>
-          </a:fillRef>
-          <a:effectRef idx="0">
-            <a:schemeClr val="accent1"/>
-          </a:effectRef>
-          <a:fontRef idx="minor">
-            <a:schemeClr val="lt1"/>
-          </a:fontRef>
-        </p:style>
-        <p:txBody>
-          <a:bodyPr lIns="0" rtlCol="0" anchor="ctr"/>
-          <a:lstStyle/>
-          <a:p>
-            <a:pPr algn="ctr" defTabSz="994355" eaLnBrk="0" fontAlgn="base" hangingPunct="0">
-              <a:spcBef>
-                <a:spcPct val="0"/>
-              </a:spcBef>
-              <a:spcAft>
-                <a:spcPct val="0"/>
-              </a:spcAft>
-            </a:pPr>
-            <a:r>
-              <a:rPr lang="en-US" sz="1200" dirty="0">
-                <a:solidFill>
-                  <a:schemeClr val="tx1"/>
-                </a:solidFill>
-                <a:latin typeface="CMU Typewriter Text Variable Width Medium" charset="0"/>
-                <a:ea typeface="CMU Typewriter Text Variable Width Medium" charset="0"/>
-                <a:cs typeface="CMU Typewriter Text Variable Width Medium" charset="0"/>
-              </a:rPr>
-              <a:t>Not known and not suitable for inference</a:t>
-            </a:r>
-          </a:p>
-        </p:txBody>
-      </p:sp>
-    </p:spTree>
-    <p:extLst>
-      <p:ext uri="{BB962C8B-B14F-4D97-AF65-F5344CB8AC3E}">
-        <p14:creationId xmlns:p14="http://schemas.microsoft.com/office/powerpoint/2010/main" val="670436853"/>
-      </p:ext>
-    </p:extLst>
-  </p:cSld>
-  <p:clrMapOvr>
-    <a:masterClrMapping/>
-  </p:clrMapOvr>
-  <p:timing>
-    <p:tnLst>
-      <p:par>
-        <p:cTn id="1" dur="indefinite" restart="never" nodeType="tmRoot"/>
-      </p:par>
-    </p:tnLst>
-  </p:timing>
-</p:sld>
-</file>
-
-<file path=ppt/slides/slide4.xml><?xml version="1.0" encoding="utf-8"?>
-<p:sld xmlns:a="http://schemas.openxmlformats.org/drawingml/2006/main" xmlns:r="http://schemas.openxmlformats.org/officeDocument/2006/relationships" xmlns:p="http://schemas.openxmlformats.org/presentationml/2006/main">
-  <p:cSld>
-    <p:spTree>
-      <p:nvGrpSpPr>
-        <p:cNvPr id="1" name=""/>
-        <p:cNvGrpSpPr/>
-        <p:nvPr/>
-      </p:nvGrpSpPr>
-      <p:grpSpPr>
-        <a:xfrm>
-          <a:off x="0" y="0"/>
-          <a:ext cx="0" cy="0"/>
-          <a:chOff x="0" y="0"/>
-          <a:chExt cx="0" cy="0"/>
-        </a:xfrm>
-      </p:grpSpPr>
       <p:sp>
         <p:nvSpPr>
           <p:cNvPr id="16" name="Oval 15"/>
@@ -5351,7 +3755,7 @@
 </p:sld>
 </file>
 
-<file path=ppt/slides/slide5.xml><?xml version="1.0" encoding="utf-8"?>
+<file path=ppt/slides/slide2.xml><?xml version="1.0" encoding="utf-8"?>
 <p:sld xmlns:a="http://schemas.openxmlformats.org/drawingml/2006/main" xmlns:r="http://schemas.openxmlformats.org/officeDocument/2006/relationships" xmlns:p="http://schemas.openxmlformats.org/presentationml/2006/main">
   <p:cSld>
     <p:spTree>
@@ -6507,7 +4911,7 @@
 </p:sld>
 </file>
 
-<file path=ppt/slides/slide6.xml><?xml version="1.0" encoding="utf-8"?>
+<file path=ppt/slides/slide3.xml><?xml version="1.0" encoding="utf-8"?>
 <p:sld xmlns:a="http://schemas.openxmlformats.org/drawingml/2006/main" xmlns:r="http://schemas.openxmlformats.org/officeDocument/2006/relationships" xmlns:p="http://schemas.openxmlformats.org/presentationml/2006/main">
   <p:cSld>
     <p:spTree>
@@ -8075,7 +6479,7 @@
 </p:sld>
 </file>
 
-<file path=ppt/slides/slide7.xml><?xml version="1.0" encoding="utf-8"?>
+<file path=ppt/slides/slide4.xml><?xml version="1.0" encoding="utf-8"?>
 <p:sld xmlns:a="http://schemas.openxmlformats.org/drawingml/2006/main" xmlns:r="http://schemas.openxmlformats.org/officeDocument/2006/relationships" xmlns:p="http://schemas.openxmlformats.org/presentationml/2006/main">
   <p:cSld>
     <p:spTree>
@@ -9808,7 +8212,7 @@
 </p:sld>
 </file>
 
-<file path=ppt/slides/slide8.xml><?xml version="1.0" encoding="utf-8"?>
+<file path=ppt/slides/slide5.xml><?xml version="1.0" encoding="utf-8"?>
 <p:sld xmlns:a="http://schemas.openxmlformats.org/drawingml/2006/main" xmlns:r="http://schemas.openxmlformats.org/officeDocument/2006/relationships" xmlns:p="http://schemas.openxmlformats.org/presentationml/2006/main">
   <p:cSld>
     <p:spTree>
@@ -11717,11 +10121,6 @@
               </a:rPr>
               <a:t>p1.1</a:t>
             </a:r>
-            <a:endParaRPr lang="en-US" sz="1200" i="1" dirty="0">
-              <a:latin typeface="CMU Typewriter Text Variable Width Medium" charset="0"/>
-              <a:ea typeface="CMU Typewriter Text Variable Width Medium" charset="0"/>
-              <a:cs typeface="CMU Typewriter Text Variable Width Medium" charset="0"/>
-            </a:endParaRPr>
           </a:p>
         </p:txBody>
       </p:sp>
@@ -11763,11 +10162,6 @@
               </a:rPr>
               <a:t>: Identify the list of house numbers in each OSON road through references in other open data</a:t>
             </a:r>
-            <a:endParaRPr lang="en-US" sz="1200" dirty="0">
-              <a:latin typeface="CMU Typewriter Text Variable Width Medium" charset="0"/>
-              <a:ea typeface="CMU Typewriter Text Variable Width Medium" charset="0"/>
-              <a:cs typeface="CMU Typewriter Text Variable Width Medium" charset="0"/>
-            </a:endParaRPr>
           </a:p>
         </p:txBody>
       </p:sp>

</xml_diff>